<commit_message>
Adding in content and structure
</commit_message>
<xml_diff>
--- a/docs/index.pptx
+++ b/docs/index.pptx
@@ -9,6 +9,7 @@
     <p:sldId id="257" r:id="rId3"/>
     <p:sldId id="258" r:id="rId4"/>
     <p:sldId id="259" r:id="rId5"/>
+    <p:sldId id="260" r:id="rId6"/>
   </p:sldIdLst>
   <p:sldSz cx="9144000" cy="5143500" type="screen16x9"/>
   <p:notesSz cx="6858000" cy="9144000"/>
@@ -3118,7 +3119,7 @@
             </a:pPr>
             <a:r>
               <a:rPr/>
-              <a:t>Single Source, Many Outputs</a:t>
+              <a:t>API Controls</a:t>
             </a:r>
           </a:p>
         </p:txBody>
@@ -3193,7 +3194,7 @@
             </a:pPr>
             <a:r>
               <a:rPr/>
-              <a:t>Description</a:t>
+              <a:t>Purpose</a:t>
             </a:r>
           </a:p>
         </p:txBody>
@@ -3214,11 +3215,44 @@
           <a:lstStyle/>
           <a:p>
             <a:pPr lvl="0" indent="0" marL="0">
+              <a:spcBef>
+                <a:spcPts val="3000"/>
+              </a:spcBef>
               <a:buNone/>
             </a:pPr>
             <a:r>
+              <a:rPr b="1"/>
+              <a:t>What?</a:t>
+            </a:r>
+          </a:p>
+          <a:p>
+            <a:pPr lvl="0" indent="0" marL="0">
+              <a:buNone/>
+            </a:pPr>
+            <a:r>
               <a:rPr/>
-              <a:t>This is a demo site.</a:t>
+              <a:t>I’m taking my “one pager” Collaborative Corner about API Controls and migrating it into a single source to allow for multiple types of outputs for multiple types of communication and audiences.</a:t>
+            </a:r>
+          </a:p>
+          <a:p>
+            <a:pPr lvl="0" indent="0" marL="0">
+              <a:spcBef>
+                <a:spcPts val="3000"/>
+              </a:spcBef>
+              <a:buNone/>
+            </a:pPr>
+            <a:r>
+              <a:rPr b="1"/>
+              <a:t>Why?</a:t>
+            </a:r>
+          </a:p>
+          <a:p>
+            <a:pPr lvl="0" indent="0" marL="0">
+              <a:buNone/>
+            </a:pPr>
+            <a:r>
+              <a:rPr/>
+              <a:t>The one pager’s initial purpose was an easy and high level view of API Controls but it has turned into a 10 pager, with lots of information and written in various ways (ie blog post, how to, tutorial)</a:t>
             </a:r>
           </a:p>
         </p:txBody>
@@ -3265,7 +3299,7 @@
             </a:pPr>
             <a:r>
               <a:rPr/>
-              <a:t>heading 2</a:t>
+              <a:t>Sections</a:t>
             </a:r>
           </a:p>
         </p:txBody>
@@ -3285,47 +3319,108 @@
           <a:bodyPr/>
           <a:lstStyle/>
           <a:p>
-            <a:pPr lvl="0" indent="0" marL="0">
-              <a:buNone/>
-            </a:pPr>
+            <a:pPr lvl="0"/>
             <a:r>
               <a:rPr/>
-              <a:t>This is a demo site.</a:t>
+              <a:t>Understanding the Latest Updates</a:t>
+            </a:r>
+          </a:p>
+          <a:p>
+            <a:pPr lvl="1"/>
+            <a:r>
+              <a:rPr/>
+              <a:t>Immediate Impact</a:t>
             </a:r>
           </a:p>
           <a:p>
             <a:pPr lvl="0"/>
             <a:r>
               <a:rPr/>
-              <a:t>OUs</a:t>
+              <a:t>API Controls Overview</a:t>
+            </a:r>
+          </a:p>
+          <a:p>
+            <a:pPr lvl="1"/>
+            <a:r>
+              <a:rPr/>
+              <a:t>Best Practices</a:t>
             </a:r>
           </a:p>
           <a:p>
             <a:pPr lvl="0"/>
             <a:r>
               <a:rPr/>
-              <a:t>Users</a:t>
+              <a:t>Next Steps: 2 Required Actions before Oct 23rd</a:t>
+            </a:r>
+          </a:p>
+          <a:p>
+            <a:pPr lvl="1"/>
+            <a:r>
+              <a:rPr/>
+              <a:t>Configure a trusted list</a:t>
+            </a:r>
+          </a:p>
+          <a:p>
+            <a:pPr lvl="1"/>
+            <a:r>
+              <a:rPr/>
+              <a:t>Confirm the setting</a:t>
             </a:r>
           </a:p>
           <a:p>
             <a:pPr lvl="0"/>
             <a:r>
               <a:rPr/>
-              <a:t>Services</a:t>
+              <a:t>Creating a trusted list tips</a:t>
+            </a:r>
+          </a:p>
+          <a:p>
+            <a:pPr lvl="0"/>
+            <a:r>
+              <a:rPr/>
+              <a:t>FAQs</a:t>
+            </a:r>
+          </a:p>
+          <a:p>
+            <a:pPr lvl="0"/>
+            <a:r>
+              <a:rPr/>
+              <a:t>Pro Tips</a:t>
             </a:r>
           </a:p>
           <a:p>
             <a:pPr lvl="1"/>
             <a:r>
               <a:rPr/>
-              <a:t>Core</a:t>
+              <a:t>App Script</a:t>
+            </a:r>
+          </a:p>
+          <a:p>
+            <a:pPr lvl="0"/>
+            <a:r>
+              <a:rPr/>
+              <a:t>Resources</a:t>
             </a:r>
           </a:p>
           <a:p>
             <a:pPr lvl="1"/>
             <a:r>
               <a:rPr/>
-              <a:t>Additional</a:t>
+              <a:t>Collab Member Resources</a:t>
+            </a:r>
+          </a:p>
+          <a:p>
+            <a:pPr lvl="1"/>
+            <a:r>
+              <a:rPr/>
+              <a:t>Visual Roadmap</a:t>
+            </a:r>
+          </a:p>
+          <a:p>
+            <a:pPr lvl="1"/>
+            <a:r>
+              <a:rPr/>
+              <a:t>Not a Collab member? Try it 45 days for free</a:t>
             </a:r>
           </a:p>
         </p:txBody>
@@ -3372,7 +3467,7 @@
             </a:pPr>
             <a:r>
               <a:rPr/>
-              <a:t>heading 3</a:t>
+              <a:t>Summary</a:t>
             </a:r>
           </a:p>
         </p:txBody>
@@ -3397,7 +3492,88 @@
             </a:pPr>
             <a:r>
               <a:rPr/>
-              <a:t>Another sentence</a:t>
+              <a:t>Hey there, Google Admins! We’re on the cusp of significant shifts in Google’s API control settings for users under 18, set to shake things up this coming October. This is a noteworthy moment, especially for schools that haven’t yet fine-tuned their API Control settings. And for those who think they’re one step ahead, hold on! A slew of fresh updates and changes have already landed in the admin console, causing ripples of impact.</a:t>
+            </a:r>
+          </a:p>
+          <a:p>
+            <a:pPr lvl="0" indent="0" marL="0">
+              <a:buNone/>
+            </a:pPr>
+            <a:r>
+              <a:rPr/>
+              <a:t>With the flurry of updates to the API Controls section in the admin console over the past couple of years, it’s time to take a breather and review the API controls, nail down best practices, identify necessary actions, and map out the route to get there.</a:t>
+            </a:r>
+          </a:p>
+        </p:txBody>
+      </p:sp>
+    </p:spTree>
+  </p:cSld>
+</p:sld>
+</file>
+
+<file path=ppt/slides/slide5.xml><?xml version="1.0" encoding="utf-8"?>
+<p:sld xmlns:a="http://schemas.openxmlformats.org/drawingml/2006/main" xmlns:r="http://schemas.openxmlformats.org/officeDocument/2006/relationships" xmlns:p="http://schemas.openxmlformats.org/presentationml/2006/main">
+  <p:cSld>
+    <p:spTree>
+      <p:nvGrpSpPr>
+        <p:cNvPr id="1" name=""/>
+        <p:cNvGrpSpPr/>
+        <p:nvPr/>
+      </p:nvGrpSpPr>
+      <p:grpSpPr>
+        <a:xfrm>
+          <a:off x="0" y="0"/>
+          <a:ext cx="0" cy="0"/>
+          <a:chOff x="0" y="0"/>
+          <a:chExt cx="0" cy="0"/>
+        </a:xfrm>
+      </p:grpSpPr>
+      <p:sp>
+        <p:nvSpPr>
+          <p:cNvPr id="2" name="Title 1"/>
+          <p:cNvSpPr>
+            <a:spLocks noGrp="1"/>
+          </p:cNvSpPr>
+          <p:nvPr>
+            <p:ph type="title"/>
+          </p:nvPr>
+        </p:nvSpPr>
+        <p:spPr/>
+        <p:txBody>
+          <a:bodyPr/>
+          <a:lstStyle/>
+          <a:p>
+            <a:pPr lvl="0" indent="0" marL="0">
+              <a:buNone/>
+            </a:pPr>
+            <a:r>
+              <a:rPr/>
+              <a:t>TL;DR</a:t>
+            </a:r>
+          </a:p>
+        </p:txBody>
+      </p:sp>
+      <p:sp>
+        <p:nvSpPr>
+          <p:cNvPr id="3" name="Content Placeholder 2"/>
+          <p:cNvSpPr>
+            <a:spLocks noGrp="1"/>
+          </p:cNvSpPr>
+          <p:nvPr>
+            <p:ph idx="1"/>
+          </p:nvPr>
+        </p:nvSpPr>
+        <p:spPr/>
+        <p:txBody>
+          <a:bodyPr/>
+          <a:lstStyle/>
+          <a:p>
+            <a:pPr lvl="0" indent="0" marL="0">
+              <a:buNone/>
+            </a:pPr>
+            <a:r>
+              <a:rPr/>
+              <a:t>Google is pushing us towards a Trusted List approach for OAuth Apps, which will be implemented in October. Google Admins need to set up the trusted list and confirm settings before then.</a:t>
             </a:r>
           </a:p>
         </p:txBody>

</xml_diff>

<commit_message>
Changed file names and added content
</commit_message>
<xml_diff>
--- a/docs/index.pptx
+++ b/docs/index.pptx
@@ -10,6 +10,15 @@
     <p:sldId id="258" r:id="rId4"/>
     <p:sldId id="259" r:id="rId5"/>
     <p:sldId id="260" r:id="rId6"/>
+    <p:sldId id="261" r:id="rId7"/>
+    <p:sldId id="262" r:id="rId8"/>
+    <p:sldId id="263" r:id="rId9"/>
+    <p:sldId id="264" r:id="rId10"/>
+    <p:sldId id="265" r:id="rId11"/>
+    <p:sldId id="266" r:id="rId12"/>
+    <p:sldId id="267" r:id="rId13"/>
+    <p:sldId id="268" r:id="rId14"/>
+    <p:sldId id="269" r:id="rId15"/>
   </p:sldIdLst>
   <p:sldSz cx="9144000" cy="5143500" type="screen16x9"/>
   <p:notesSz cx="6858000" cy="9144000"/>
@@ -3157,6 +3166,646 @@
 </p:sld>
 </file>
 
+<file path=ppt/slides/slide10.xml><?xml version="1.0" encoding="utf-8"?>
+<p:sld xmlns:a="http://schemas.openxmlformats.org/drawingml/2006/main" xmlns:r="http://schemas.openxmlformats.org/officeDocument/2006/relationships" xmlns:p="http://schemas.openxmlformats.org/presentationml/2006/main">
+  <p:cSld>
+    <p:spTree>
+      <p:nvGrpSpPr>
+        <p:cNvPr id="1" name=""/>
+        <p:cNvGrpSpPr/>
+        <p:nvPr/>
+      </p:nvGrpSpPr>
+      <p:grpSpPr>
+        <a:xfrm>
+          <a:off x="0" y="0"/>
+          <a:ext cx="0" cy="0"/>
+          <a:chOff x="0" y="0"/>
+          <a:chExt cx="0" cy="0"/>
+        </a:xfrm>
+      </p:grpSpPr>
+      <p:sp>
+        <p:nvSpPr>
+          <p:cNvPr id="2" name="Title 1"/>
+          <p:cNvSpPr>
+            <a:spLocks noGrp="1"/>
+          </p:cNvSpPr>
+          <p:nvPr>
+            <p:ph type="title"/>
+          </p:nvPr>
+        </p:nvSpPr>
+        <p:spPr/>
+        <p:txBody>
+          <a:bodyPr/>
+          <a:lstStyle/>
+          <a:p>
+            <a:pPr lvl="0" indent="0" marL="0">
+              <a:buNone/>
+            </a:pPr>
+            <a:r>
+              <a:rPr/>
+              <a:t>Creating a trusted list tips</a:t>
+            </a:r>
+          </a:p>
+        </p:txBody>
+      </p:sp>
+      <p:sp>
+        <p:nvSpPr>
+          <p:cNvPr id="3" name="Content Placeholder 2"/>
+          <p:cNvSpPr>
+            <a:spLocks noGrp="1"/>
+          </p:cNvSpPr>
+          <p:nvPr>
+            <p:ph idx="1"/>
+          </p:nvPr>
+        </p:nvSpPr>
+        <p:spPr/>
+        <p:txBody>
+          <a:bodyPr/>
+          <a:lstStyle/>
+          <a:p>
+            <a:pPr lvl="0"/>
+            <a:r>
+              <a:rPr/>
+              <a:t>Check out the September 14th Deep Dive on this</a:t>
+            </a:r>
+          </a:p>
+          <a:p>
+            <a:pPr lvl="1"/>
+            <a:r>
+              <a:rPr/>
+              <a:t>Slide deck - slides</a:t>
+            </a:r>
+          </a:p>
+          <a:p>
+            <a:pPr lvl="1"/>
+            <a:r>
+              <a:rPr/>
+              <a:t>Recording</a:t>
+            </a:r>
+          </a:p>
+        </p:txBody>
+      </p:sp>
+    </p:spTree>
+  </p:cSld>
+</p:sld>
+</file>
+
+<file path=ppt/slides/slide11.xml><?xml version="1.0" encoding="utf-8"?>
+<p:sld xmlns:a="http://schemas.openxmlformats.org/drawingml/2006/main" xmlns:r="http://schemas.openxmlformats.org/officeDocument/2006/relationships" xmlns:p="http://schemas.openxmlformats.org/presentationml/2006/main">
+  <p:cSld>
+    <p:spTree>
+      <p:nvGrpSpPr>
+        <p:cNvPr id="1" name=""/>
+        <p:cNvGrpSpPr/>
+        <p:nvPr/>
+      </p:nvGrpSpPr>
+      <p:grpSpPr>
+        <a:xfrm>
+          <a:off x="0" y="0"/>
+          <a:ext cx="0" cy="0"/>
+          <a:chOff x="0" y="0"/>
+          <a:chExt cx="0" cy="0"/>
+        </a:xfrm>
+      </p:grpSpPr>
+      <p:sp>
+        <p:nvSpPr>
+          <p:cNvPr id="2" name="Title 1"/>
+          <p:cNvSpPr>
+            <a:spLocks noGrp="1"/>
+          </p:cNvSpPr>
+          <p:nvPr>
+            <p:ph type="title"/>
+          </p:nvPr>
+        </p:nvSpPr>
+        <p:spPr/>
+        <p:txBody>
+          <a:bodyPr/>
+          <a:lstStyle/>
+          <a:p>
+            <a:pPr lvl="0" indent="0" marL="0">
+              <a:buNone/>
+            </a:pPr>
+            <a:r>
+              <a:rPr/>
+              <a:t>FAQ</a:t>
+            </a:r>
+          </a:p>
+        </p:txBody>
+      </p:sp>
+      <p:sp>
+        <p:nvSpPr>
+          <p:cNvPr id="3" name="Content Placeholder 2"/>
+          <p:cNvSpPr>
+            <a:spLocks noGrp="1"/>
+          </p:cNvSpPr>
+          <p:nvPr>
+            <p:ph idx="1"/>
+          </p:nvPr>
+        </p:nvSpPr>
+        <p:spPr/>
+        <p:txBody>
+          <a:bodyPr/>
+          <a:lstStyle/>
+          <a:p>
+            <a:pPr lvl="0"/>
+            <a:r>
+              <a:rPr/>
+              <a:t>Is there a maximum of configured apps?</a:t>
+            </a:r>
+          </a:p>
+          <a:p>
+            <a:pPr lvl="1"/>
+            <a:r>
+              <a:rPr/>
+              <a:t>Yes, 15,000. We are in talks with Google about this</a:t>
+            </a:r>
+          </a:p>
+          <a:p>
+            <a:pPr lvl="0"/>
+            <a:r>
+              <a:rPr/>
+              <a:t>Can I unconfigure an app?</a:t>
+            </a:r>
+          </a:p>
+          <a:p>
+            <a:pPr lvl="1"/>
+            <a:r>
+              <a:rPr/>
+              <a:t>It does not appear like you can truly “unconfigure” an app. We are talking to Google about this.</a:t>
+            </a:r>
+          </a:p>
+          <a:p>
+            <a:pPr lvl="0"/>
+            <a:r>
+              <a:rPr/>
+              <a:t>I’m having issues with the iPhone native mail and calendar apps when I’m blocking APIs</a:t>
+            </a:r>
+          </a:p>
+          <a:p>
+            <a:pPr lvl="1"/>
+            <a:r>
+              <a:rPr/>
+              <a:t>This is the full App ID for iOS in my console: 450232826690-0rm6bs9d2fps9tifvk2oodh3tasd7vl7.apps.googleusercontent.com.</a:t>
+            </a:r>
+          </a:p>
+          <a:p>
+            <a:pPr lvl="0"/>
+            <a:r>
+              <a:rPr/>
+              <a:t>Can we disable the ability for students to “Request apps”?</a:t>
+            </a:r>
+          </a:p>
+          <a:p>
+            <a:pPr lvl="1"/>
+            <a:r>
+              <a:rPr/>
+              <a:t>No. But it is something we will talk about internally to see if there is a work around.</a:t>
+            </a:r>
+          </a:p>
+          <a:p>
+            <a:pPr lvl="1"/>
+            <a:r>
+              <a:rPr/>
+              <a:t>We asked Google and it’s “in the works”.</a:t>
+            </a:r>
+          </a:p>
+          <a:p>
+            <a:pPr lvl="0"/>
+            <a:r>
+              <a:rPr/>
+              <a:t>Can staff request apps like students?</a:t>
+            </a:r>
+          </a:p>
+          <a:p>
+            <a:pPr lvl="1"/>
+            <a:r>
+              <a:rPr/>
+              <a:t>No. Only under 18 can request. We are asking Google. Most likely a temp thing. (hopefully)</a:t>
+            </a:r>
+          </a:p>
+          <a:p>
+            <a:pPr lvl="0"/>
+            <a:r>
+              <a:rPr/>
+              <a:t>Where does that “request” go (when students request access to an app)?</a:t>
+            </a:r>
+          </a:p>
+          <a:p>
+            <a:pPr lvl="1"/>
+            <a:r>
+              <a:rPr/>
+              <a:t>Admin Console Dashboard &gt; App access control card</a:t>
+            </a:r>
+          </a:p>
+          <a:p>
+            <a:pPr lvl="1"/>
+            <a:r>
+              <a:rPr/>
+              <a:t>Security &gt; API Controls &gt; App Access Control &gt; Manage Third-Party App Access. Then it’s the middle box across the top that says “Apps pending review”.</a:t>
+            </a:r>
+          </a:p>
+          <a:p>
+            <a:pPr lvl="0"/>
+            <a:r>
+              <a:rPr/>
+              <a:t>Can we see “who” requested the app? Can we get alerted?</a:t>
+            </a:r>
+          </a:p>
+          <a:p>
+            <a:pPr lvl="1"/>
+            <a:r>
+              <a:rPr/>
+              <a:t>Under Reporting &gt; Audit and investigation &gt; OAuth log events. Then add the condition “Event is Request”.</a:t>
+            </a:r>
+          </a:p>
+          <a:p>
+            <a:pPr lvl="1"/>
+            <a:r>
+              <a:rPr/>
+              <a:t>Yes, by creating a Custom Rule: With the previous navigation then click on “Create activity rule” or “Reporting Rule” (depending on your edition). It will walk you through creating a rule (alert) where you can have it get sent to the Alert Center and email people.</a:t>
+            </a:r>
+          </a:p>
+          <a:p>
+            <a:pPr lvl="0"/>
+            <a:r>
+              <a:rPr/>
+              <a:t>Can you explain the API Block-Exempt option when trusting an app?</a:t>
+            </a:r>
+          </a:p>
+          <a:p>
+            <a:pPr lvl="1"/>
+            <a:r>
+              <a:rPr/>
+              <a:t>This is for people with Standard or Plus and use Context Aware Access.</a:t>
+            </a:r>
+          </a:p>
+          <a:p>
+            <a:pPr lvl="1"/>
+            <a:r>
+              <a:rPr/>
+              <a:t>Selected apps maintain API access to Google Workspace services even when those services have Context-Aware Access policies that apply to API access. Resources: When adding an app, Assign Context-Aware access levels to apps, Use Cases. image</a:t>
+            </a:r>
+          </a:p>
+          <a:p>
+            <a:pPr lvl="0"/>
+            <a:r>
+              <a:rPr/>
+              <a:t>Q &amp; As from the after party</a:t>
+            </a:r>
+          </a:p>
+          <a:p>
+            <a:pPr lvl="1"/>
+            <a:r>
+              <a:rPr/>
+              <a:t>Slide 1, Slide 2, Slide 3</a:t>
+            </a:r>
+          </a:p>
+        </p:txBody>
+      </p:sp>
+    </p:spTree>
+  </p:cSld>
+</p:sld>
+</file>
+
+<file path=ppt/slides/slide12.xml><?xml version="1.0" encoding="utf-8"?>
+<p:sld xmlns:a="http://schemas.openxmlformats.org/drawingml/2006/main" xmlns:r="http://schemas.openxmlformats.org/officeDocument/2006/relationships" xmlns:p="http://schemas.openxmlformats.org/presentationml/2006/main">
+  <p:cSld>
+    <p:spTree>
+      <p:nvGrpSpPr>
+        <p:cNvPr id="1" name=""/>
+        <p:cNvGrpSpPr/>
+        <p:nvPr/>
+      </p:nvGrpSpPr>
+      <p:grpSpPr>
+        <a:xfrm>
+          <a:off x="0" y="0"/>
+          <a:ext cx="0" cy="0"/>
+          <a:chOff x="0" y="0"/>
+          <a:chExt cx="0" cy="0"/>
+        </a:xfrm>
+      </p:grpSpPr>
+      <p:sp>
+        <p:nvSpPr>
+          <p:cNvPr id="2" name="Title 1"/>
+          <p:cNvSpPr>
+            <a:spLocks noGrp="1"/>
+          </p:cNvSpPr>
+          <p:nvPr>
+            <p:ph type="title"/>
+          </p:nvPr>
+        </p:nvSpPr>
+        <p:spPr/>
+        <p:txBody>
+          <a:bodyPr/>
+          <a:lstStyle/>
+          <a:p>
+            <a:pPr lvl="0" indent="0" marL="0">
+              <a:buNone/>
+            </a:pPr>
+            <a:r>
+              <a:rPr/>
+              <a:t>Pro Tips</a:t>
+            </a:r>
+          </a:p>
+        </p:txBody>
+      </p:sp>
+      <p:sp>
+        <p:nvSpPr>
+          <p:cNvPr id="3" name="Content Placeholder 2"/>
+          <p:cNvSpPr>
+            <a:spLocks noGrp="1"/>
+          </p:cNvSpPr>
+          <p:nvPr>
+            <p:ph idx="1"/>
+          </p:nvPr>
+        </p:nvSpPr>
+        <p:spPr/>
+        <p:txBody>
+          <a:bodyPr/>
+          <a:lstStyle/>
+          <a:p>
+            <a:pPr lvl="0"/>
+            <a:r>
+              <a:rPr/>
+              <a:t>Apps Script function getToken() {</a:t>
+            </a:r>
+            <a:br/>
+            <a:r>
+              <a:rPr/>
+              <a:t>var accessToken = ScriptApp.getOAuthToken(); var url = “https://www.googleapis.com/oauth2/v3/tokeninfo”; var params = { method: “post”, headers: {“Authorization”: “Bearer” + accessToken} }; var res = UrlFetchApp.fetch(url, params).getContentText(); var clientId = JSON.parse(res).azp; Logger.log(clientId) }</a:t>
+            </a:r>
+          </a:p>
+          <a:p>
+            <a:pPr lvl="0"/>
+            <a:r>
+              <a:rPr/>
+              <a:t>When bulk uploading API changes, Google will email the initiator of that change when they are done. Note: it could take hours to complete. One school even had it take a week.</a:t>
+            </a:r>
+          </a:p>
+          <a:p>
+            <a:pPr lvl="1"/>
+            <a:r>
+              <a:rPr/>
+              <a:t>From: The Google Workspace Team </a:t>
+            </a:r>
+            <a:r>
+              <a:rPr>
+                <a:hlinkClick r:id="rId2"/>
+              </a:rPr>
+              <a:t>workspace-noreply@google.com</a:t>
+            </a:r>
+          </a:p>
+          <a:p>
+            <a:pPr lvl="1"/>
+            <a:r>
+              <a:rPr/>
+              <a:t>Subject: Google Admin Alert: Bulk upload report for yourdomain.org</a:t>
+            </a:r>
+          </a:p>
+          <a:p>
+            <a:pPr lvl="0"/>
+            <a:r>
+              <a:rPr/>
+              <a:t>Display a custom message for the blocked app message.</a:t>
+            </a:r>
+          </a:p>
+          <a:p>
+            <a:pPr lvl="1"/>
+            <a:r>
+              <a:rPr/>
+              <a:t>You cannot hyperlink but many schools use a short URL. Security &gt; Access and data control&gt; API Controls &gt; Settings &gt; Custom user message</a:t>
+            </a:r>
+          </a:p>
+          <a:p>
+            <a:pPr lvl="0"/>
+            <a:r>
+              <a:rPr/>
+              <a:t>Check “trust internal apps”. This will avoid issues with accidentally blocking App Script users.</a:t>
+            </a:r>
+          </a:p>
+          <a:p>
+            <a:pPr lvl="1"/>
+            <a:r>
+              <a:rPr/>
+              <a:t>WARNING! By allowing this, it could be security risk</a:t>
+            </a:r>
+          </a:p>
+          <a:p>
+            <a:pPr lvl="1"/>
+            <a:r>
+              <a:rPr/>
+              <a:t>Security &gt; Access and data control&gt; API Controls &gt; Settings &gt; Internal Apps</a:t>
+            </a:r>
+          </a:p>
+          <a:p>
+            <a:pPr lvl="0"/>
+            <a:r>
+              <a:rPr/>
+              <a:t>Google API - Users can view and remove their own Google API connections</a:t>
+            </a:r>
+          </a:p>
+          <a:p>
+            <a:pPr lvl="1"/>
+            <a:r>
+              <a:rPr/>
+              <a:t>A great post on how end users can go into their account and see / manage connections.</a:t>
+            </a:r>
+          </a:p>
+          <a:p>
+            <a:pPr lvl="0"/>
+            <a:r>
+              <a:rPr/>
+              <a:t>When you add an API and choose the root to trust or block, it won’t automatically filter down to any sub org you individually configured and disinherit it from the root.</a:t>
+            </a:r>
+          </a:p>
+          <a:p>
+            <a:pPr lvl="1"/>
+            <a:r>
+              <a:rPr/>
+              <a:t>Directions in this Collab post</a:t>
+            </a:r>
+          </a:p>
+        </p:txBody>
+      </p:sp>
+    </p:spTree>
+  </p:cSld>
+</p:sld>
+</file>
+
+<file path=ppt/slides/slide13.xml><?xml version="1.0" encoding="utf-8"?>
+<p:sld xmlns:a="http://schemas.openxmlformats.org/drawingml/2006/main" xmlns:r="http://schemas.openxmlformats.org/officeDocument/2006/relationships" xmlns:p="http://schemas.openxmlformats.org/presentationml/2006/main">
+  <p:cSld>
+    <p:spTree>
+      <p:nvGrpSpPr>
+        <p:cNvPr id="1" name=""/>
+        <p:cNvGrpSpPr/>
+        <p:nvPr/>
+      </p:nvGrpSpPr>
+      <p:grpSpPr>
+        <a:xfrm>
+          <a:off x="0" y="0"/>
+          <a:ext cx="0" cy="0"/>
+          <a:chOff x="0" y="0"/>
+          <a:chExt cx="0" cy="0"/>
+        </a:xfrm>
+      </p:grpSpPr>
+      <p:sp>
+        <p:nvSpPr>
+          <p:cNvPr id="2" name="Title 1"/>
+          <p:cNvSpPr>
+            <a:spLocks noGrp="1"/>
+          </p:cNvSpPr>
+          <p:nvPr>
+            <p:ph type="title"/>
+          </p:nvPr>
+        </p:nvSpPr>
+        <p:spPr/>
+        <p:txBody>
+          <a:bodyPr/>
+          <a:lstStyle/>
+          <a:p>
+            <a:pPr lvl="0" indent="0" marL="0">
+              <a:buNone/>
+            </a:pPr>
+            <a:r>
+              <a:rPr/>
+              <a:t>Resources</a:t>
+            </a:r>
+          </a:p>
+        </p:txBody>
+      </p:sp>
+      <p:sp>
+        <p:nvSpPr>
+          <p:cNvPr id="3" name="Content Placeholder 2"/>
+          <p:cNvSpPr>
+            <a:spLocks noGrp="1"/>
+          </p:cNvSpPr>
+          <p:nvPr>
+            <p:ph idx="1"/>
+          </p:nvPr>
+        </p:nvSpPr>
+        <p:spPr/>
+        <p:txBody>
+          <a:bodyPr/>
+          <a:lstStyle/>
+          <a:p>
+            <a:pPr lvl="0" indent="0" marL="0">
+              <a:buNone/>
+            </a:pPr>
+            <a:r>
+              <a:rPr/>
+              <a:t>CDW Amplified Help Article: Manage access to unconfigured third-party apps Google Support Page: Manage access to unconfigured third-party apps for users designated as under 18 Google Support Page: Control which third-party &amp; internal apps access Google Workspace data Official Google YouTube Video: Google Workspace for Education Admin Console: How to review third party app access requests</a:t>
+            </a:r>
+          </a:p>
+          <a:p>
+            <a:pPr lvl="0" indent="0" marL="0">
+              <a:spcBef>
+                <a:spcPts val="3000"/>
+              </a:spcBef>
+              <a:buNone/>
+            </a:pPr>
+            <a:r>
+              <a:rPr b="1"/>
+              <a:t>Collaborative Member Resources</a:t>
+            </a:r>
+          </a:p>
+          <a:p>
+            <a:pPr lvl="0" indent="0" marL="0">
+              <a:buNone/>
+            </a:pPr>
+            <a:r>
+              <a:rPr/>
+              <a:t>September 14th Deep Dive Collaborative Deep Dive - Back to School: Unpacking the Upcoming API Control Changes Slide Deck | Timestamps &amp; Summary | Recording</a:t>
+            </a:r>
+          </a:p>
+          <a:p>
+            <a:pPr lvl="0" indent="0" marL="0">
+              <a:buNone/>
+            </a:pPr>
+            <a:r>
+              <a:rPr/>
+              <a:t>Q &amp; A from the live stream</a:t>
+            </a:r>
+          </a:p>
+        </p:txBody>
+      </p:sp>
+    </p:spTree>
+  </p:cSld>
+</p:sld>
+</file>
+
+<file path=ppt/slides/slide14.xml><?xml version="1.0" encoding="utf-8"?>
+<p:sld xmlns:a="http://schemas.openxmlformats.org/drawingml/2006/main" xmlns:r="http://schemas.openxmlformats.org/officeDocument/2006/relationships" xmlns:p="http://schemas.openxmlformats.org/presentationml/2006/main">
+  <p:cSld>
+    <p:spTree>
+      <p:nvGrpSpPr>
+        <p:cNvPr id="1" name=""/>
+        <p:cNvGrpSpPr/>
+        <p:nvPr/>
+      </p:nvGrpSpPr>
+      <p:grpSpPr>
+        <a:xfrm>
+          <a:off x="0" y="0"/>
+          <a:ext cx="0" cy="0"/>
+          <a:chOff x="0" y="0"/>
+          <a:chExt cx="0" cy="0"/>
+        </a:xfrm>
+      </p:grpSpPr>
+      <p:sp>
+        <p:nvSpPr>
+          <p:cNvPr id="2" name="Title 1"/>
+          <p:cNvSpPr>
+            <a:spLocks noGrp="1"/>
+          </p:cNvSpPr>
+          <p:nvPr>
+            <p:ph type="title"/>
+          </p:nvPr>
+        </p:nvSpPr>
+        <p:spPr/>
+        <p:txBody>
+          <a:bodyPr/>
+          <a:lstStyle/>
+          <a:p>
+            <a:pPr lvl="0" indent="0" marL="0">
+              <a:buNone/>
+            </a:pPr>
+            <a:r>
+              <a:rPr/>
+              <a:t>Visual Roadmap</a:t>
+            </a:r>
+          </a:p>
+        </p:txBody>
+      </p:sp>
+      <p:sp>
+        <p:nvSpPr>
+          <p:cNvPr id="3" name="Content Placeholder 2"/>
+          <p:cNvSpPr>
+            <a:spLocks noGrp="1"/>
+          </p:cNvSpPr>
+          <p:nvPr>
+            <p:ph idx="1"/>
+          </p:nvPr>
+        </p:nvSpPr>
+        <p:spPr/>
+        <p:txBody>
+          <a:bodyPr/>
+          <a:lstStyle/>
+          <a:p>
+            <a:pPr lvl="0" indent="0" marL="0">
+              <a:buNone/>
+            </a:pPr>
+            <a:r>
+              <a:rPr/>
+              <a:t>image</a:t>
+            </a:r>
+          </a:p>
+        </p:txBody>
+      </p:sp>
+    </p:spTree>
+  </p:cSld>
+</p:sld>
+</file>
+
 <file path=ppt/slides/slide2.xml><?xml version="1.0" encoding="utf-8"?>
 <p:sld xmlns:a="http://schemas.openxmlformats.org/drawingml/2006/main" xmlns:r="http://schemas.openxmlformats.org/officeDocument/2006/relationships" xmlns:p="http://schemas.openxmlformats.org/presentationml/2006/main">
   <p:cSld>
@@ -3215,44 +3864,11 @@
           <a:lstStyle/>
           <a:p>
             <a:pPr lvl="0" indent="0" marL="0">
-              <a:spcBef>
-                <a:spcPts val="3000"/>
-              </a:spcBef>
               <a:buNone/>
             </a:pPr>
             <a:r>
-              <a:rPr b="1"/>
-              <a:t>What?</a:t>
-            </a:r>
-          </a:p>
-          <a:p>
-            <a:pPr lvl="0" indent="0" marL="0">
-              <a:buNone/>
-            </a:pPr>
-            <a:r>
-              <a:rPr/>
-              <a:t>I’m taking my “one pager” Collaborative Corner about API Controls and migrating it into a single source to allow for multiple types of outputs for multiple types of communication and audiences.</a:t>
-            </a:r>
-          </a:p>
-          <a:p>
-            <a:pPr lvl="0" indent="0" marL="0">
-              <a:spcBef>
-                <a:spcPts val="3000"/>
-              </a:spcBef>
-              <a:buNone/>
-            </a:pPr>
-            <a:r>
-              <a:rPr b="1"/>
-              <a:t>Why?</a:t>
-            </a:r>
-          </a:p>
-          <a:p>
-            <a:pPr lvl="0" indent="0" marL="0">
-              <a:buNone/>
-            </a:pPr>
-            <a:r>
-              <a:rPr/>
-              <a:t>The one pager’s initial purpose was an easy and high level view of API Controls but it has turned into a 10 pager, with lots of information and written in various ways (ie blog post, how to, tutorial)</a:t>
+              <a:rPr/>
+              <a:t>I’m taking my “one pager” Collaborative Corner about API Controls and migrating it into a single source to allow for multiple types of outputs for multiple types of communication and audiences. The one pager’s initial purpose was an easy and high level view of API Controls but it has turned into a 10 pager, with lots of information and written in various ways (ie blog post, how to, tutorial)</a:t>
             </a:r>
           </a:p>
         </p:txBody>
@@ -3299,7 +3915,7 @@
             </a:pPr>
             <a:r>
               <a:rPr/>
-              <a:t>Sections</a:t>
+              <a:t>Summary</a:t>
             </a:r>
           </a:p>
         </p:txBody>
@@ -3319,108 +3935,21 @@
           <a:bodyPr/>
           <a:lstStyle/>
           <a:p>
-            <a:pPr lvl="0"/>
-            <a:r>
-              <a:rPr/>
-              <a:t>Understanding the Latest Updates</a:t>
-            </a:r>
-          </a:p>
-          <a:p>
-            <a:pPr lvl="1"/>
-            <a:r>
-              <a:rPr/>
-              <a:t>Immediate Impact</a:t>
-            </a:r>
-          </a:p>
-          <a:p>
-            <a:pPr lvl="0"/>
-            <a:r>
-              <a:rPr/>
-              <a:t>API Controls Overview</a:t>
-            </a:r>
-          </a:p>
-          <a:p>
-            <a:pPr lvl="1"/>
-            <a:r>
-              <a:rPr/>
-              <a:t>Best Practices</a:t>
-            </a:r>
-          </a:p>
-          <a:p>
-            <a:pPr lvl="0"/>
-            <a:r>
-              <a:rPr/>
-              <a:t>Next Steps: 2 Required Actions before Oct 23rd</a:t>
-            </a:r>
-          </a:p>
-          <a:p>
-            <a:pPr lvl="1"/>
-            <a:r>
-              <a:rPr/>
-              <a:t>Configure a trusted list</a:t>
-            </a:r>
-          </a:p>
-          <a:p>
-            <a:pPr lvl="1"/>
-            <a:r>
-              <a:rPr/>
-              <a:t>Confirm the setting</a:t>
-            </a:r>
-          </a:p>
-          <a:p>
-            <a:pPr lvl="0"/>
-            <a:r>
-              <a:rPr/>
-              <a:t>Creating a trusted list tips</a:t>
-            </a:r>
-          </a:p>
-          <a:p>
-            <a:pPr lvl="0"/>
-            <a:r>
-              <a:rPr/>
-              <a:t>FAQs</a:t>
-            </a:r>
-          </a:p>
-          <a:p>
-            <a:pPr lvl="0"/>
-            <a:r>
-              <a:rPr/>
-              <a:t>Pro Tips</a:t>
-            </a:r>
-          </a:p>
-          <a:p>
-            <a:pPr lvl="1"/>
-            <a:r>
-              <a:rPr/>
-              <a:t>App Script</a:t>
-            </a:r>
-          </a:p>
-          <a:p>
-            <a:pPr lvl="0"/>
-            <a:r>
-              <a:rPr/>
-              <a:t>Resources</a:t>
-            </a:r>
-          </a:p>
-          <a:p>
-            <a:pPr lvl="1"/>
-            <a:r>
-              <a:rPr/>
-              <a:t>Collab Member Resources</a:t>
-            </a:r>
-          </a:p>
-          <a:p>
-            <a:pPr lvl="1"/>
-            <a:r>
-              <a:rPr/>
-              <a:t>Visual Roadmap</a:t>
-            </a:r>
-          </a:p>
-          <a:p>
-            <a:pPr lvl="1"/>
-            <a:r>
-              <a:rPr/>
-              <a:t>Not a Collab member? Try it 45 days for free</a:t>
+            <a:pPr lvl="0" indent="0" marL="0">
+              <a:buNone/>
+            </a:pPr>
+            <a:r>
+              <a:rPr/>
+              <a:t>Hey there, Google Admins! We’re on the cusp of significant shifts in Google’s API control settings for users under 18, set to shake things up this coming October. This is a noteworthy moment, especially for schools that haven’t yet fine-tuned their API Control settings. And for those who think they’re one step ahead, hold on! A slew of fresh updates and changes have already landed in the admin console, causing ripples of impact.</a:t>
+            </a:r>
+          </a:p>
+          <a:p>
+            <a:pPr lvl="0" indent="0" marL="0">
+              <a:buNone/>
+            </a:pPr>
+            <a:r>
+              <a:rPr/>
+              <a:t>With the flurry of updates to the API Controls section in the admin console over the past couple of years, it’s time to take a breather and review the API controls, nail down best practices, identify necessary actions, and map out the route to get there.</a:t>
             </a:r>
           </a:p>
         </p:txBody>
@@ -3467,7 +3996,7 @@
             </a:pPr>
             <a:r>
               <a:rPr/>
-              <a:t>Summary</a:t>
+              <a:t>TL;DR</a:t>
             </a:r>
           </a:p>
         </p:txBody>
@@ -3492,7 +4021,7 @@
             </a:pPr>
             <a:r>
               <a:rPr/>
-              <a:t>Hey there, Google Admins! We’re on the cusp of significant shifts in Google’s API control settings for users under 18, set to shake things up this coming October. This is a noteworthy moment, especially for schools that haven’t yet fine-tuned their API Control settings. And for those who think they’re one step ahead, hold on! A slew of fresh updates and changes have already landed in the admin console, causing ripples of impact.</a:t>
+              <a:t>Google is pushing us towards a Trusted List approach for OAuth Apps, which will be implemented in October. Google Admins need to set up the trusted list and confirm settings before then.</a:t>
             </a:r>
           </a:p>
           <a:p>
@@ -3501,7 +4030,7 @@
             </a:pPr>
             <a:r>
               <a:rPr/>
-              <a:t>With the flurry of updates to the API Controls section in the admin console over the past couple of years, it’s time to take a breather and review the API controls, nail down best practices, identify necessary actions, and map out the route to get there.</a:t>
+              <a:t>image</a:t>
             </a:r>
           </a:p>
         </p:txBody>
@@ -3548,7 +4077,7 @@
             </a:pPr>
             <a:r>
               <a:rPr/>
-              <a:t>TL;DR</a:t>
+              <a:t>Understanding the Latest Updates</a:t>
             </a:r>
           </a:p>
         </p:txBody>
@@ -3573,7 +4102,550 @@
             </a:pPr>
             <a:r>
               <a:rPr/>
-              <a:t>Google is pushing us towards a Trusted List approach for OAuth Apps, which will be implemented in October. Google Admins need to set up the trusted list and confirm settings before then.</a:t>
+              <a:t>Google notified primary admins on June 19th, 2023, announcing new API Controls, changes in behavior for users under 18 regarding their access to third-party apps, and a requirement to review and confirm access settings to third-party apps by Oct. 23rd, 2023.</a:t>
+            </a:r>
+          </a:p>
+          <a:p>
+            <a:pPr lvl="0" indent="0" marL="0">
+              <a:buNone/>
+            </a:pPr>
+            <a:r>
+              <a:rPr/>
+              <a:t>Takeaway: Google is making domains go to an OAuth App “Trusted List” for under 18 before Oct. 23rd, 2023 or students will lose access to OAuth apps. Read the full email here.</a:t>
+            </a:r>
+          </a:p>
+          <a:p>
+            <a:pPr lvl="0" indent="0" marL="0">
+              <a:spcBef>
+                <a:spcPts val="3000"/>
+              </a:spcBef>
+              <a:buNone/>
+            </a:pPr>
+            <a:r>
+              <a:rPr b="1"/>
+              <a:t>Immediate Impact</a:t>
+            </a:r>
+          </a:p>
+          <a:p>
+            <a:pPr lvl="0"/>
+            <a:r>
+              <a:rPr/>
+              <a:t>Previously accessed apps should not be affected until October 23rd. Google has “configured” previously accessed apps from under 18 as limited.</a:t>
+            </a:r>
+          </a:p>
+          <a:p>
+            <a:pPr lvl="1"/>
+            <a:r>
+              <a:rPr/>
+              <a:t>This is why you are seeing a lot more “configured apps”</a:t>
+            </a:r>
+          </a:p>
+          <a:p>
+            <a:pPr lvl="0"/>
+            <a:r>
+              <a:rPr/>
+              <a:t>Any “new” app ca not be accessed by under 18 and the user can “Request” the app.</a:t>
+            </a:r>
+          </a:p>
+          <a:p>
+            <a:pPr lvl="1"/>
+            <a:r>
+              <a:rPr/>
+              <a:t>This is why you’re seeing requests (from students)</a:t>
+            </a:r>
+          </a:p>
+          <a:p>
+            <a:pPr lvl="0" indent="0" marL="0">
+              <a:buNone/>
+            </a:pPr>
+            <a:r>
+              <a:rPr/>
+              <a:t>image</a:t>
+            </a:r>
+          </a:p>
+          <a:p>
+            <a:pPr lvl="0" indent="0" marL="0">
+              <a:buNone/>
+            </a:pPr>
+            <a:r>
+              <a:rPr/>
+              <a:t>It’s like Google did the “Stop the bleed” approach for students for you.</a:t>
+            </a:r>
+          </a:p>
+        </p:txBody>
+      </p:sp>
+    </p:spTree>
+  </p:cSld>
+</p:sld>
+</file>
+
+<file path=ppt/slides/slide6.xml><?xml version="1.0" encoding="utf-8"?>
+<p:sld xmlns:a="http://schemas.openxmlformats.org/drawingml/2006/main" xmlns:r="http://schemas.openxmlformats.org/officeDocument/2006/relationships" xmlns:p="http://schemas.openxmlformats.org/presentationml/2006/main">
+  <p:cSld>
+    <p:spTree>
+      <p:nvGrpSpPr>
+        <p:cNvPr id="1" name=""/>
+        <p:cNvGrpSpPr/>
+        <p:nvPr/>
+      </p:nvGrpSpPr>
+      <p:grpSpPr>
+        <a:xfrm>
+          <a:off x="0" y="0"/>
+          <a:ext cx="0" cy="0"/>
+          <a:chOff x="0" y="0"/>
+          <a:chExt cx="0" cy="0"/>
+        </a:xfrm>
+      </p:grpSpPr>
+      <p:sp>
+        <p:nvSpPr>
+          <p:cNvPr id="2" name="Title 1"/>
+          <p:cNvSpPr>
+            <a:spLocks noGrp="1"/>
+          </p:cNvSpPr>
+          <p:nvPr>
+            <p:ph type="title"/>
+          </p:nvPr>
+        </p:nvSpPr>
+        <p:spPr/>
+        <p:txBody>
+          <a:bodyPr/>
+          <a:lstStyle/>
+          <a:p>
+            <a:pPr lvl="0" indent="0" marL="0">
+              <a:buNone/>
+            </a:pPr>
+            <a:r>
+              <a:rPr/>
+              <a:t>API Controls: Overview and Best Practices</a:t>
+            </a:r>
+          </a:p>
+        </p:txBody>
+      </p:sp>
+      <p:sp>
+        <p:nvSpPr>
+          <p:cNvPr id="3" name="Content Placeholder 2"/>
+          <p:cNvSpPr>
+            <a:spLocks noGrp="1"/>
+          </p:cNvSpPr>
+          <p:nvPr>
+            <p:ph idx="1"/>
+          </p:nvPr>
+        </p:nvSpPr>
+        <p:spPr/>
+        <p:txBody>
+          <a:bodyPr/>
+          <a:lstStyle/>
+          <a:p>
+            <a:pPr lvl="0" indent="0" marL="0">
+              <a:spcBef>
+                <a:spcPts val="3000"/>
+              </a:spcBef>
+              <a:buNone/>
+            </a:pPr>
+            <a:r>
+              <a:rPr b="1"/>
+              <a:t>Overview</a:t>
+            </a:r>
+          </a:p>
+          <a:p>
+            <a:pPr lvl="0" indent="0" marL="0">
+              <a:buNone/>
+            </a:pPr>
+            <a:r>
+              <a:rPr/>
+              <a:t>When users sign in to third-party apps using the “Sign in with Google” option (single sign-on), you can control how those third-party apps access your organization’s Google data. Support Page</a:t>
+            </a:r>
+          </a:p>
+          <a:p>
+            <a:pPr lvl="0" indent="0" marL="0">
+              <a:buNone/>
+            </a:pPr>
+            <a:r>
+              <a:rPr/>
+              <a:t>API Controls Section: Security &gt; Access and data controls &gt; API Controls</a:t>
+            </a:r>
+          </a:p>
+          <a:p>
+            <a:pPr lvl="0" indent="0" marL="0">
+              <a:buNone/>
+            </a:pPr>
+            <a:r>
+              <a:rPr/>
+              <a:t>Image here</a:t>
+            </a:r>
+          </a:p>
+          <a:p>
+            <a:pPr lvl="0" indent="0" marL="0">
+              <a:buNone/>
+            </a:pPr>
+            <a:r>
+              <a:rPr/>
+              <a:t>Manage Third Party Apps: Security &gt; Access and data controls &gt; API Controls &gt; Manage Third-Party Apps</a:t>
+            </a:r>
+          </a:p>
+          <a:p>
+            <a:pPr lvl="0" indent="0" marL="0">
+              <a:buNone/>
+            </a:pPr>
+            <a:r>
+              <a:rPr/>
+              <a:t>Image here</a:t>
+            </a:r>
+          </a:p>
+          <a:p>
+            <a:pPr lvl="0" indent="0" marL="0">
+              <a:spcBef>
+                <a:spcPts val="3000"/>
+              </a:spcBef>
+              <a:buNone/>
+            </a:pPr>
+            <a:r>
+              <a:rPr b="1"/>
+              <a:t>Best Practices</a:t>
+            </a:r>
+          </a:p>
+          <a:p>
+            <a:pPr lvl="0" indent="0" marL="0">
+              <a:buNone/>
+            </a:pPr>
+            <a:r>
+              <a:rPr/>
+              <a:t>Students: (Default) Don’t allow users to access any third-party apps</a:t>
+            </a:r>
+          </a:p>
+          <a:p>
+            <a:pPr lvl="0" indent="0" marL="0">
+              <a:buNone/>
+            </a:pPr>
+            <a:r>
+              <a:rPr/>
+              <a:t>image</a:t>
+            </a:r>
+          </a:p>
+          <a:p>
+            <a:pPr lvl="0" indent="0" marL="0">
+              <a:buNone/>
+            </a:pPr>
+            <a:r>
+              <a:rPr/>
+              <a:t>Staff: This needs to be discussed by the school. Be consistent with your other app policies. It’s best to lean towards a more controlled app approval process.</a:t>
+            </a:r>
+          </a:p>
+          <a:p>
+            <a:pPr lvl="0" indent="0" marL="0">
+              <a:buNone/>
+            </a:pPr>
+            <a:r>
+              <a:rPr/>
+              <a:t>image</a:t>
+            </a:r>
+          </a:p>
+        </p:txBody>
+      </p:sp>
+    </p:spTree>
+  </p:cSld>
+</p:sld>
+</file>
+
+<file path=ppt/slides/slide7.xml><?xml version="1.0" encoding="utf-8"?>
+<p:sld xmlns:a="http://schemas.openxmlformats.org/drawingml/2006/main" xmlns:r="http://schemas.openxmlformats.org/officeDocument/2006/relationships" xmlns:p="http://schemas.openxmlformats.org/presentationml/2006/main">
+  <p:cSld>
+    <p:spTree>
+      <p:nvGrpSpPr>
+        <p:cNvPr id="1" name=""/>
+        <p:cNvGrpSpPr/>
+        <p:nvPr/>
+      </p:nvGrpSpPr>
+      <p:grpSpPr>
+        <a:xfrm>
+          <a:off x="0" y="0"/>
+          <a:ext cx="0" cy="0"/>
+          <a:chOff x="0" y="0"/>
+          <a:chExt cx="0" cy="0"/>
+        </a:xfrm>
+      </p:grpSpPr>
+      <p:sp>
+        <p:nvSpPr>
+          <p:cNvPr id="2" name="Title 1"/>
+          <p:cNvSpPr>
+            <a:spLocks noGrp="1"/>
+          </p:cNvSpPr>
+          <p:nvPr>
+            <p:ph type="title"/>
+          </p:nvPr>
+        </p:nvSpPr>
+        <p:spPr/>
+        <p:txBody>
+          <a:bodyPr/>
+          <a:lstStyle/>
+          <a:p>
+            <a:pPr lvl="0" indent="0" marL="0">
+              <a:buNone/>
+            </a:pPr>
+            <a:r>
+              <a:rPr/>
+              <a:t>Next Steps: 2 Required Action before Oct 23rd</a:t>
+            </a:r>
+          </a:p>
+        </p:txBody>
+      </p:sp>
+      <p:sp>
+        <p:nvSpPr>
+          <p:cNvPr id="3" name="Content Placeholder 2"/>
+          <p:cNvSpPr>
+            <a:spLocks noGrp="1"/>
+          </p:cNvSpPr>
+          <p:nvPr>
+            <p:ph idx="1"/>
+          </p:nvPr>
+        </p:nvSpPr>
+        <p:spPr/>
+        <p:txBody>
+          <a:bodyPr/>
+          <a:lstStyle/>
+          <a:p>
+            <a:pPr lvl="0" indent="0" marL="0">
+              <a:buNone/>
+            </a:pPr>
+            <a:r>
+              <a:rPr/>
+              <a:t>The process boils down to two actions: Configure and Confirm.</a:t>
+            </a:r>
+          </a:p>
+          <a:p>
+            <a:pPr lvl="0" indent="0" marL="0">
+              <a:buNone/>
+            </a:pPr>
+            <a:r>
+              <a:rPr/>
+              <a:t>image image</a:t>
+            </a:r>
+          </a:p>
+        </p:txBody>
+      </p:sp>
+    </p:spTree>
+  </p:cSld>
+</p:sld>
+</file>
+
+<file path=ppt/slides/slide8.xml><?xml version="1.0" encoding="utf-8"?>
+<p:sld xmlns:a="http://schemas.openxmlformats.org/drawingml/2006/main" xmlns:r="http://schemas.openxmlformats.org/officeDocument/2006/relationships" xmlns:p="http://schemas.openxmlformats.org/presentationml/2006/main">
+  <p:cSld>
+    <p:spTree>
+      <p:nvGrpSpPr>
+        <p:cNvPr id="1" name=""/>
+        <p:cNvGrpSpPr/>
+        <p:nvPr/>
+      </p:nvGrpSpPr>
+      <p:grpSpPr>
+        <a:xfrm>
+          <a:off x="0" y="0"/>
+          <a:ext cx="0" cy="0"/>
+          <a:chOff x="0" y="0"/>
+          <a:chExt cx="0" cy="0"/>
+        </a:xfrm>
+      </p:grpSpPr>
+      <p:sp>
+        <p:nvSpPr>
+          <p:cNvPr id="2" name="Title 1"/>
+          <p:cNvSpPr>
+            <a:spLocks noGrp="1"/>
+          </p:cNvSpPr>
+          <p:nvPr>
+            <p:ph type="title"/>
+          </p:nvPr>
+        </p:nvSpPr>
+        <p:spPr/>
+        <p:txBody>
+          <a:bodyPr/>
+          <a:lstStyle/>
+          <a:p>
+            <a:pPr lvl="0" indent="0" marL="0">
+              <a:buNone/>
+            </a:pPr>
+            <a:r>
+              <a:rPr/>
+              <a:t>Configure a trusted list of OAuth apps</a:t>
+            </a:r>
+          </a:p>
+        </p:txBody>
+      </p:sp>
+      <p:sp>
+        <p:nvSpPr>
+          <p:cNvPr id="3" name="Content Placeholder 2"/>
+          <p:cNvSpPr>
+            <a:spLocks noGrp="1"/>
+          </p:cNvSpPr>
+          <p:nvPr>
+            <p:ph idx="1"/>
+          </p:nvPr>
+        </p:nvSpPr>
+        <p:spPr/>
+        <p:txBody>
+          <a:bodyPr/>
+          <a:lstStyle/>
+          <a:p>
+            <a:pPr lvl="0" indent="0" marL="0">
+              <a:buNone/>
+            </a:pPr>
+            <a:r>
+              <a:rPr/>
+              <a:t>This is a significant task as most schools see hundreds and thousands of accessed apps. Here are the steps:</a:t>
+            </a:r>
+          </a:p>
+          <a:p>
+            <a:pPr lvl="0"/>
+            <a:r>
+              <a:rPr/>
+              <a:t>To go towards a Trusted List approach for users</a:t>
+            </a:r>
+          </a:p>
+          <a:p>
+            <a:pPr lvl="1"/>
+            <a:r>
+              <a:rPr/>
+              <a:t>Go through the configured apps (marked as “limited”) and trust or block them. (remember, Google “configured” previously accessed apps for under 18 as limited)</a:t>
+            </a:r>
+          </a:p>
+          <a:p>
+            <a:pPr lvl="1"/>
+            <a:r>
+              <a:rPr/>
+              <a:t>Figure out how to handle the incoming app requests.</a:t>
+            </a:r>
+          </a:p>
+          <a:p>
+            <a:pPr lvl="1"/>
+            <a:r>
+              <a:rPr/>
+              <a:t>Look at all of the rest of the accessed apps and create our trusted list for the rest of our users. (this would be addressing the trusted list for over 18)</a:t>
+            </a:r>
+          </a:p>
+          <a:p>
+            <a:pPr lvl="0"/>
+            <a:r>
+              <a:rPr/>
+              <a:t>Ways to “approve” apps</a:t>
+            </a:r>
+          </a:p>
+          <a:p>
+            <a:pPr lvl="1"/>
+            <a:r>
+              <a:rPr/>
+              <a:t>You can trust one by one, or a couple by couple by going into your configured or accessed app list from within the admin console. [image below]</a:t>
+            </a:r>
+          </a:p>
+          <a:p>
+            <a:pPr lvl="1"/>
+            <a:r>
+              <a:rPr/>
+              <a:t>You could “add an app” and trust.</a:t>
+            </a:r>
+          </a:p>
+          <a:p>
+            <a:pPr lvl="1"/>
+            <a:r>
+              <a:rPr/>
+              <a:t>Recommended: You can download the accessed apps list, bulk change access in a sheet, then bulk upload. [image below]</a:t>
+            </a:r>
+          </a:p>
+          <a:p>
+            <a:pPr lvl="0" indent="0" marL="0">
+              <a:buNone/>
+            </a:pPr>
+            <a:r>
+              <a:rPr/>
+              <a:t>image</a:t>
+            </a:r>
+          </a:p>
+          <a:p>
+            <a:pPr lvl="0" indent="0" marL="0">
+              <a:buNone/>
+            </a:pPr>
+            <a:r>
+              <a:rPr/>
+              <a:t>image</a:t>
+            </a:r>
+          </a:p>
+        </p:txBody>
+      </p:sp>
+    </p:spTree>
+  </p:cSld>
+</p:sld>
+</file>
+
+<file path=ppt/slides/slide9.xml><?xml version="1.0" encoding="utf-8"?>
+<p:sld xmlns:a="http://schemas.openxmlformats.org/drawingml/2006/main" xmlns:r="http://schemas.openxmlformats.org/officeDocument/2006/relationships" xmlns:p="http://schemas.openxmlformats.org/presentationml/2006/main">
+  <p:cSld>
+    <p:spTree>
+      <p:nvGrpSpPr>
+        <p:cNvPr id="1" name=""/>
+        <p:cNvGrpSpPr/>
+        <p:nvPr/>
+      </p:nvGrpSpPr>
+      <p:grpSpPr>
+        <a:xfrm>
+          <a:off x="0" y="0"/>
+          <a:ext cx="0" cy="0"/>
+          <a:chOff x="0" y="0"/>
+          <a:chExt cx="0" cy="0"/>
+        </a:xfrm>
+      </p:grpSpPr>
+      <p:sp>
+        <p:nvSpPr>
+          <p:cNvPr id="2" name="Title 1"/>
+          <p:cNvSpPr>
+            <a:spLocks noGrp="1"/>
+          </p:cNvSpPr>
+          <p:nvPr>
+            <p:ph type="title"/>
+          </p:nvPr>
+        </p:nvSpPr>
+        <p:spPr/>
+        <p:txBody>
+          <a:bodyPr/>
+          <a:lstStyle/>
+          <a:p>
+            <a:pPr lvl="0" indent="0" marL="0">
+              <a:buNone/>
+            </a:pPr>
+            <a:r>
+              <a:rPr/>
+              <a:t>Confirm setting before October 23rd</a:t>
+            </a:r>
+          </a:p>
+        </p:txBody>
+      </p:sp>
+      <p:sp>
+        <p:nvSpPr>
+          <p:cNvPr id="3" name="Content Placeholder 2"/>
+          <p:cNvSpPr>
+            <a:spLocks noGrp="1"/>
+          </p:cNvSpPr>
+          <p:nvPr>
+            <p:ph idx="1"/>
+          </p:nvPr>
+        </p:nvSpPr>
+        <p:spPr/>
+        <p:txBody>
+          <a:bodyPr/>
+          <a:lstStyle/>
+          <a:p>
+            <a:pPr lvl="0" indent="0" marL="0">
+              <a:buNone/>
+            </a:pPr>
+            <a:r>
+              <a:rPr/>
+              <a:t>This is the Guided Stepper Think of this as you signing off with “parental/guardian consent” YouTube video of this process.</a:t>
+            </a:r>
+          </a:p>
+          <a:p>
+            <a:pPr lvl="0" indent="0" marL="0">
+              <a:buNone/>
+            </a:pPr>
+            <a:r>
+              <a:rPr/>
+              <a:t>image</a:t>
             </a:r>
           </a:p>
         </p:txBody>

</xml_diff>

<commit_message>
Images, files, navbar, content
</commit_message>
<xml_diff>
--- a/docs/index.pptx
+++ b/docs/index.pptx
@@ -15,10 +15,6 @@
     <p:sldId id="263" r:id="rId9"/>
     <p:sldId id="264" r:id="rId10"/>
     <p:sldId id="265" r:id="rId11"/>
-    <p:sldId id="266" r:id="rId12"/>
-    <p:sldId id="267" r:id="rId13"/>
-    <p:sldId id="268" r:id="rId14"/>
-    <p:sldId id="269" r:id="rId15"/>
   </p:sldIdLst>
   <p:sldSz cx="9144000" cy="5143500" type="screen16x9"/>
   <p:notesSz cx="6858000" cy="9144000"/>
@@ -3203,7 +3199,7 @@
             </a:pPr>
             <a:r>
               <a:rPr/>
-              <a:t>Creating a trusted list tips</a:t>
+              <a:t>Visual Roadmap</a:t>
             </a:r>
           </a:p>
         </p:txBody>
@@ -3223,580 +3219,12 @@
           <a:bodyPr/>
           <a:lstStyle/>
           <a:p>
-            <a:pPr lvl="0"/>
-            <a:r>
-              <a:rPr/>
-              <a:t>Check out the September 14th Deep Dive on this</a:t>
-            </a:r>
-          </a:p>
-          <a:p>
-            <a:pPr lvl="1"/>
-            <a:r>
-              <a:rPr/>
-              <a:t>Slide deck - slides</a:t>
-            </a:r>
-          </a:p>
-          <a:p>
-            <a:pPr lvl="1"/>
-            <a:r>
-              <a:rPr/>
-              <a:t>Recording</a:t>
-            </a:r>
-          </a:p>
-        </p:txBody>
-      </p:sp>
-    </p:spTree>
-  </p:cSld>
-</p:sld>
-</file>
-
-<file path=ppt/slides/slide11.xml><?xml version="1.0" encoding="utf-8"?>
-<p:sld xmlns:a="http://schemas.openxmlformats.org/drawingml/2006/main" xmlns:r="http://schemas.openxmlformats.org/officeDocument/2006/relationships" xmlns:p="http://schemas.openxmlformats.org/presentationml/2006/main">
-  <p:cSld>
-    <p:spTree>
-      <p:nvGrpSpPr>
-        <p:cNvPr id="1" name=""/>
-        <p:cNvGrpSpPr/>
-        <p:nvPr/>
-      </p:nvGrpSpPr>
-      <p:grpSpPr>
-        <a:xfrm>
-          <a:off x="0" y="0"/>
-          <a:ext cx="0" cy="0"/>
-          <a:chOff x="0" y="0"/>
-          <a:chExt cx="0" cy="0"/>
-        </a:xfrm>
-      </p:grpSpPr>
-      <p:sp>
-        <p:nvSpPr>
-          <p:cNvPr id="2" name="Title 1"/>
-          <p:cNvSpPr>
-            <a:spLocks noGrp="1"/>
-          </p:cNvSpPr>
-          <p:nvPr>
-            <p:ph type="title"/>
-          </p:nvPr>
-        </p:nvSpPr>
-        <p:spPr/>
-        <p:txBody>
-          <a:bodyPr/>
-          <a:lstStyle/>
-          <a:p>
             <a:pPr lvl="0" indent="0" marL="0">
               <a:buNone/>
             </a:pPr>
             <a:r>
               <a:rPr/>
-              <a:t>FAQ</a:t>
-            </a:r>
-          </a:p>
-        </p:txBody>
-      </p:sp>
-      <p:sp>
-        <p:nvSpPr>
-          <p:cNvPr id="3" name="Content Placeholder 2"/>
-          <p:cNvSpPr>
-            <a:spLocks noGrp="1"/>
-          </p:cNvSpPr>
-          <p:nvPr>
-            <p:ph idx="1"/>
-          </p:nvPr>
-        </p:nvSpPr>
-        <p:spPr/>
-        <p:txBody>
-          <a:bodyPr/>
-          <a:lstStyle/>
-          <a:p>
-            <a:pPr lvl="0"/>
-            <a:r>
-              <a:rPr/>
-              <a:t>Is there a maximum of configured apps?</a:t>
-            </a:r>
-          </a:p>
-          <a:p>
-            <a:pPr lvl="1"/>
-            <a:r>
-              <a:rPr/>
-              <a:t>Yes, 15,000. We are in talks with Google about this</a:t>
-            </a:r>
-          </a:p>
-          <a:p>
-            <a:pPr lvl="0"/>
-            <a:r>
-              <a:rPr/>
-              <a:t>Can I unconfigure an app?</a:t>
-            </a:r>
-          </a:p>
-          <a:p>
-            <a:pPr lvl="1"/>
-            <a:r>
-              <a:rPr/>
-              <a:t>It does not appear like you can truly “unconfigure” an app. We are talking to Google about this.</a:t>
-            </a:r>
-          </a:p>
-          <a:p>
-            <a:pPr lvl="0"/>
-            <a:r>
-              <a:rPr/>
-              <a:t>I’m having issues with the iPhone native mail and calendar apps when I’m blocking APIs</a:t>
-            </a:r>
-          </a:p>
-          <a:p>
-            <a:pPr lvl="1"/>
-            <a:r>
-              <a:rPr/>
-              <a:t>This is the full App ID for iOS in my console: 450232826690-0rm6bs9d2fps9tifvk2oodh3tasd7vl7.apps.googleusercontent.com.</a:t>
-            </a:r>
-          </a:p>
-          <a:p>
-            <a:pPr lvl="0"/>
-            <a:r>
-              <a:rPr/>
-              <a:t>Can we disable the ability for students to “Request apps”?</a:t>
-            </a:r>
-          </a:p>
-          <a:p>
-            <a:pPr lvl="1"/>
-            <a:r>
-              <a:rPr/>
-              <a:t>No. But it is something we will talk about internally to see if there is a work around.</a:t>
-            </a:r>
-          </a:p>
-          <a:p>
-            <a:pPr lvl="1"/>
-            <a:r>
-              <a:rPr/>
-              <a:t>We asked Google and it’s “in the works”.</a:t>
-            </a:r>
-          </a:p>
-          <a:p>
-            <a:pPr lvl="0"/>
-            <a:r>
-              <a:rPr/>
-              <a:t>Can staff request apps like students?</a:t>
-            </a:r>
-          </a:p>
-          <a:p>
-            <a:pPr lvl="1"/>
-            <a:r>
-              <a:rPr/>
-              <a:t>No. Only under 18 can request. We are asking Google. Most likely a temp thing. (hopefully)</a:t>
-            </a:r>
-          </a:p>
-          <a:p>
-            <a:pPr lvl="0"/>
-            <a:r>
-              <a:rPr/>
-              <a:t>Where does that “request” go (when students request access to an app)?</a:t>
-            </a:r>
-          </a:p>
-          <a:p>
-            <a:pPr lvl="1"/>
-            <a:r>
-              <a:rPr/>
-              <a:t>Admin Console Dashboard &gt; App access control card</a:t>
-            </a:r>
-          </a:p>
-          <a:p>
-            <a:pPr lvl="1"/>
-            <a:r>
-              <a:rPr/>
-              <a:t>Security &gt; API Controls &gt; App Access Control &gt; Manage Third-Party App Access. Then it’s the middle box across the top that says “Apps pending review”.</a:t>
-            </a:r>
-          </a:p>
-          <a:p>
-            <a:pPr lvl="0"/>
-            <a:r>
-              <a:rPr/>
-              <a:t>Can we see “who” requested the app? Can we get alerted?</a:t>
-            </a:r>
-          </a:p>
-          <a:p>
-            <a:pPr lvl="1"/>
-            <a:r>
-              <a:rPr/>
-              <a:t>Under Reporting &gt; Audit and investigation &gt; OAuth log events. Then add the condition “Event is Request”.</a:t>
-            </a:r>
-          </a:p>
-          <a:p>
-            <a:pPr lvl="1"/>
-            <a:r>
-              <a:rPr/>
-              <a:t>Yes, by creating a Custom Rule: With the previous navigation then click on “Create activity rule” or “Reporting Rule” (depending on your edition). It will walk you through creating a rule (alert) where you can have it get sent to the Alert Center and email people.</a:t>
-            </a:r>
-          </a:p>
-          <a:p>
-            <a:pPr lvl="0"/>
-            <a:r>
-              <a:rPr/>
-              <a:t>Can you explain the API Block-Exempt option when trusting an app?</a:t>
-            </a:r>
-          </a:p>
-          <a:p>
-            <a:pPr lvl="1"/>
-            <a:r>
-              <a:rPr/>
-              <a:t>This is for people with Standard or Plus and use Context Aware Access.</a:t>
-            </a:r>
-          </a:p>
-          <a:p>
-            <a:pPr lvl="1"/>
-            <a:r>
-              <a:rPr/>
-              <a:t>Selected apps maintain API access to Google Workspace services even when those services have Context-Aware Access policies that apply to API access. Resources: When adding an app, Assign Context-Aware access levels to apps, Use Cases. image</a:t>
-            </a:r>
-          </a:p>
-          <a:p>
-            <a:pPr lvl="0"/>
-            <a:r>
-              <a:rPr/>
-              <a:t>Q &amp; As from the after party</a:t>
-            </a:r>
-          </a:p>
-          <a:p>
-            <a:pPr lvl="1"/>
-            <a:r>
-              <a:rPr/>
-              <a:t>Slide 1, Slide 2, Slide 3</a:t>
-            </a:r>
-          </a:p>
-        </p:txBody>
-      </p:sp>
-    </p:spTree>
-  </p:cSld>
-</p:sld>
-</file>
-
-<file path=ppt/slides/slide12.xml><?xml version="1.0" encoding="utf-8"?>
-<p:sld xmlns:a="http://schemas.openxmlformats.org/drawingml/2006/main" xmlns:r="http://schemas.openxmlformats.org/officeDocument/2006/relationships" xmlns:p="http://schemas.openxmlformats.org/presentationml/2006/main">
-  <p:cSld>
-    <p:spTree>
-      <p:nvGrpSpPr>
-        <p:cNvPr id="1" name=""/>
-        <p:cNvGrpSpPr/>
-        <p:nvPr/>
-      </p:nvGrpSpPr>
-      <p:grpSpPr>
-        <a:xfrm>
-          <a:off x="0" y="0"/>
-          <a:ext cx="0" cy="0"/>
-          <a:chOff x="0" y="0"/>
-          <a:chExt cx="0" cy="0"/>
-        </a:xfrm>
-      </p:grpSpPr>
-      <p:sp>
-        <p:nvSpPr>
-          <p:cNvPr id="2" name="Title 1"/>
-          <p:cNvSpPr>
-            <a:spLocks noGrp="1"/>
-          </p:cNvSpPr>
-          <p:nvPr>
-            <p:ph type="title"/>
-          </p:nvPr>
-        </p:nvSpPr>
-        <p:spPr/>
-        <p:txBody>
-          <a:bodyPr/>
-          <a:lstStyle/>
-          <a:p>
-            <a:pPr lvl="0" indent="0" marL="0">
-              <a:buNone/>
-            </a:pPr>
-            <a:r>
-              <a:rPr/>
-              <a:t>Pro Tips</a:t>
-            </a:r>
-          </a:p>
-        </p:txBody>
-      </p:sp>
-      <p:sp>
-        <p:nvSpPr>
-          <p:cNvPr id="3" name="Content Placeholder 2"/>
-          <p:cNvSpPr>
-            <a:spLocks noGrp="1"/>
-          </p:cNvSpPr>
-          <p:nvPr>
-            <p:ph idx="1"/>
-          </p:nvPr>
-        </p:nvSpPr>
-        <p:spPr/>
-        <p:txBody>
-          <a:bodyPr/>
-          <a:lstStyle/>
-          <a:p>
-            <a:pPr lvl="0"/>
-            <a:r>
-              <a:rPr/>
-              <a:t>Apps Script function getToken() {</a:t>
-            </a:r>
-            <a:br/>
-            <a:r>
-              <a:rPr/>
-              <a:t>var accessToken = ScriptApp.getOAuthToken(); var url = “https://www.googleapis.com/oauth2/v3/tokeninfo”; var params = { method: “post”, headers: {“Authorization”: “Bearer” + accessToken} }; var res = UrlFetchApp.fetch(url, params).getContentText(); var clientId = JSON.parse(res).azp; Logger.log(clientId) }</a:t>
-            </a:r>
-          </a:p>
-          <a:p>
-            <a:pPr lvl="0"/>
-            <a:r>
-              <a:rPr/>
-              <a:t>When bulk uploading API changes, Google will email the initiator of that change when they are done. Note: it could take hours to complete. One school even had it take a week.</a:t>
-            </a:r>
-          </a:p>
-          <a:p>
-            <a:pPr lvl="1"/>
-            <a:r>
-              <a:rPr/>
-              <a:t>From: The Google Workspace Team </a:t>
-            </a:r>
-            <a:r>
-              <a:rPr>
-                <a:hlinkClick r:id="rId2"/>
-              </a:rPr>
-              <a:t>workspace-noreply@google.com</a:t>
-            </a:r>
-          </a:p>
-          <a:p>
-            <a:pPr lvl="1"/>
-            <a:r>
-              <a:rPr/>
-              <a:t>Subject: Google Admin Alert: Bulk upload report for yourdomain.org</a:t>
-            </a:r>
-          </a:p>
-          <a:p>
-            <a:pPr lvl="0"/>
-            <a:r>
-              <a:rPr/>
-              <a:t>Display a custom message for the blocked app message.</a:t>
-            </a:r>
-          </a:p>
-          <a:p>
-            <a:pPr lvl="1"/>
-            <a:r>
-              <a:rPr/>
-              <a:t>You cannot hyperlink but many schools use a short URL. Security &gt; Access and data control&gt; API Controls &gt; Settings &gt; Custom user message</a:t>
-            </a:r>
-          </a:p>
-          <a:p>
-            <a:pPr lvl="0"/>
-            <a:r>
-              <a:rPr/>
-              <a:t>Check “trust internal apps”. This will avoid issues with accidentally blocking App Script users.</a:t>
-            </a:r>
-          </a:p>
-          <a:p>
-            <a:pPr lvl="1"/>
-            <a:r>
-              <a:rPr/>
-              <a:t>WARNING! By allowing this, it could be security risk</a:t>
-            </a:r>
-          </a:p>
-          <a:p>
-            <a:pPr lvl="1"/>
-            <a:r>
-              <a:rPr/>
-              <a:t>Security &gt; Access and data control&gt; API Controls &gt; Settings &gt; Internal Apps</a:t>
-            </a:r>
-          </a:p>
-          <a:p>
-            <a:pPr lvl="0"/>
-            <a:r>
-              <a:rPr/>
-              <a:t>Google API - Users can view and remove their own Google API connections</a:t>
-            </a:r>
-          </a:p>
-          <a:p>
-            <a:pPr lvl="1"/>
-            <a:r>
-              <a:rPr/>
-              <a:t>A great post on how end users can go into their account and see / manage connections.</a:t>
-            </a:r>
-          </a:p>
-          <a:p>
-            <a:pPr lvl="0"/>
-            <a:r>
-              <a:rPr/>
-              <a:t>When you add an API and choose the root to trust or block, it won’t automatically filter down to any sub org you individually configured and disinherit it from the root.</a:t>
-            </a:r>
-          </a:p>
-          <a:p>
-            <a:pPr lvl="1"/>
-            <a:r>
-              <a:rPr/>
-              <a:t>Directions in this Collab post</a:t>
-            </a:r>
-          </a:p>
-        </p:txBody>
-      </p:sp>
-    </p:spTree>
-  </p:cSld>
-</p:sld>
-</file>
-
-<file path=ppt/slides/slide13.xml><?xml version="1.0" encoding="utf-8"?>
-<p:sld xmlns:a="http://schemas.openxmlformats.org/drawingml/2006/main" xmlns:r="http://schemas.openxmlformats.org/officeDocument/2006/relationships" xmlns:p="http://schemas.openxmlformats.org/presentationml/2006/main">
-  <p:cSld>
-    <p:spTree>
-      <p:nvGrpSpPr>
-        <p:cNvPr id="1" name=""/>
-        <p:cNvGrpSpPr/>
-        <p:nvPr/>
-      </p:nvGrpSpPr>
-      <p:grpSpPr>
-        <a:xfrm>
-          <a:off x="0" y="0"/>
-          <a:ext cx="0" cy="0"/>
-          <a:chOff x="0" y="0"/>
-          <a:chExt cx="0" cy="0"/>
-        </a:xfrm>
-      </p:grpSpPr>
-      <p:sp>
-        <p:nvSpPr>
-          <p:cNvPr id="2" name="Title 1"/>
-          <p:cNvSpPr>
-            <a:spLocks noGrp="1"/>
-          </p:cNvSpPr>
-          <p:nvPr>
-            <p:ph type="title"/>
-          </p:nvPr>
-        </p:nvSpPr>
-        <p:spPr/>
-        <p:txBody>
-          <a:bodyPr/>
-          <a:lstStyle/>
-          <a:p>
-            <a:pPr lvl="0" indent="0" marL="0">
-              <a:buNone/>
-            </a:pPr>
-            <a:r>
-              <a:rPr/>
-              <a:t>Resources</a:t>
-            </a:r>
-          </a:p>
-        </p:txBody>
-      </p:sp>
-      <p:sp>
-        <p:nvSpPr>
-          <p:cNvPr id="3" name="Content Placeholder 2"/>
-          <p:cNvSpPr>
-            <a:spLocks noGrp="1"/>
-          </p:cNvSpPr>
-          <p:nvPr>
-            <p:ph idx="1"/>
-          </p:nvPr>
-        </p:nvSpPr>
-        <p:spPr/>
-        <p:txBody>
-          <a:bodyPr/>
-          <a:lstStyle/>
-          <a:p>
-            <a:pPr lvl="0" indent="0" marL="0">
-              <a:buNone/>
-            </a:pPr>
-            <a:r>
-              <a:rPr/>
-              <a:t>CDW Amplified Help Article: Manage access to unconfigured third-party apps Google Support Page: Manage access to unconfigured third-party apps for users designated as under 18 Google Support Page: Control which third-party &amp; internal apps access Google Workspace data Official Google YouTube Video: Google Workspace for Education Admin Console: How to review third party app access requests</a:t>
-            </a:r>
-          </a:p>
-          <a:p>
-            <a:pPr lvl="0" indent="0" marL="0">
-              <a:spcBef>
-                <a:spcPts val="3000"/>
-              </a:spcBef>
-              <a:buNone/>
-            </a:pPr>
-            <a:r>
-              <a:rPr b="1"/>
-              <a:t>Collaborative Member Resources</a:t>
-            </a:r>
-          </a:p>
-          <a:p>
-            <a:pPr lvl="0" indent="0" marL="0">
-              <a:buNone/>
-            </a:pPr>
-            <a:r>
-              <a:rPr/>
-              <a:t>September 14th Deep Dive Collaborative Deep Dive - Back to School: Unpacking the Upcoming API Control Changes Slide Deck | Timestamps &amp; Summary | Recording</a:t>
-            </a:r>
-          </a:p>
-          <a:p>
-            <a:pPr lvl="0" indent="0" marL="0">
-              <a:buNone/>
-            </a:pPr>
-            <a:r>
-              <a:rPr/>
-              <a:t>Q &amp; A from the live stream</a:t>
-            </a:r>
-          </a:p>
-        </p:txBody>
-      </p:sp>
-    </p:spTree>
-  </p:cSld>
-</p:sld>
-</file>
-
-<file path=ppt/slides/slide14.xml><?xml version="1.0" encoding="utf-8"?>
-<p:sld xmlns:a="http://schemas.openxmlformats.org/drawingml/2006/main" xmlns:r="http://schemas.openxmlformats.org/officeDocument/2006/relationships" xmlns:p="http://schemas.openxmlformats.org/presentationml/2006/main">
-  <p:cSld>
-    <p:spTree>
-      <p:nvGrpSpPr>
-        <p:cNvPr id="1" name=""/>
-        <p:cNvGrpSpPr/>
-        <p:nvPr/>
-      </p:nvGrpSpPr>
-      <p:grpSpPr>
-        <a:xfrm>
-          <a:off x="0" y="0"/>
-          <a:ext cx="0" cy="0"/>
-          <a:chOff x="0" y="0"/>
-          <a:chExt cx="0" cy="0"/>
-        </a:xfrm>
-      </p:grpSpPr>
-      <p:sp>
-        <p:nvSpPr>
-          <p:cNvPr id="2" name="Title 1"/>
-          <p:cNvSpPr>
-            <a:spLocks noGrp="1"/>
-          </p:cNvSpPr>
-          <p:nvPr>
-            <p:ph type="title"/>
-          </p:nvPr>
-        </p:nvSpPr>
-        <p:spPr/>
-        <p:txBody>
-          <a:bodyPr/>
-          <a:lstStyle/>
-          <a:p>
-            <a:pPr lvl="0" indent="0" marL="0">
-              <a:buNone/>
-            </a:pPr>
-            <a:r>
-              <a:rPr/>
-              <a:t>Visual Roadmap</a:t>
-            </a:r>
-          </a:p>
-        </p:txBody>
-      </p:sp>
-      <p:sp>
-        <p:nvSpPr>
-          <p:cNvPr id="3" name="Content Placeholder 2"/>
-          <p:cNvSpPr>
-            <a:spLocks noGrp="1"/>
-          </p:cNvSpPr>
-          <p:nvPr>
-            <p:ph idx="1"/>
-          </p:nvPr>
-        </p:nvSpPr>
-        <p:spPr/>
-        <p:txBody>
-          <a:bodyPr/>
-          <a:lstStyle/>
-          <a:p>
-            <a:pPr lvl="0" indent="0" marL="0">
-              <a:buNone/>
-            </a:pPr>
-            <a:r>
-              <a:rPr/>
-              <a:t>image</a:t>
+              <a:t>[]{fig-alt=” map of key milestones”}</a:t>
             </a:r>
           </a:p>
         </p:txBody>
@@ -3940,7 +3368,15 @@
             </a:pPr>
             <a:r>
               <a:rPr/>
-              <a:t>Hey there, Google Admins! We’re on the cusp of significant shifts in Google’s API control settings for users under 18, set to shake things up this coming October. This is a noteworthy moment, especially for schools that haven’t yet fine-tuned their API Control settings. And for those who think they’re one step ahead, hold on! A slew of fresh updates and changes have already landed in the admin console, causing ripples of impact.</a:t>
+              <a:t>Hey there, Google Admins! We’re on the cusp of significant shifts in </a:t>
+            </a:r>
+            <a:r>
+              <a:rPr b="1"/>
+              <a:t>Google’s API control settings for users under 18</a:t>
+            </a:r>
+            <a:r>
+              <a:rPr/>
+              <a:t>, set to shake things up this coming October. This is a noteworthy moment, especially for schools that haven’t yet fine-tuned their API Control settings. And for those who think they’re one step ahead, hold on! A slew of fresh updates and changes have already landed in the admin console, causing ripples of impact.</a:t>
             </a:r>
           </a:p>
           <a:p>
@@ -3951,6 +3387,32 @@
               <a:rPr/>
               <a:t>With the flurry of updates to the API Controls section in the admin console over the past couple of years, it’s time to take a breather and review the API controls, nail down best practices, identify necessary actions, and map out the route to get there.</a:t>
             </a:r>
+          </a:p>
+          <a:p>
+            <a:pPr lvl="0" indent="0" marL="0">
+              <a:spcBef>
+                <a:spcPts val="3000"/>
+              </a:spcBef>
+              <a:buNone/>
+            </a:pPr>
+            <a:r>
+              <a:rPr b="1"/>
+              <a:t>TL;DR</a:t>
+            </a:r>
+          </a:p>
+          <a:p>
+            <a:pPr lvl="0" indent="0" marL="0">
+              <a:buNone/>
+            </a:pPr>
+            <a:r>
+              <a:rPr/>
+              <a:t>Google is pushing us towards a Trusted List approach for OAuth Apps, which will be implemented in October. Google Admins need to set up the trusted list and confirm settings before then.</a:t>
+            </a:r>
+          </a:p>
+          <a:p>
+            <a:pPr lvl="0" indent="0" marL="0">
+              <a:buNone/>
+            </a:pPr>
           </a:p>
         </p:txBody>
       </p:sp>
@@ -3996,7 +3458,7 @@
             </a:pPr>
             <a:r>
               <a:rPr/>
-              <a:t>TL;DR</a:t>
+              <a:t>Understanding the Latest Updates</a:t>
             </a:r>
           </a:p>
         </p:txBody>
@@ -4021,7 +3483,7 @@
             </a:pPr>
             <a:r>
               <a:rPr/>
-              <a:t>Google is pushing us towards a Trusted List approach for OAuth Apps, which will be implemented in October. Google Admins need to set up the trusted list and confirm settings before then.</a:t>
+              <a:t>Google notified primary admins on June 19th, 2023, announcing new API Controls, changes in behavior for users under 18 regarding their access to third-party apps, and a requirement to review and confirm access settings to third-party apps by Oct. 23rd, 2023.</a:t>
             </a:r>
           </a:p>
           <a:p>
@@ -4030,7 +3492,76 @@
             </a:pPr>
             <a:r>
               <a:rPr/>
-              <a:t>image</a:t>
+              <a:t>Takeaway: Google is making domains go to an OAuth App “Trusted List” for under 18 before Oct. 23rd, 2023 or students will lose access to OAuth apps. Read the </a:t>
+            </a:r>
+            <a:r>
+              <a:rPr>
+                <a:hlinkClick r:id="rId2"/>
+              </a:rPr>
+              <a:t>full email</a:t>
+            </a:r>
+          </a:p>
+          <a:p>
+            <a:pPr lvl="0" indent="0" marL="0">
+              <a:spcBef>
+                <a:spcPts val="3000"/>
+              </a:spcBef>
+              <a:buNone/>
+            </a:pPr>
+            <a:r>
+              <a:rPr b="1"/>
+              <a:t>Immediate Impact</a:t>
+            </a:r>
+          </a:p>
+          <a:p>
+            <a:pPr lvl="0"/>
+            <a:r>
+              <a:rPr/>
+              <a:t>Previously accessed apps should not be affected until October 23rd. Google has “configured” previously accessed apps from under 18 as limited.</a:t>
+            </a:r>
+          </a:p>
+          <a:p>
+            <a:pPr lvl="1"/>
+            <a:r>
+              <a:rPr/>
+              <a:t>This is why you are seeing a lot more “configured apps”</a:t>
+            </a:r>
+          </a:p>
+          <a:p>
+            <a:pPr lvl="0"/>
+            <a:r>
+              <a:rPr/>
+              <a:t>Any “new” app ca not be accessed by under 18 and the user can “Request” the app.</a:t>
+            </a:r>
+          </a:p>
+          <a:p>
+            <a:pPr lvl="1"/>
+            <a:r>
+              <a:rPr/>
+              <a:t>This is why you’re seeing requests (from students)</a:t>
+            </a:r>
+          </a:p>
+          <a:p>
+            <a:pPr lvl="0" indent="0" marL="0">
+              <a:buNone/>
+            </a:pPr>
+          </a:p>
+          <a:p>
+            <a:pPr lvl="0" indent="0" marL="1270000">
+              <a:buNone/>
+            </a:pPr>
+            <a:r>
+              <a:rPr sz="2000"/>
+              <a:t>“It’s like Google did the “Stop the bleed” approach for students for you.”</a:t>
+            </a:r>
+          </a:p>
+          <a:p>
+            <a:pPr lvl="0" indent="0" marL="1270000">
+              <a:buNone/>
+            </a:pPr>
+            <a:r>
+              <a:rPr sz="2000" i="1"/>
+              <a:t>- Melissa Benson</a:t>
             </a:r>
           </a:p>
         </p:txBody>
@@ -4077,7 +3608,7 @@
             </a:pPr>
             <a:r>
               <a:rPr/>
-              <a:t>Understanding the Latest Updates</a:t>
+              <a:t>API Controls: Overview and Best Practices</a:t>
             </a:r>
           </a:p>
         </p:txBody>
@@ -4096,24 +3627,6 @@
         <p:txBody>
           <a:bodyPr/>
           <a:lstStyle/>
-          <a:p>
-            <a:pPr lvl="0" indent="0" marL="0">
-              <a:buNone/>
-            </a:pPr>
-            <a:r>
-              <a:rPr/>
-              <a:t>Google notified primary admins on June 19th, 2023, announcing new API Controls, changes in behavior for users under 18 regarding their access to third-party apps, and a requirement to review and confirm access settings to third-party apps by Oct. 23rd, 2023.</a:t>
-            </a:r>
-          </a:p>
-          <a:p>
-            <a:pPr lvl="0" indent="0" marL="0">
-              <a:buNone/>
-            </a:pPr>
-            <a:r>
-              <a:rPr/>
-              <a:t>Takeaway: Google is making domains go to an OAuth App “Trusted List” for under 18 before Oct. 23rd, 2023 or students will lose access to OAuth apps. Read the full email here.</a:t>
-            </a:r>
-          </a:p>
           <a:p>
             <a:pPr lvl="0" indent="0" marL="0">
               <a:spcBef>
@@ -4123,35 +3636,7 @@
             </a:pPr>
             <a:r>
               <a:rPr b="1"/>
-              <a:t>Immediate Impact</a:t>
-            </a:r>
-          </a:p>
-          <a:p>
-            <a:pPr lvl="0"/>
-            <a:r>
-              <a:rPr/>
-              <a:t>Previously accessed apps should not be affected until October 23rd. Google has “configured” previously accessed apps from under 18 as limited.</a:t>
-            </a:r>
-          </a:p>
-          <a:p>
-            <a:pPr lvl="1"/>
-            <a:r>
-              <a:rPr/>
-              <a:t>This is why you are seeing a lot more “configured apps”</a:t>
-            </a:r>
-          </a:p>
-          <a:p>
-            <a:pPr lvl="0"/>
-            <a:r>
-              <a:rPr/>
-              <a:t>Any “new” app ca not be accessed by under 18 and the user can “Request” the app.</a:t>
-            </a:r>
-          </a:p>
-          <a:p>
-            <a:pPr lvl="1"/>
-            <a:r>
-              <a:rPr/>
-              <a:t>This is why you’re seeing requests (from students)</a:t>
+              <a:t>Overview</a:t>
             </a:r>
           </a:p>
           <a:p>
@@ -4160,7 +3645,7 @@
             </a:pPr>
             <a:r>
               <a:rPr/>
-              <a:t>image</a:t>
+              <a:t>When users sign in to third-party apps using the “Sign in with Google” option (single sign-on), you can control how those third-party apps access your organization’s Google data. Support Page</a:t>
             </a:r>
           </a:p>
           <a:p>
@@ -4168,8 +3653,63 @@
               <a:buNone/>
             </a:pPr>
             <a:r>
-              <a:rPr/>
-              <a:t>It’s like Google did the “Stop the bleed” approach for students for you.</a:t>
+              <a:rPr b="1"/>
+              <a:t>API Controls Section:</a:t>
+            </a:r>
+            <a:r>
+              <a:rPr/>
+              <a:t> Security &gt; Access and data controls &gt; API Controls</a:t>
+            </a:r>
+          </a:p>
+          <a:p>
+            <a:pPr lvl="0" indent="0" marL="0">
+              <a:buNone/>
+            </a:pPr>
+            <a:r>
+              <a:rPr b="1"/>
+              <a:t>Manage Third Party Apps:</a:t>
+            </a:r>
+            <a:r>
+              <a:rPr/>
+              <a:t> Security &gt; Access and data controls &gt; API Controls &gt; Manage Third-Party Apps</a:t>
+            </a:r>
+          </a:p>
+          <a:p>
+            <a:pPr lvl="0" indent="0" marL="0">
+              <a:spcBef>
+                <a:spcPts val="3000"/>
+              </a:spcBef>
+              <a:buNone/>
+            </a:pPr>
+            <a:r>
+              <a:rPr b="1"/>
+              <a:t>Best Practices</a:t>
+            </a:r>
+          </a:p>
+          <a:p>
+            <a:pPr lvl="0" indent="0" marL="0">
+              <a:buNone/>
+            </a:pPr>
+            <a:r>
+              <a:rPr b="1"/>
+              <a:t>Students:</a:t>
+            </a:r>
+            <a:r>
+              <a:rPr/>
+              <a:t> (Default) Don’t allow users to access any third-party apps</a:t>
+            </a:r>
+          </a:p>
+          <a:p>
+            <a:pPr lvl="0" indent="0" marL="0">
+              <a:buNone/>
+            </a:pPr>
+            <a:r>
+              <a:rPr b="1"/>
+              <a:t>Staff:</a:t>
+            </a:r>
+            <a:r>
+              <a:rPr/>
+              <a:t> This needs to be discussed by the school. Be consistent with your other app policies. It’s best to lean towards a more controlled app approval process.</a:t>
             </a:r>
           </a:p>
         </p:txBody>
@@ -4216,7 +3756,7 @@
             </a:pPr>
             <a:r>
               <a:rPr/>
-              <a:t>API Controls: Overview and Best Practices</a:t>
+              <a:t>Next Steps: 2 Required Action before Oct 23rd</a:t>
             </a:r>
           </a:p>
         </p:txBody>
@@ -4235,6 +3775,20 @@
         <p:txBody>
           <a:bodyPr/>
           <a:lstStyle/>
+          <a:p>
+            <a:pPr lvl="0" indent="0" marL="0">
+              <a:buNone/>
+            </a:pPr>
+            <a:r>
+              <a:rPr/>
+              <a:t>The process boils down to two actions: Configure and Confirm.</a:t>
+            </a:r>
+          </a:p>
+          <a:p>
+            <a:pPr lvl="0" indent="0" marL="0">
+              <a:buNone/>
+            </a:pPr>
+          </a:p>
           <a:p>
             <a:pPr lvl="0" indent="0" marL="0">
               <a:spcBef>
@@ -4244,7 +3798,7 @@
             </a:pPr>
             <a:r>
               <a:rPr b="1"/>
-              <a:t>Overview</a:t>
+              <a:t>Configure a trusted list of OAuth apps</a:t>
             </a:r>
           </a:p>
           <a:p>
@@ -4253,43 +3807,7 @@
             </a:pPr>
             <a:r>
               <a:rPr/>
-              <a:t>When users sign in to third-party apps using the “Sign in with Google” option (single sign-on), you can control how those third-party apps access your organization’s Google data. Support Page</a:t>
-            </a:r>
-          </a:p>
-          <a:p>
-            <a:pPr lvl="0" indent="0" marL="0">
-              <a:buNone/>
-            </a:pPr>
-            <a:r>
-              <a:rPr/>
-              <a:t>API Controls Section: Security &gt; Access and data controls &gt; API Controls</a:t>
-            </a:r>
-          </a:p>
-          <a:p>
-            <a:pPr lvl="0" indent="0" marL="0">
-              <a:buNone/>
-            </a:pPr>
-            <a:r>
-              <a:rPr/>
-              <a:t>Image here</a:t>
-            </a:r>
-          </a:p>
-          <a:p>
-            <a:pPr lvl="0" indent="0" marL="0">
-              <a:buNone/>
-            </a:pPr>
-            <a:r>
-              <a:rPr/>
-              <a:t>Manage Third Party Apps: Security &gt; Access and data controls &gt; API Controls &gt; Manage Third-Party Apps</a:t>
-            </a:r>
-          </a:p>
-          <a:p>
-            <a:pPr lvl="0" indent="0" marL="0">
-              <a:buNone/>
-            </a:pPr>
-            <a:r>
-              <a:rPr/>
-              <a:t>Image here</a:t>
+              <a:t>This is a significant task as most schools see hundreds and thousands of accessed apps. Here are the steps:</a:t>
             </a:r>
           </a:p>
           <a:p>
@@ -4301,43 +3819,156 @@
             </a:pPr>
             <a:r>
               <a:rPr b="1"/>
-              <a:t>Best Practices</a:t>
+              <a:t>To go towards a Trusted List approach for users</a:t>
+            </a:r>
+          </a:p>
+          <a:p>
+            <a:pPr lvl="0" indent="-342900" marL="342900">
+              <a:buAutoNum type="arabicPeriod"/>
+            </a:pPr>
+            <a:r>
+              <a:rPr/>
+              <a:t>Go through the configured apps (marked as “limited”) and trust or block them. (remember, Google “configured” previously accessed apps for under 18 as limited)</a:t>
+            </a:r>
+          </a:p>
+          <a:p>
+            <a:pPr lvl="0" indent="-342900" marL="342900">
+              <a:buAutoNum type="arabicPeriod"/>
+            </a:pPr>
+            <a:r>
+              <a:rPr/>
+              <a:t>Figure out how to handle the incoming app requests.</a:t>
+            </a:r>
+          </a:p>
+          <a:p>
+            <a:pPr lvl="0" indent="-342900" marL="342900">
+              <a:buAutoNum type="arabicPeriod"/>
+            </a:pPr>
+            <a:r>
+              <a:rPr/>
+              <a:t>Look at all of the rest of the accessed apps and create our trusted list for the rest of our users. (this would be addressing the trusted list for over 18)</a:t>
             </a:r>
           </a:p>
           <a:p>
             <a:pPr lvl="0" indent="0" marL="0">
+              <a:spcBef>
+                <a:spcPts val="3000"/>
+              </a:spcBef>
               <a:buNone/>
             </a:pPr>
             <a:r>
-              <a:rPr/>
-              <a:t>Students: (Default) Don’t allow users to access any third-party apps</a:t>
+              <a:rPr b="1"/>
+              <a:t>Ways to “approve” apps</a:t>
+            </a:r>
+          </a:p>
+          <a:p>
+            <a:pPr lvl="0" indent="-342900" marL="342900">
+              <a:buAutoNum type="arabicPeriod"/>
+            </a:pPr>
+            <a:r>
+              <a:rPr/>
+              <a:t>You can trust one by one, or a couple by couple by going into your configured or accessed app list from within the admin console. [image below]</a:t>
+            </a:r>
+          </a:p>
+          <a:p>
+            <a:pPr lvl="0" indent="-342900" marL="342900">
+              <a:buAutoNum type="arabicPeriod"/>
+            </a:pPr>
+            <a:r>
+              <a:rPr/>
+              <a:t>You could “add an app” and trust.</a:t>
+            </a:r>
+          </a:p>
+          <a:p>
+            <a:pPr lvl="0" indent="-342900" marL="342900">
+              <a:buAutoNum type="arabicPeriod"/>
+            </a:pPr>
+            <a:r>
+              <a:rPr/>
+              <a:t>Recommended: You can download the accessed apps list, bulk change access in a sheet, then bulk upload. [image below]</a:t>
             </a:r>
           </a:p>
           <a:p>
             <a:pPr lvl="0" indent="0" marL="0">
               <a:buNone/>
             </a:pPr>
-            <a:r>
-              <a:rPr/>
-              <a:t>image</a:t>
-            </a:r>
           </a:p>
           <a:p>
             <a:pPr lvl="0" indent="0" marL="0">
+              <a:spcBef>
+                <a:spcPts val="3000"/>
+              </a:spcBef>
               <a:buNone/>
             </a:pPr>
             <a:r>
-              <a:rPr/>
-              <a:t>Staff: This needs to be discussed by the school. Be consistent with your other app policies. It’s best to lean towards a more controlled app approval process.</a:t>
+              <a:rPr b="1"/>
+              <a:t>Creating a trusted list tips</a:t>
+            </a:r>
+          </a:p>
+          <a:p>
+            <a:pPr lvl="0"/>
+            <a:r>
+              <a:rPr/>
+              <a:t>Check out the September 14th Deep Dive on this</a:t>
+            </a:r>
+          </a:p>
+          <a:p>
+            <a:pPr lvl="1"/>
+            <a:r>
+              <a:rPr/>
+              <a:t>Slide deck - slides</a:t>
+            </a:r>
+          </a:p>
+          <a:p>
+            <a:pPr lvl="1"/>
+            <a:r>
+              <a:rPr/>
+              <a:t>Recording</a:t>
             </a:r>
           </a:p>
           <a:p>
             <a:pPr lvl="0" indent="0" marL="0">
+              <a:spcBef>
+                <a:spcPts val="3000"/>
+              </a:spcBef>
               <a:buNone/>
             </a:pPr>
             <a:r>
-              <a:rPr/>
-              <a:t>image</a:t>
+              <a:rPr b="1"/>
+              <a:t>Confirm setting before October 23rd</a:t>
+            </a:r>
+          </a:p>
+          <a:p>
+            <a:pPr lvl="0"/>
+            <a:r>
+              <a:rPr/>
+              <a:t>This is the </a:t>
+            </a:r>
+            <a:r>
+              <a:rPr>
+                <a:hlinkClick r:id="rId2"/>
+              </a:rPr>
+              <a:t>Guided Stepper</a:t>
+            </a:r>
+          </a:p>
+          <a:p>
+            <a:pPr lvl="0"/>
+            <a:r>
+              <a:rPr/>
+              <a:t>Think of this as you signing off with “parental/guardian consent”</a:t>
+            </a:r>
+          </a:p>
+          <a:p>
+            <a:pPr lvl="0"/>
+            <a:r>
+              <a:rPr>
+                <a:hlinkClick r:id="rId3"/>
+              </a:rPr>
+              <a:t>YouTube video</a:t>
+            </a:r>
+            <a:r>
+              <a:rPr/>
+              <a:t> of this process.</a:t>
             </a:r>
           </a:p>
         </p:txBody>
@@ -4384,7 +4015,7 @@
             </a:pPr>
             <a:r>
               <a:rPr/>
-              <a:t>Next Steps: 2 Required Action before Oct 23rd</a:t>
+              <a:t>FAQ</a:t>
             </a:r>
           </a:p>
         </p:txBody>
@@ -4404,21 +4035,157 @@
           <a:bodyPr/>
           <a:lstStyle/>
           <a:p>
-            <a:pPr lvl="0" indent="0" marL="0">
-              <a:buNone/>
-            </a:pPr>
-            <a:r>
-              <a:rPr/>
-              <a:t>The process boils down to two actions: Configure and Confirm.</a:t>
-            </a:r>
-          </a:p>
-          <a:p>
-            <a:pPr lvl="0" indent="0" marL="0">
-              <a:buNone/>
-            </a:pPr>
-            <a:r>
-              <a:rPr/>
-              <a:t>image image</a:t>
+            <a:pPr lvl="0"/>
+            <a:r>
+              <a:rPr/>
+              <a:t>Is there a maximum of configured apps?</a:t>
+            </a:r>
+          </a:p>
+          <a:p>
+            <a:pPr lvl="1"/>
+            <a:r>
+              <a:rPr/>
+              <a:t>Yes, 15,000. We are in talks with Google about this</a:t>
+            </a:r>
+          </a:p>
+          <a:p>
+            <a:pPr lvl="0"/>
+            <a:r>
+              <a:rPr/>
+              <a:t>Can I unconfigure an app?</a:t>
+            </a:r>
+          </a:p>
+          <a:p>
+            <a:pPr lvl="1"/>
+            <a:r>
+              <a:rPr/>
+              <a:t>It does not appear like you can truly “unconfigure” an app. We are talking to Google about this.</a:t>
+            </a:r>
+          </a:p>
+          <a:p>
+            <a:pPr lvl="0"/>
+            <a:r>
+              <a:rPr/>
+              <a:t>I’m having issues with the iPhone native mail and calendar apps when I’m blocking APIs</a:t>
+            </a:r>
+          </a:p>
+          <a:p>
+            <a:pPr lvl="1"/>
+            <a:r>
+              <a:rPr/>
+              <a:t>This is the full App ID for iOS in my console: 450232826690-0rm6bs9d2fps9tifvk2oodh3tasd7vl7.apps.googleusercontent.com.</a:t>
+            </a:r>
+          </a:p>
+          <a:p>
+            <a:pPr lvl="0"/>
+            <a:r>
+              <a:rPr/>
+              <a:t>Can we disable the ability for students to “Request apps”?</a:t>
+            </a:r>
+          </a:p>
+          <a:p>
+            <a:pPr lvl="1"/>
+            <a:r>
+              <a:rPr/>
+              <a:t>No. But it is something we will talk about internally to see if there is a work around.</a:t>
+            </a:r>
+          </a:p>
+          <a:p>
+            <a:pPr lvl="1"/>
+            <a:r>
+              <a:rPr/>
+              <a:t>We asked Google and it’s “in the works”.</a:t>
+            </a:r>
+          </a:p>
+          <a:p>
+            <a:pPr lvl="0"/>
+            <a:r>
+              <a:rPr/>
+              <a:t>Can staff request apps like students?</a:t>
+            </a:r>
+          </a:p>
+          <a:p>
+            <a:pPr lvl="1"/>
+            <a:r>
+              <a:rPr/>
+              <a:t>No. Only under 18 can request. We are asking Google. Most likely a temp thing. (hopefully)</a:t>
+            </a:r>
+          </a:p>
+          <a:p>
+            <a:pPr lvl="0"/>
+            <a:r>
+              <a:rPr/>
+              <a:t>Where does that “request” go (when students request access to an app)?</a:t>
+            </a:r>
+          </a:p>
+          <a:p>
+            <a:pPr lvl="1"/>
+            <a:r>
+              <a:rPr/>
+              <a:t>Admin Console Dashboard &gt; App access control card</a:t>
+            </a:r>
+          </a:p>
+          <a:p>
+            <a:pPr lvl="1"/>
+            <a:r>
+              <a:rPr/>
+              <a:t>Security &gt; API Controls &gt; App Access Control &gt; Manage Third-Party App Access. Then it’s the middle box across the top that says “Apps pending review”.</a:t>
+            </a:r>
+          </a:p>
+          <a:p>
+            <a:pPr lvl="0"/>
+            <a:r>
+              <a:rPr/>
+              <a:t>Can we see “who” requested the app? Can we get alerted?</a:t>
+            </a:r>
+          </a:p>
+          <a:p>
+            <a:pPr lvl="1"/>
+            <a:r>
+              <a:rPr/>
+              <a:t>Under Reporting &gt; Audit and investigation &gt; OAuth log events. Then add the condition “Event is Request”.</a:t>
+            </a:r>
+          </a:p>
+          <a:p>
+            <a:pPr lvl="1"/>
+            <a:r>
+              <a:rPr/>
+              <a:t>Yes, by creating a Custom Rule: With the previous navigation then click on “Create activity rule” or “Reporting Rule” (depending on your edition). It will walk you through creating a rule (alert) where you can have it get sent to the Alert Center and email people.</a:t>
+            </a:r>
+          </a:p>
+          <a:p>
+            <a:pPr lvl="0"/>
+            <a:r>
+              <a:rPr/>
+              <a:t>Can you explain the API Block-Exempt option when trusting an app?</a:t>
+            </a:r>
+          </a:p>
+          <a:p>
+            <a:pPr lvl="1"/>
+            <a:r>
+              <a:rPr/>
+              <a:t>This is for people with Standard or Plus and use Context Aware Access.</a:t>
+            </a:r>
+          </a:p>
+          <a:p>
+            <a:pPr lvl="1"/>
+            <a:r>
+              <a:rPr/>
+              <a:t>Selected apps maintain API access to Google Workspace services even when those services have Context-Aware Access policies that apply to API access. Resources: When adding an app, Assign Context-Aware access levels to apps, Use Cases. image</a:t>
+            </a:r>
+          </a:p>
+          <a:p>
+            <a:pPr lvl="0"/>
+            <a:r>
+              <a:rPr/>
+              <a:t>Q &amp; As from the after party</a:t>
+            </a:r>
+          </a:p>
+          <a:p>
+            <a:pPr lvl="1"/>
+            <a:r>
+              <a:rPr/>
+              <a:t>Slide 1, Slide 2, Slide 3</a:t>
             </a:r>
           </a:p>
         </p:txBody>
@@ -4465,7 +4232,7 @@
             </a:pPr>
             <a:r>
               <a:rPr/>
-              <a:t>Configure a trusted list of OAuth apps</a:t>
+              <a:t>Pro Tips</a:t>
             </a:r>
           </a:p>
         </p:txBody>
@@ -4485,86 +4252,696 @@
           <a:bodyPr/>
           <a:lstStyle/>
           <a:p>
-            <a:pPr lvl="0" indent="0" marL="0">
+            <a:pPr lvl="0"/>
+            <a:r>
+              <a:rPr/>
+              <a:t>Apps Script</a:t>
+            </a:r>
+          </a:p>
+          <a:p>
+            <a:pPr lvl="0" indent="0">
               <a:buNone/>
             </a:pPr>
             <a:r>
-              <a:rPr/>
-              <a:t>This is a significant task as most schools see hundreds and thousands of accessed apps. Here are the steps:</a:t>
+              <a:rPr>
+                <a:solidFill>
+                  <a:srgbClr val="003B4F"/>
+                </a:solidFill>
+                <a:latin typeface="Courier"/>
+              </a:rPr>
+              <a:t>function </a:t>
+            </a:r>
+            <a:r>
+              <a:rPr>
+                <a:solidFill>
+                  <a:srgbClr val="4758AB"/>
+                </a:solidFill>
+                <a:latin typeface="Courier"/>
+              </a:rPr>
+              <a:t>getToken</a:t>
+            </a:r>
+            <a:r>
+              <a:rPr>
+                <a:solidFill>
+                  <a:srgbClr val="003B4F"/>
+                </a:solidFill>
+                <a:latin typeface="Courier"/>
+              </a:rPr>
+              <a:t>()</a:t>
+            </a:r>
+            <a:br/>
+            <a:r>
+              <a:rPr>
+                <a:solidFill>
+                  <a:srgbClr val="003B4F"/>
+                </a:solidFill>
+                <a:latin typeface="Courier"/>
+              </a:rPr>
+              <a:t>{  </a:t>
+            </a:r>
+            <a:br/>
+            <a:r>
+              <a:rPr>
+                <a:solidFill>
+                  <a:srgbClr val="003B4F"/>
+                </a:solidFill>
+                <a:latin typeface="Courier"/>
+              </a:rPr>
+              <a:t>var accessToken </a:t>
+            </a:r>
+            <a:r>
+              <a:rPr>
+                <a:solidFill>
+                  <a:srgbClr val="5E5E5E"/>
+                </a:solidFill>
+                <a:latin typeface="Courier"/>
+              </a:rPr>
+              <a:t>=</a:t>
+            </a:r>
+            <a:r>
+              <a:rPr>
+                <a:solidFill>
+                  <a:srgbClr val="003B4F"/>
+                </a:solidFill>
+                <a:latin typeface="Courier"/>
+              </a:rPr>
+              <a:t> ScriptApp</a:t>
+            </a:r>
+            <a:r>
+              <a:rPr>
+                <a:solidFill>
+                  <a:srgbClr val="5E5E5E"/>
+                </a:solidFill>
+                <a:latin typeface="Courier"/>
+              </a:rPr>
+              <a:t>.</a:t>
+            </a:r>
+            <a:r>
+              <a:rPr>
+                <a:solidFill>
+                  <a:srgbClr val="4758AB"/>
+                </a:solidFill>
+                <a:latin typeface="Courier"/>
+              </a:rPr>
+              <a:t>getOAuthToken</a:t>
+            </a:r>
+            <a:r>
+              <a:rPr>
+                <a:solidFill>
+                  <a:srgbClr val="003B4F"/>
+                </a:solidFill>
+                <a:latin typeface="Courier"/>
+              </a:rPr>
+              <a:t>()</a:t>
+            </a:r>
+            <a:r>
+              <a:rPr>
+                <a:solidFill>
+                  <a:srgbClr val="5E5E5E"/>
+                </a:solidFill>
+                <a:latin typeface="Courier"/>
+              </a:rPr>
+              <a:t>;</a:t>
+            </a:r>
+            <a:r>
+              <a:rPr>
+                <a:solidFill>
+                  <a:srgbClr val="003B4F"/>
+                </a:solidFill>
+                <a:latin typeface="Courier"/>
+              </a:rPr>
+              <a:t>  var url </a:t>
+            </a:r>
+            <a:r>
+              <a:rPr>
+                <a:solidFill>
+                  <a:srgbClr val="5E5E5E"/>
+                </a:solidFill>
+                <a:latin typeface="Courier"/>
+              </a:rPr>
+              <a:t>=</a:t>
+            </a:r>
+            <a:r>
+              <a:rPr>
+                <a:solidFill>
+                  <a:srgbClr val="003B4F"/>
+                </a:solidFill>
+                <a:latin typeface="Courier"/>
+              </a:rPr>
+              <a:t> </a:t>
+            </a:r>
+            <a:r>
+              <a:rPr>
+                <a:solidFill>
+                  <a:srgbClr val="20794D"/>
+                </a:solidFill>
+                <a:latin typeface="Courier"/>
+              </a:rPr>
+              <a:t>"https://www.googleapis.com/oauth2/v3/tokeninfo"</a:t>
+            </a:r>
+            <a:r>
+              <a:rPr>
+                <a:solidFill>
+                  <a:srgbClr val="5E5E5E"/>
+                </a:solidFill>
+                <a:latin typeface="Courier"/>
+              </a:rPr>
+              <a:t>;</a:t>
+            </a:r>
+            <a:r>
+              <a:rPr>
+                <a:solidFill>
+                  <a:srgbClr val="003B4F"/>
+                </a:solidFill>
+                <a:latin typeface="Courier"/>
+              </a:rPr>
+              <a:t> </a:t>
+            </a:r>
+            <a:br/>
+            <a:r>
+              <a:rPr>
+                <a:solidFill>
+                  <a:srgbClr val="003B4F"/>
+                </a:solidFill>
+                <a:latin typeface="Courier"/>
+              </a:rPr>
+              <a:t>var params </a:t>
+            </a:r>
+            <a:r>
+              <a:rPr>
+                <a:solidFill>
+                  <a:srgbClr val="5E5E5E"/>
+                </a:solidFill>
+                <a:latin typeface="Courier"/>
+              </a:rPr>
+              <a:t>=</a:t>
+            </a:r>
+            <a:r>
+              <a:rPr>
+                <a:solidFill>
+                  <a:srgbClr val="003B4F"/>
+                </a:solidFill>
+                <a:latin typeface="Courier"/>
+              </a:rPr>
+              <a:t> { </a:t>
+            </a:r>
+            <a:r>
+              <a:rPr>
+                <a:solidFill>
+                  <a:srgbClr val="AD0000"/>
+                </a:solidFill>
+                <a:latin typeface="Courier"/>
+              </a:rPr>
+              <a:t>method</a:t>
+            </a:r>
+            <a:r>
+              <a:rPr>
+                <a:solidFill>
+                  <a:srgbClr val="5E5E5E"/>
+                </a:solidFill>
+                <a:latin typeface="Courier"/>
+              </a:rPr>
+              <a:t>:</a:t>
+            </a:r>
+            <a:r>
+              <a:rPr>
+                <a:solidFill>
+                  <a:srgbClr val="003B4F"/>
+                </a:solidFill>
+                <a:latin typeface="Courier"/>
+              </a:rPr>
+              <a:t> </a:t>
+            </a:r>
+            <a:r>
+              <a:rPr>
+                <a:solidFill>
+                  <a:srgbClr val="20794D"/>
+                </a:solidFill>
+                <a:latin typeface="Courier"/>
+              </a:rPr>
+              <a:t>"post"</a:t>
+            </a:r>
+            <a:r>
+              <a:rPr>
+                <a:solidFill>
+                  <a:srgbClr val="5E5E5E"/>
+                </a:solidFill>
+                <a:latin typeface="Courier"/>
+              </a:rPr>
+              <a:t>,</a:t>
+            </a:r>
+            <a:r>
+              <a:rPr>
+                <a:solidFill>
+                  <a:srgbClr val="003B4F"/>
+                </a:solidFill>
+                <a:latin typeface="Courier"/>
+              </a:rPr>
+              <a:t> </a:t>
+            </a:r>
+            <a:r>
+              <a:rPr>
+                <a:solidFill>
+                  <a:srgbClr val="AD0000"/>
+                </a:solidFill>
+                <a:latin typeface="Courier"/>
+              </a:rPr>
+              <a:t>headers</a:t>
+            </a:r>
+            <a:r>
+              <a:rPr>
+                <a:solidFill>
+                  <a:srgbClr val="5E5E5E"/>
+                </a:solidFill>
+                <a:latin typeface="Courier"/>
+              </a:rPr>
+              <a:t>:</a:t>
+            </a:r>
+            <a:r>
+              <a:rPr>
+                <a:solidFill>
+                  <a:srgbClr val="003B4F"/>
+                </a:solidFill>
+                <a:latin typeface="Courier"/>
+              </a:rPr>
+              <a:t> {</a:t>
+            </a:r>
+            <a:r>
+              <a:rPr>
+                <a:solidFill>
+                  <a:srgbClr val="20794D"/>
+                </a:solidFill>
+                <a:latin typeface="Courier"/>
+              </a:rPr>
+              <a:t>"Authorization"</a:t>
+            </a:r>
+            <a:r>
+              <a:rPr>
+                <a:solidFill>
+                  <a:srgbClr val="5E5E5E"/>
+                </a:solidFill>
+                <a:latin typeface="Courier"/>
+              </a:rPr>
+              <a:t>:</a:t>
+            </a:r>
+            <a:r>
+              <a:rPr>
+                <a:solidFill>
+                  <a:srgbClr val="003B4F"/>
+                </a:solidFill>
+                <a:latin typeface="Courier"/>
+              </a:rPr>
+              <a:t> </a:t>
+            </a:r>
+            <a:r>
+              <a:rPr>
+                <a:solidFill>
+                  <a:srgbClr val="20794D"/>
+                </a:solidFill>
+                <a:latin typeface="Courier"/>
+              </a:rPr>
+              <a:t>"Bearer "</a:t>
+            </a:r>
+            <a:r>
+              <a:rPr>
+                <a:solidFill>
+                  <a:srgbClr val="003B4F"/>
+                </a:solidFill>
+                <a:latin typeface="Courier"/>
+              </a:rPr>
+              <a:t> </a:t>
+            </a:r>
+            <a:r>
+              <a:rPr>
+                <a:solidFill>
+                  <a:srgbClr val="5E5E5E"/>
+                </a:solidFill>
+                <a:latin typeface="Courier"/>
+              </a:rPr>
+              <a:t>+</a:t>
+            </a:r>
+            <a:r>
+              <a:rPr>
+                <a:solidFill>
+                  <a:srgbClr val="003B4F"/>
+                </a:solidFill>
+                <a:latin typeface="Courier"/>
+              </a:rPr>
+              <a:t> accessToken} }</a:t>
+            </a:r>
+            <a:r>
+              <a:rPr>
+                <a:solidFill>
+                  <a:srgbClr val="5E5E5E"/>
+                </a:solidFill>
+                <a:latin typeface="Courier"/>
+              </a:rPr>
+              <a:t>;</a:t>
+            </a:r>
+            <a:r>
+              <a:rPr>
+                <a:solidFill>
+                  <a:srgbClr val="003B4F"/>
+                </a:solidFill>
+                <a:latin typeface="Courier"/>
+              </a:rPr>
+              <a:t> </a:t>
+            </a:r>
+            <a:br/>
+            <a:r>
+              <a:rPr>
+                <a:solidFill>
+                  <a:srgbClr val="003B4F"/>
+                </a:solidFill>
+                <a:latin typeface="Courier"/>
+              </a:rPr>
+              <a:t>var res </a:t>
+            </a:r>
+            <a:r>
+              <a:rPr>
+                <a:solidFill>
+                  <a:srgbClr val="5E5E5E"/>
+                </a:solidFill>
+                <a:latin typeface="Courier"/>
+              </a:rPr>
+              <a:t>=</a:t>
+            </a:r>
+            <a:r>
+              <a:rPr>
+                <a:solidFill>
+                  <a:srgbClr val="003B4F"/>
+                </a:solidFill>
+                <a:latin typeface="Courier"/>
+              </a:rPr>
+              <a:t> UrlFetchApp</a:t>
+            </a:r>
+            <a:r>
+              <a:rPr>
+                <a:solidFill>
+                  <a:srgbClr val="5E5E5E"/>
+                </a:solidFill>
+                <a:latin typeface="Courier"/>
+              </a:rPr>
+              <a:t>.</a:t>
+            </a:r>
+            <a:r>
+              <a:rPr>
+                <a:solidFill>
+                  <a:srgbClr val="4758AB"/>
+                </a:solidFill>
+                <a:latin typeface="Courier"/>
+              </a:rPr>
+              <a:t>fetch</a:t>
+            </a:r>
+            <a:r>
+              <a:rPr>
+                <a:solidFill>
+                  <a:srgbClr val="003B4F"/>
+                </a:solidFill>
+                <a:latin typeface="Courier"/>
+              </a:rPr>
+              <a:t>(url</a:t>
+            </a:r>
+            <a:r>
+              <a:rPr>
+                <a:solidFill>
+                  <a:srgbClr val="5E5E5E"/>
+                </a:solidFill>
+                <a:latin typeface="Courier"/>
+              </a:rPr>
+              <a:t>,</a:t>
+            </a:r>
+            <a:r>
+              <a:rPr>
+                <a:solidFill>
+                  <a:srgbClr val="003B4F"/>
+                </a:solidFill>
+                <a:latin typeface="Courier"/>
+              </a:rPr>
+              <a:t> params)</a:t>
+            </a:r>
+            <a:r>
+              <a:rPr>
+                <a:solidFill>
+                  <a:srgbClr val="5E5E5E"/>
+                </a:solidFill>
+                <a:latin typeface="Courier"/>
+              </a:rPr>
+              <a:t>.</a:t>
+            </a:r>
+            <a:r>
+              <a:rPr>
+                <a:solidFill>
+                  <a:srgbClr val="4758AB"/>
+                </a:solidFill>
+                <a:latin typeface="Courier"/>
+              </a:rPr>
+              <a:t>getContentText</a:t>
+            </a:r>
+            <a:r>
+              <a:rPr>
+                <a:solidFill>
+                  <a:srgbClr val="003B4F"/>
+                </a:solidFill>
+                <a:latin typeface="Courier"/>
+              </a:rPr>
+              <a:t>()</a:t>
+            </a:r>
+            <a:r>
+              <a:rPr>
+                <a:solidFill>
+                  <a:srgbClr val="5E5E5E"/>
+                </a:solidFill>
+                <a:latin typeface="Courier"/>
+              </a:rPr>
+              <a:t>;</a:t>
+            </a:r>
+            <a:r>
+              <a:rPr>
+                <a:solidFill>
+                  <a:srgbClr val="003B4F"/>
+                </a:solidFill>
+                <a:latin typeface="Courier"/>
+              </a:rPr>
+              <a:t>  var clientId </a:t>
+            </a:r>
+            <a:r>
+              <a:rPr>
+                <a:solidFill>
+                  <a:srgbClr val="5E5E5E"/>
+                </a:solidFill>
+                <a:latin typeface="Courier"/>
+              </a:rPr>
+              <a:t>=</a:t>
+            </a:r>
+            <a:r>
+              <a:rPr>
+                <a:solidFill>
+                  <a:srgbClr val="003B4F"/>
+                </a:solidFill>
+                <a:latin typeface="Courier"/>
+              </a:rPr>
+              <a:t> JSON</a:t>
+            </a:r>
+            <a:r>
+              <a:rPr>
+                <a:solidFill>
+                  <a:srgbClr val="5E5E5E"/>
+                </a:solidFill>
+                <a:latin typeface="Courier"/>
+              </a:rPr>
+              <a:t>.</a:t>
+            </a:r>
+            <a:r>
+              <a:rPr>
+                <a:solidFill>
+                  <a:srgbClr val="4758AB"/>
+                </a:solidFill>
+                <a:latin typeface="Courier"/>
+              </a:rPr>
+              <a:t>parse</a:t>
+            </a:r>
+            <a:r>
+              <a:rPr>
+                <a:solidFill>
+                  <a:srgbClr val="003B4F"/>
+                </a:solidFill>
+                <a:latin typeface="Courier"/>
+              </a:rPr>
+              <a:t>(res)</a:t>
+            </a:r>
+            <a:r>
+              <a:rPr>
+                <a:solidFill>
+                  <a:srgbClr val="5E5E5E"/>
+                </a:solidFill>
+                <a:latin typeface="Courier"/>
+              </a:rPr>
+              <a:t>.</a:t>
+            </a:r>
+            <a:r>
+              <a:rPr>
+                <a:solidFill>
+                  <a:srgbClr val="657422"/>
+                </a:solidFill>
+                <a:latin typeface="Courier"/>
+              </a:rPr>
+              <a:t>azp</a:t>
+            </a:r>
+            <a:r>
+              <a:rPr>
+                <a:solidFill>
+                  <a:srgbClr val="5E5E5E"/>
+                </a:solidFill>
+                <a:latin typeface="Courier"/>
+              </a:rPr>
+              <a:t>;</a:t>
+            </a:r>
+            <a:r>
+              <a:rPr>
+                <a:solidFill>
+                  <a:srgbClr val="003B4F"/>
+                </a:solidFill>
+                <a:latin typeface="Courier"/>
+              </a:rPr>
+              <a:t> </a:t>
+            </a:r>
+            <a:br/>
+            <a:r>
+              <a:rPr>
+                <a:solidFill>
+                  <a:srgbClr val="003B4F"/>
+                </a:solidFill>
+                <a:latin typeface="Courier"/>
+              </a:rPr>
+              <a:t>Logger</a:t>
+            </a:r>
+            <a:r>
+              <a:rPr>
+                <a:solidFill>
+                  <a:srgbClr val="5E5E5E"/>
+                </a:solidFill>
+                <a:latin typeface="Courier"/>
+              </a:rPr>
+              <a:t>.</a:t>
+            </a:r>
+            <a:r>
+              <a:rPr>
+                <a:solidFill>
+                  <a:srgbClr val="4758AB"/>
+                </a:solidFill>
+                <a:latin typeface="Courier"/>
+              </a:rPr>
+              <a:t>log</a:t>
+            </a:r>
+            <a:r>
+              <a:rPr>
+                <a:solidFill>
+                  <a:srgbClr val="003B4F"/>
+                </a:solidFill>
+                <a:latin typeface="Courier"/>
+              </a:rPr>
+              <a:t>(clientId)</a:t>
+            </a:r>
+            <a:br/>
+            <a:r>
+              <a:rPr>
+                <a:solidFill>
+                  <a:srgbClr val="003B4F"/>
+                </a:solidFill>
+                <a:latin typeface="Courier"/>
+              </a:rPr>
+              <a:t>}</a:t>
             </a:r>
           </a:p>
           <a:p>
             <a:pPr lvl="0"/>
             <a:r>
               <a:rPr/>
-              <a:t>To go towards a Trusted List approach for users</a:t>
+              <a:t>When bulk uploading API changes, Google will email the initiator of that change when they are done. Note: it could take hours to complete. One school even had it take a week.</a:t>
             </a:r>
           </a:p>
           <a:p>
             <a:pPr lvl="1"/>
             <a:r>
               <a:rPr/>
-              <a:t>Go through the configured apps (marked as “limited”) and trust or block them. (remember, Google “configured” previously accessed apps for under 18 as limited)</a:t>
+              <a:t>From: The Google Workspace Team </a:t>
+            </a:r>
+            <a:r>
+              <a:rPr>
+                <a:hlinkClick r:id="rId2"/>
+              </a:rPr>
+              <a:t>workspace-noreply@google.com</a:t>
             </a:r>
           </a:p>
           <a:p>
             <a:pPr lvl="1"/>
             <a:r>
               <a:rPr/>
-              <a:t>Figure out how to handle the incoming app requests.</a:t>
+              <a:t>Subject: Google Admin Alert: Bulk upload report for yourdomain.org</a:t>
+            </a:r>
+          </a:p>
+          <a:p>
+            <a:pPr lvl="0"/>
+            <a:r>
+              <a:rPr/>
+              <a:t>Display a custom message for the blocked app message.</a:t>
             </a:r>
           </a:p>
           <a:p>
             <a:pPr lvl="1"/>
             <a:r>
               <a:rPr/>
-              <a:t>Look at all of the rest of the accessed apps and create our trusted list for the rest of our users. (this would be addressing the trusted list for over 18)</a:t>
+              <a:t>You cannot hyperlink but many schools use a short URL. Security &gt; Access and data control&gt; API Controls &gt; Settings &gt; Custom user message</a:t>
             </a:r>
           </a:p>
           <a:p>
             <a:pPr lvl="0"/>
             <a:r>
               <a:rPr/>
-              <a:t>Ways to “approve” apps</a:t>
+              <a:t>Check “trust internal apps”. This will avoid issues with accidentally blocking App Script users.</a:t>
             </a:r>
           </a:p>
           <a:p>
             <a:pPr lvl="1"/>
             <a:r>
               <a:rPr/>
-              <a:t>You can trust one by one, or a couple by couple by going into your configured or accessed app list from within the admin console. [image below]</a:t>
+              <a:t>WARNING! By allowing this, it could be security risk</a:t>
             </a:r>
           </a:p>
           <a:p>
             <a:pPr lvl="1"/>
             <a:r>
               <a:rPr/>
-              <a:t>You could “add an app” and trust.</a:t>
+              <a:t>Security &gt; Access and data control&gt; API Controls &gt; Settings &gt; Internal Apps</a:t>
+            </a:r>
+          </a:p>
+          <a:p>
+            <a:pPr lvl="0"/>
+            <a:r>
+              <a:rPr/>
+              <a:t>Google API - Users can view and remove their own Google API connections</a:t>
             </a:r>
           </a:p>
           <a:p>
             <a:pPr lvl="1"/>
             <a:r>
               <a:rPr/>
-              <a:t>Recommended: You can download the accessed apps list, bulk change access in a sheet, then bulk upload. [image below]</a:t>
-            </a:r>
-          </a:p>
-          <a:p>
-            <a:pPr lvl="0" indent="0" marL="0">
-              <a:buNone/>
-            </a:pPr>
-            <a:r>
-              <a:rPr/>
-              <a:t>image</a:t>
-            </a:r>
-          </a:p>
-          <a:p>
-            <a:pPr lvl="0" indent="0" marL="0">
-              <a:buNone/>
-            </a:pPr>
-            <a:r>
-              <a:rPr/>
-              <a:t>image</a:t>
+              <a:t>A great post on how end users can go into their account and see / manage connections.</a:t>
+            </a:r>
+          </a:p>
+          <a:p>
+            <a:pPr lvl="0"/>
+            <a:r>
+              <a:rPr/>
+              <a:t>When you add an API and choose the root to trust or block, it won’t automatically filter down to any sub org you individually configured and disinherit it from the root.</a:t>
+            </a:r>
+          </a:p>
+          <a:p>
+            <a:pPr lvl="1"/>
+            <a:r>
+              <a:rPr/>
+              <a:t>Directions in this Collab post</a:t>
             </a:r>
           </a:p>
         </p:txBody>
@@ -4611,7 +4988,7 @@
             </a:pPr>
             <a:r>
               <a:rPr/>
-              <a:t>Confirm setting before October 23rd</a:t>
+              <a:t>Resources</a:t>
             </a:r>
           </a:p>
         </p:txBody>
@@ -4631,21 +5008,76 @@
           <a:bodyPr/>
           <a:lstStyle/>
           <a:p>
+            <a:pPr lvl="0"/>
+            <a:r>
+              <a:rPr/>
+              <a:t>CDW Amplified Help Article: Manage access to unconfigured third-party apps</a:t>
+            </a:r>
+          </a:p>
+          <a:p>
+            <a:pPr lvl="0"/>
+            <a:r>
+              <a:rPr/>
+              <a:t>Google Support Page: Manage access to unconfigured third-party apps for users designated as under 18</a:t>
+            </a:r>
+          </a:p>
+          <a:p>
+            <a:pPr lvl="0"/>
+            <a:r>
+              <a:rPr/>
+              <a:t>Google Support Page: Control which third-party &amp; internal apps access Google Workspace data</a:t>
+            </a:r>
+          </a:p>
+          <a:p>
+            <a:pPr lvl="0"/>
+            <a:r>
+              <a:rPr/>
+              <a:t>Official Google YouTube Video: Google Workspace for Education Admin Console: How to review third party app access requests</a:t>
+            </a:r>
+          </a:p>
+          <a:p>
             <a:pPr lvl="0" indent="0" marL="0">
+              <a:spcBef>
+                <a:spcPts val="3000"/>
+              </a:spcBef>
               <a:buNone/>
             </a:pPr>
             <a:r>
-              <a:rPr/>
-              <a:t>This is the Guided Stepper Think of this as you signing off with “parental/guardian consent” YouTube video of this process.</a:t>
+              <a:rPr b="1"/>
+              <a:t>Collaborative Member Resources</a:t>
             </a:r>
           </a:p>
           <a:p>
             <a:pPr lvl="0" indent="0" marL="0">
+              <a:spcBef>
+                <a:spcPts val="3000"/>
+              </a:spcBef>
               <a:buNone/>
             </a:pPr>
             <a:r>
-              <a:rPr/>
-              <a:t>image</a:t>
+              <a:rPr b="1"/>
+              <a:t>September 14th Deep Dive</a:t>
+            </a:r>
+          </a:p>
+          <a:p>
+            <a:pPr lvl="0"/>
+            <a:r>
+              <a:rPr/>
+              <a:t>Collaborative Deep Dive - Back to School: Unpacking the Upcoming API Control Changes</a:t>
+            </a:r>
+          </a:p>
+          <a:p>
+            <a:pPr lvl="0"/>
+            <a:r>
+              <a:rPr/>
+              <a:t>Slide Deck | Timestamps &amp; Summary | Recording</a:t>
+            </a:r>
+          </a:p>
+          <a:p>
+            <a:pPr lvl="0"/>
+            <a:r>
+              <a:rPr/>
+              <a:t>Q &amp; A from the live stream</a:t>
             </a:r>
           </a:p>
         </p:txBody>

</xml_diff>

<commit_message>
deleted some files, added files, slideshow work
</commit_message>
<xml_diff>
--- a/docs/index.pptx
+++ b/docs/index.pptx
@@ -12,9 +12,6 @@
     <p:sldId id="260" r:id="rId6"/>
     <p:sldId id="261" r:id="rId7"/>
     <p:sldId id="262" r:id="rId8"/>
-    <p:sldId id="263" r:id="rId9"/>
-    <p:sldId id="264" r:id="rId10"/>
-    <p:sldId id="265" r:id="rId11"/>
   </p:sldIdLst>
   <p:sldSz cx="9144000" cy="5143500" type="screen16x9"/>
   <p:notesSz cx="6858000" cy="9144000"/>
@@ -3162,78 +3159,6 @@
 </p:sld>
 </file>
 
-<file path=ppt/slides/slide10.xml><?xml version="1.0" encoding="utf-8"?>
-<p:sld xmlns:a="http://schemas.openxmlformats.org/drawingml/2006/main" xmlns:r="http://schemas.openxmlformats.org/officeDocument/2006/relationships" xmlns:p="http://schemas.openxmlformats.org/presentationml/2006/main">
-  <p:cSld>
-    <p:spTree>
-      <p:nvGrpSpPr>
-        <p:cNvPr id="1" name=""/>
-        <p:cNvGrpSpPr/>
-        <p:nvPr/>
-      </p:nvGrpSpPr>
-      <p:grpSpPr>
-        <a:xfrm>
-          <a:off x="0" y="0"/>
-          <a:ext cx="0" cy="0"/>
-          <a:chOff x="0" y="0"/>
-          <a:chExt cx="0" cy="0"/>
-        </a:xfrm>
-      </p:grpSpPr>
-      <p:sp>
-        <p:nvSpPr>
-          <p:cNvPr id="2" name="Title 1"/>
-          <p:cNvSpPr>
-            <a:spLocks noGrp="1"/>
-          </p:cNvSpPr>
-          <p:nvPr>
-            <p:ph type="title"/>
-          </p:nvPr>
-        </p:nvSpPr>
-        <p:spPr/>
-        <p:txBody>
-          <a:bodyPr/>
-          <a:lstStyle/>
-          <a:p>
-            <a:pPr lvl="0" indent="0" marL="0">
-              <a:buNone/>
-            </a:pPr>
-            <a:r>
-              <a:rPr/>
-              <a:t>Visual Roadmap</a:t>
-            </a:r>
-          </a:p>
-        </p:txBody>
-      </p:sp>
-      <p:sp>
-        <p:nvSpPr>
-          <p:cNvPr id="3" name="Content Placeholder 2"/>
-          <p:cNvSpPr>
-            <a:spLocks noGrp="1"/>
-          </p:cNvSpPr>
-          <p:nvPr>
-            <p:ph idx="1"/>
-          </p:nvPr>
-        </p:nvSpPr>
-        <p:spPr/>
-        <p:txBody>
-          <a:bodyPr/>
-          <a:lstStyle/>
-          <a:p>
-            <a:pPr lvl="0" indent="0" marL="0">
-              <a:buNone/>
-            </a:pPr>
-            <a:r>
-              <a:rPr/>
-              <a:t>[]{fig-alt=” map of key milestones”}</a:t>
-            </a:r>
-          </a:p>
-        </p:txBody>
-      </p:sp>
-    </p:spTree>
-  </p:cSld>
-</p:sld>
-</file>
-
 <file path=ppt/slides/slide2.xml><?xml version="1.0" encoding="utf-8"?>
 <p:sld xmlns:a="http://schemas.openxmlformats.org/drawingml/2006/main" xmlns:r="http://schemas.openxmlformats.org/officeDocument/2006/relationships" xmlns:p="http://schemas.openxmlformats.org/presentationml/2006/main">
   <p:cSld>
@@ -3271,7 +3196,7 @@
             </a:pPr>
             <a:r>
               <a:rPr/>
-              <a:t>Purpose</a:t>
+              <a:t>Summary</a:t>
             </a:r>
           </a:p>
         </p:txBody>
@@ -3296,8 +3221,51 @@
             </a:pPr>
             <a:r>
               <a:rPr/>
-              <a:t>I’m taking my “one pager” Collaborative Corner about API Controls and migrating it into a single source to allow for multiple types of outputs for multiple types of communication and audiences. The one pager’s initial purpose was an easy and high level view of API Controls but it has turned into a 10 pager, with lots of information and written in various ways (ie blog post, how to, tutorial)</a:t>
-            </a:r>
+              <a:t>Hey there, Google Admins! We’re on the cusp of significant shifts in </a:t>
+            </a:r>
+            <a:r>
+              <a:rPr b="1"/>
+              <a:t>Google’s API control settings for users under 18</a:t>
+            </a:r>
+            <a:r>
+              <a:rPr/>
+              <a:t>, set to shake things up this coming October. This is a noteworthy moment, especially for schools that haven’t yet fine-tuned their API Control settings. And for those who think they’re one step ahead, hold on! A slew of fresh updates and changes have already landed in the admin console, causing ripples of impact.</a:t>
+            </a:r>
+          </a:p>
+          <a:p>
+            <a:pPr lvl="0" indent="0" marL="0">
+              <a:buNone/>
+            </a:pPr>
+            <a:r>
+              <a:rPr/>
+              <a:t>With the flurry of updates to the API Controls section in the admin console over the past couple of years, it’s time to take a breather and review the API controls, nail down best practices, identify necessary actions, and map out the route to get there.</a:t>
+            </a:r>
+          </a:p>
+          <a:p>
+            <a:pPr lvl="0" indent="0" marL="0">
+              <a:spcBef>
+                <a:spcPts val="3000"/>
+              </a:spcBef>
+              <a:buNone/>
+            </a:pPr>
+            <a:r>
+              <a:rPr b="1"/>
+              <a:t>TL;DR</a:t>
+            </a:r>
+          </a:p>
+          <a:p>
+            <a:pPr lvl="0" indent="0" marL="0">
+              <a:buNone/>
+            </a:pPr>
+            <a:r>
+              <a:rPr/>
+              <a:t>Google is pushing us towards a Trusted List approach for OAuth Apps, which will be implemented in October. Google Admins need to set up the trusted list and confirm settings before then.</a:t>
+            </a:r>
+          </a:p>
+          <a:p>
+            <a:pPr lvl="0" indent="0" marL="0">
+              <a:buNone/>
+            </a:pPr>
           </a:p>
         </p:txBody>
       </p:sp>
@@ -3343,7 +3311,7 @@
             </a:pPr>
             <a:r>
               <a:rPr/>
-              <a:t>Summary</a:t>
+              <a:t>Understanding the Updates</a:t>
             </a:r>
           </a:p>
         </p:txBody>
@@ -3368,24 +3336,31 @@
             </a:pPr>
             <a:r>
               <a:rPr/>
-              <a:t>Hey there, Google Admins! We’re on the cusp of significant shifts in </a:t>
-            </a:r>
-            <a:r>
-              <a:rPr b="1"/>
-              <a:t>Google’s API control settings for users under 18</a:t>
-            </a:r>
-            <a:r>
-              <a:rPr/>
-              <a:t>, set to shake things up this coming October. This is a noteworthy moment, especially for schools that haven’t yet fine-tuned their API Control settings. And for those who think they’re one step ahead, hold on! A slew of fresh updates and changes have already landed in the admin console, causing ripples of impact.</a:t>
-            </a:r>
-          </a:p>
-          <a:p>
-            <a:pPr lvl="0" indent="0" marL="0">
-              <a:buNone/>
-            </a:pPr>
-            <a:r>
-              <a:rPr/>
-              <a:t>With the flurry of updates to the API Controls section in the admin console over the past couple of years, it’s time to take a breather and review the API controls, nail down best practices, identify necessary actions, and map out the route to get there.</a:t>
+              <a:t>Google notified primary admins on June 19th, 2023, announcing new API Controls, changes in behavior for users under 18 regarding their access to third-party apps, and a requirement to review and confirm access settings to third-party apps by Oct. 23rd, 2023.</a:t>
+            </a:r>
+          </a:p>
+          <a:p>
+            <a:pPr lvl="0" indent="0" marL="1270000">
+              <a:buNone/>
+            </a:pPr>
+            <a:r>
+              <a:rPr sz="2000" b="1"/>
+              <a:t>Takeaway</a:t>
+            </a:r>
+          </a:p>
+          <a:p>
+            <a:pPr lvl="0" indent="0" marL="1270000">
+              <a:buNone/>
+            </a:pPr>
+            <a:r>
+              <a:rPr sz="2000"/>
+              <a:t>Google is making domains go to an OAuth App “Trusted List” for under 18 before Oct. 23rd, 2023 or students will lose access to OAuth apps. Read the </a:t>
+            </a:r>
+            <a:r>
+              <a:rPr sz="2000">
+                <a:hlinkClick r:id="rId2"/>
+              </a:rPr>
+              <a:t>full email</a:t>
             </a:r>
           </a:p>
           <a:p>
@@ -3397,7 +3372,7 @@
             </a:pPr>
             <a:r>
               <a:rPr b="1"/>
-              <a:t>TL;DR</a:t>
+              <a:t>Immediate Impact</a:t>
             </a:r>
           </a:p>
           <a:p>
@@ -3406,13 +3381,76 @@
             </a:pPr>
             <a:r>
               <a:rPr/>
-              <a:t>Google is pushing us towards a Trusted List approach for OAuth Apps, which will be implemented in October. Google Admins need to set up the trusted list and confirm settings before then.</a:t>
+              <a:t>Previously accessed apps should not be affected until October 23rd. Google has “configured” previously accessed apps from under 18 as limited.</a:t>
+            </a:r>
+          </a:p>
+          <a:p>
+            <a:pPr lvl="0" indent="0" marL="1270000">
+              <a:buNone/>
+            </a:pPr>
+            <a:r>
+              <a:rPr sz="2000" b="1"/>
+              <a:t>Note</a:t>
+            </a:r>
+          </a:p>
+          <a:p>
+            <a:pPr lvl="0" indent="0" marL="1270000">
+              <a:buNone/>
+            </a:pPr>
+            <a:r>
+              <a:rPr sz="2000"/>
+              <a:t>This is why you are seeing a lot more “configured apps”</a:t>
             </a:r>
           </a:p>
           <a:p>
             <a:pPr lvl="0" indent="0" marL="0">
               <a:buNone/>
             </a:pPr>
+            <a:r>
+              <a:rPr/>
+              <a:t>Any “new” app can not be accessed by under 18 and the user can “Request” the app.</a:t>
+            </a:r>
+          </a:p>
+          <a:p>
+            <a:pPr lvl="0" indent="0" marL="1270000">
+              <a:buNone/>
+            </a:pPr>
+            <a:r>
+              <a:rPr sz="2000" b="1"/>
+              <a:t>Note</a:t>
+            </a:r>
+          </a:p>
+          <a:p>
+            <a:pPr lvl="0" indent="0" marL="1270000">
+              <a:buNone/>
+            </a:pPr>
+            <a:r>
+              <a:rPr sz="2000"/>
+              <a:t>This is why you’re seeing requests (from students)</a:t>
+            </a:r>
+          </a:p>
+          <a:p>
+            <a:pPr lvl="0" indent="0" marL="0">
+              <a:buNone/>
+            </a:pPr>
+          </a:p>
+          <a:p>
+            <a:pPr lvl="0" indent="0" marL="1270000">
+              <a:buNone/>
+            </a:pPr>
+            <a:r>
+              <a:rPr sz="2000"/>
+              <a:t>“It’s like Google did the “Stop the bleed” approach for students for you.”</a:t>
+            </a:r>
+          </a:p>
+          <a:p>
+            <a:pPr lvl="0" indent="0" marL="1270000">
+              <a:buNone/>
+            </a:pPr>
+            <a:r>
+              <a:rPr sz="2000" i="1"/>
+              <a:t>- Melissa Benson</a:t>
+            </a:r>
           </a:p>
         </p:txBody>
       </p:sp>
@@ -3458,7 +3496,7 @@
             </a:pPr>
             <a:r>
               <a:rPr/>
-              <a:t>Understanding the Latest Updates</a:t>
+              <a:t>API Controls</a:t>
             </a:r>
           </a:p>
         </p:txBody>
@@ -3477,30 +3515,6 @@
         <p:txBody>
           <a:bodyPr/>
           <a:lstStyle/>
-          <a:p>
-            <a:pPr lvl="0" indent="0" marL="0">
-              <a:buNone/>
-            </a:pPr>
-            <a:r>
-              <a:rPr/>
-              <a:t>Google notified primary admins on June 19th, 2023, announcing new API Controls, changes in behavior for users under 18 regarding their access to third-party apps, and a requirement to review and confirm access settings to third-party apps by Oct. 23rd, 2023.</a:t>
-            </a:r>
-          </a:p>
-          <a:p>
-            <a:pPr lvl="0" indent="0" marL="0">
-              <a:buNone/>
-            </a:pPr>
-            <a:r>
-              <a:rPr/>
-              <a:t>Takeaway: Google is making domains go to an OAuth App “Trusted List” for under 18 before Oct. 23rd, 2023 or students will lose access to OAuth apps. Read the </a:t>
-            </a:r>
-            <a:r>
-              <a:rPr>
-                <a:hlinkClick r:id="rId2"/>
-              </a:rPr>
-              <a:t>full email</a:t>
-            </a:r>
-          </a:p>
           <a:p>
             <a:pPr lvl="0" indent="0" marL="0">
               <a:spcBef>
@@ -3510,58 +3524,94 @@
             </a:pPr>
             <a:r>
               <a:rPr b="1"/>
-              <a:t>Immediate Impact</a:t>
-            </a:r>
-          </a:p>
-          <a:p>
-            <a:pPr lvl="0"/>
-            <a:r>
-              <a:rPr/>
-              <a:t>Previously accessed apps should not be affected until October 23rd. Google has “configured” previously accessed apps from under 18 as limited.</a:t>
-            </a:r>
-          </a:p>
-          <a:p>
-            <a:pPr lvl="1"/>
-            <a:r>
-              <a:rPr/>
-              <a:t>This is why you are seeing a lot more “configured apps”</a:t>
-            </a:r>
-          </a:p>
-          <a:p>
-            <a:pPr lvl="0"/>
-            <a:r>
-              <a:rPr/>
-              <a:t>Any “new” app ca not be accessed by under 18 and the user can “Request” the app.</a:t>
-            </a:r>
-          </a:p>
-          <a:p>
-            <a:pPr lvl="1"/>
-            <a:r>
-              <a:rPr/>
-              <a:t>This is why you’re seeing requests (from students)</a:t>
+              <a:t>Overview</a:t>
             </a:r>
           </a:p>
           <a:p>
             <a:pPr lvl="0" indent="0" marL="0">
               <a:buNone/>
             </a:pPr>
-          </a:p>
-          <a:p>
-            <a:pPr lvl="0" indent="0" marL="1270000">
-              <a:buNone/>
-            </a:pPr>
-            <a:r>
-              <a:rPr sz="2000"/>
-              <a:t>“It’s like Google did the “Stop the bleed” approach for students for you.”</a:t>
-            </a:r>
-          </a:p>
-          <a:p>
-            <a:pPr lvl="0" indent="0" marL="1270000">
-              <a:buNone/>
-            </a:pPr>
-            <a:r>
-              <a:rPr sz="2000" i="1"/>
-              <a:t>- Melissa Benson</a:t>
+            <a:r>
+              <a:rPr/>
+              <a:t>When users sign in to third-party apps using the “Sign in with Google” option (single sign-on), you can control how those third-party apps access your organization’s Google data.</a:t>
+            </a:r>
+          </a:p>
+          <a:p>
+            <a:pPr lvl="0" indent="0" marL="0">
+              <a:buNone/>
+            </a:pPr>
+            <a:r>
+              <a:rPr b="1"/>
+              <a:t>API Controls Section:</a:t>
+            </a:r>
+          </a:p>
+          <a:p>
+            <a:pPr lvl="0" indent="0" marL="0">
+              <a:buNone/>
+            </a:pPr>
+            <a:r>
+              <a:rPr>
+                <a:latin typeface="Courier"/>
+              </a:rPr>
+              <a:t>Security &gt; Access and data controls &gt; API Controls</a:t>
+            </a:r>
+          </a:p>
+          <a:p>
+            <a:pPr lvl="0" indent="0" marL="0">
+              <a:buNone/>
+            </a:pPr>
+            <a:r>
+              <a:rPr b="1"/>
+              <a:t>Manage Third Party Apps:</a:t>
+            </a:r>
+          </a:p>
+          <a:p>
+            <a:pPr lvl="0" indent="0" marL="0">
+              <a:buNone/>
+            </a:pPr>
+            <a:r>
+              <a:rPr>
+                <a:latin typeface="Courier"/>
+              </a:rPr>
+              <a:t>Security &gt; Access and data controls &gt; API Controls &gt; Manage Third-Party Apps</a:t>
+            </a:r>
+          </a:p>
+          <a:p>
+            <a:pPr lvl="0" indent="0" marL="0">
+              <a:spcBef>
+                <a:spcPts val="3000"/>
+              </a:spcBef>
+              <a:buNone/>
+            </a:pPr>
+            <a:r>
+              <a:rPr b="1"/>
+              <a:t>Best Practices</a:t>
+            </a:r>
+          </a:p>
+          <a:p>
+            <a:pPr lvl="0" indent="0" marL="0">
+              <a:buNone/>
+            </a:pPr>
+            <a:r>
+              <a:rPr b="1"/>
+              <a:t>Students:</a:t>
+            </a:r>
+            <a:r>
+              <a:rPr/>
+              <a:t> (Default) Don’t allow users to access any third-party apps</a:t>
+            </a:r>
+          </a:p>
+          <a:p>
+            <a:pPr lvl="0" indent="0" marL="0">
+              <a:buNone/>
+            </a:pPr>
+            <a:r>
+              <a:rPr b="1"/>
+              <a:t>Staff:</a:t>
+            </a:r>
+            <a:r>
+              <a:rPr/>
+              <a:t> This needs to be discussed by the school. Be consistent with your other app policies. It’s best to lean towards a more controlled app approval process.</a:t>
             </a:r>
           </a:p>
         </p:txBody>
@@ -3608,7 +3658,7 @@
             </a:pPr>
             <a:r>
               <a:rPr/>
-              <a:t>API Controls: Overview and Best Practices</a:t>
+              <a:t>Required Actions</a:t>
             </a:r>
           </a:p>
         </p:txBody>
@@ -3627,6 +3677,40 @@
         <p:txBody>
           <a:bodyPr/>
           <a:lstStyle/>
+          <a:p>
+            <a:pPr lvl="0" indent="0" marL="0">
+              <a:buNone/>
+            </a:pPr>
+            <a:r>
+              <a:rPr b="1"/>
+              <a:t>The process boils down to two actions: </a:t>
+            </a:r>
+            <a:r>
+              <a:rPr b="1">
+                <a:latin typeface="Courier"/>
+              </a:rPr>
+              <a:t>Configure</a:t>
+            </a:r>
+            <a:r>
+              <a:rPr b="1"/>
+              <a:t> and </a:t>
+            </a:r>
+            <a:r>
+              <a:rPr b="1">
+                <a:latin typeface="Courier"/>
+              </a:rPr>
+              <a:t>Confirm</a:t>
+            </a:r>
+            <a:r>
+              <a:rPr b="1"/>
+              <a:t>.</a:t>
+            </a:r>
+          </a:p>
+          <a:p>
+            <a:pPr lvl="0" indent="0" marL="0">
+              <a:buNone/>
+            </a:pPr>
+          </a:p>
           <a:p>
             <a:pPr lvl="0" indent="0" marL="0">
               <a:spcBef>
@@ -3636,7 +3720,52 @@
             </a:pPr>
             <a:r>
               <a:rPr b="1"/>
-              <a:t>Overview</a:t>
+              <a:t>Configure</a:t>
+            </a:r>
+          </a:p>
+          <a:p>
+            <a:pPr lvl="0" indent="0" marL="1270000">
+              <a:buNone/>
+            </a:pPr>
+            <a:r>
+              <a:rPr sz="2000" b="1"/>
+              <a:t>Important</a:t>
+            </a:r>
+          </a:p>
+          <a:p>
+            <a:pPr lvl="0" indent="0" marL="1270000">
+              <a:buNone/>
+            </a:pPr>
+            <a:r>
+              <a:rPr sz="2000"/>
+              <a:t>Configure a trusted list of OAuth apps: This is a significant task as most schools see hundreds and thousands of accessed apps.</a:t>
+            </a:r>
+          </a:p>
+          <a:p>
+            <a:pPr lvl="0" indent="-342900" marL="342900">
+              <a:buAutoNum type="arabicPeriod"/>
+            </a:pPr>
+            <a:r>
+              <a:rPr/>
+              <a:t>Go through the configured apps (marked as “limited”) and trust or block them. (remember, Google “configured” previously accessed apps for under 18 as limited)</a:t>
+            </a:r>
+          </a:p>
+          <a:p>
+            <a:pPr lvl="0" indent="-342900" marL="342900">
+              <a:buAutoNum type="arabicPeriod"/>
+            </a:pPr>
+            <a:r>
+              <a:rPr/>
+              <a:t>Figure out how to handle the incoming app requests.</a:t>
+            </a:r>
+          </a:p>
+          <a:p>
+            <a:pPr lvl="0" indent="-342900" marL="342900">
+              <a:buAutoNum type="arabicPeriod"/>
+            </a:pPr>
+            <a:r>
+              <a:rPr/>
+              <a:t>Look at all of the rest of the accessed apps and create our trusted list for the rest of our users. (this would be addressing the trusted list for over 18)</a:t>
             </a:r>
           </a:p>
           <a:p>
@@ -3644,34 +3773,58 @@
               <a:buNone/>
             </a:pPr>
             <a:r>
-              <a:rPr/>
-              <a:t>When users sign in to third-party apps using the “Sign in with Google” option (single sign-on), you can control how those third-party apps access your organization’s Google data. Support Page</a:t>
+              <a:rPr b="1"/>
+              <a:t>Ways to “approve” apps</a:t>
+            </a:r>
+          </a:p>
+          <a:p>
+            <a:pPr lvl="0" indent="-342900" marL="342900">
+              <a:buAutoNum type="arabicPeriod"/>
+            </a:pPr>
+            <a:r>
+              <a:rPr/>
+              <a:t>You can trust one by one, or a couple by couple by going into your configured or accessed app list from within the admin console. [image below]</a:t>
+            </a:r>
+          </a:p>
+          <a:p>
+            <a:pPr lvl="0" indent="-342900" marL="342900">
+              <a:buAutoNum type="arabicPeriod"/>
+            </a:pPr>
+            <a:r>
+              <a:rPr/>
+              <a:t>You could “add an app” and trust.</a:t>
+            </a:r>
+          </a:p>
+          <a:p>
+            <a:pPr lvl="0" indent="-342900" marL="342900">
+              <a:buAutoNum type="arabicPeriod"/>
+            </a:pPr>
+            <a:r>
+              <a:rPr/>
+              <a:t>Recommended: You can download the accessed apps list, bulk change access in a sheet, then bulk upload. [image below]</a:t>
             </a:r>
           </a:p>
           <a:p>
             <a:pPr lvl="0" indent="0" marL="0">
               <a:buNone/>
             </a:pPr>
-            <a:r>
-              <a:rPr b="1"/>
-              <a:t>API Controls Section:</a:t>
-            </a:r>
-            <a:r>
-              <a:rPr/>
-              <a:t> Security &gt; Access and data controls &gt; API Controls</a:t>
-            </a:r>
-          </a:p>
-          <a:p>
-            <a:pPr lvl="0" indent="0" marL="0">
-              <a:buNone/>
-            </a:pPr>
-            <a:r>
-              <a:rPr b="1"/>
-              <a:t>Manage Third Party Apps:</a:t>
-            </a:r>
-            <a:r>
-              <a:rPr/>
-              <a:t> Security &gt; Access and data controls &gt; API Controls &gt; Manage Third-Party Apps</a:t>
+          </a:p>
+          <a:p>
+            <a:pPr lvl="0" indent="0" marL="1270000">
+              <a:buNone/>
+            </a:pPr>
+            <a:r>
+              <a:rPr sz="2000" b="1"/>
+              <a:t>Tip</a:t>
+            </a:r>
+          </a:p>
+          <a:p>
+            <a:pPr lvl="0" indent="0" marL="1270000">
+              <a:buNone/>
+            </a:pPr>
+            <a:r>
+              <a:rPr sz="2000"/>
+              <a:t>Watch the September Deep Dive for tips</a:t>
             </a:r>
           </a:p>
           <a:p>
@@ -3683,33 +3836,58 @@
             </a:pPr>
             <a:r>
               <a:rPr b="1"/>
-              <a:t>Best Practices</a:t>
-            </a:r>
-          </a:p>
-          <a:p>
-            <a:pPr lvl="0" indent="0" marL="0">
-              <a:buNone/>
-            </a:pPr>
-            <a:r>
-              <a:rPr b="1"/>
-              <a:t>Students:</a:t>
-            </a:r>
-            <a:r>
-              <a:rPr/>
-              <a:t> (Default) Don’t allow users to access any third-party apps</a:t>
-            </a:r>
-          </a:p>
-          <a:p>
-            <a:pPr lvl="0" indent="0" marL="0">
-              <a:buNone/>
-            </a:pPr>
-            <a:r>
-              <a:rPr b="1"/>
-              <a:t>Staff:</a:t>
-            </a:r>
-            <a:r>
-              <a:rPr/>
-              <a:t> This needs to be discussed by the school. Be consistent with your other app policies. It’s best to lean towards a more controlled app approval process.</a:t>
+              <a:t>Confirm</a:t>
+            </a:r>
+          </a:p>
+          <a:p>
+            <a:pPr lvl="0" indent="0" marL="1270000">
+              <a:buNone/>
+            </a:pPr>
+            <a:r>
+              <a:rPr sz="2000" b="1"/>
+              <a:t>Important</a:t>
+            </a:r>
+          </a:p>
+          <a:p>
+            <a:pPr lvl="0" indent="0" marL="1270000">
+              <a:buNone/>
+            </a:pPr>
+            <a:r>
+              <a:rPr sz="2000" b="1"/>
+              <a:t>Confirm setting before October 23rd</a:t>
+            </a:r>
+          </a:p>
+          <a:p>
+            <a:pPr lvl="0"/>
+            <a:r>
+              <a:rPr/>
+              <a:t>This is the </a:t>
+            </a:r>
+            <a:r>
+              <a:rPr>
+                <a:hlinkClick r:id="rId2"/>
+              </a:rPr>
+              <a:t>Guided Stepper</a:t>
+            </a:r>
+          </a:p>
+          <a:p>
+            <a:pPr lvl="0"/>
+            <a:r>
+              <a:rPr/>
+              <a:t>Think of this as you signing off with “parental/guardian consent”</a:t>
+            </a:r>
+          </a:p>
+          <a:p>
+            <a:pPr lvl="0"/>
+            <a:r>
+              <a:rPr>
+                <a:hlinkClick r:id="rId3"/>
+              </a:rPr>
+              <a:t>YouTube video</a:t>
+            </a:r>
+            <a:r>
+              <a:rPr/>
+              <a:t> of this process.</a:t>
             </a:r>
           </a:p>
         </p:txBody>
@@ -3756,7 +3934,7 @@
             </a:pPr>
             <a:r>
               <a:rPr/>
-              <a:t>Next Steps: 2 Required Action before Oct 23rd</a:t>
+              <a:t>FAQ</a:t>
             </a:r>
           </a:p>
         </p:txBody>
@@ -3776,199 +3954,157 @@
           <a:bodyPr/>
           <a:lstStyle/>
           <a:p>
-            <a:pPr lvl="0" indent="0" marL="0">
-              <a:buNone/>
-            </a:pPr>
-            <a:r>
-              <a:rPr/>
-              <a:t>The process boils down to two actions: Configure and Confirm.</a:t>
-            </a:r>
-          </a:p>
-          <a:p>
-            <a:pPr lvl="0" indent="0" marL="0">
-              <a:buNone/>
-            </a:pPr>
-          </a:p>
-          <a:p>
-            <a:pPr lvl="0" indent="0" marL="0">
-              <a:spcBef>
-                <a:spcPts val="3000"/>
-              </a:spcBef>
-              <a:buNone/>
-            </a:pPr>
-            <a:r>
-              <a:rPr b="1"/>
-              <a:t>Configure a trusted list of OAuth apps</a:t>
-            </a:r>
-          </a:p>
-          <a:p>
-            <a:pPr lvl="0" indent="0" marL="0">
-              <a:buNone/>
-            </a:pPr>
-            <a:r>
-              <a:rPr/>
-              <a:t>This is a significant task as most schools see hundreds and thousands of accessed apps. Here are the steps:</a:t>
-            </a:r>
-          </a:p>
-          <a:p>
-            <a:pPr lvl="0" indent="0" marL="0">
-              <a:spcBef>
-                <a:spcPts val="3000"/>
-              </a:spcBef>
-              <a:buNone/>
-            </a:pPr>
-            <a:r>
-              <a:rPr b="1"/>
-              <a:t>To go towards a Trusted List approach for users</a:t>
-            </a:r>
-          </a:p>
-          <a:p>
-            <a:pPr lvl="0" indent="-342900" marL="342900">
-              <a:buAutoNum type="arabicPeriod"/>
-            </a:pPr>
-            <a:r>
-              <a:rPr/>
-              <a:t>Go through the configured apps (marked as “limited”) and trust or block them. (remember, Google “configured” previously accessed apps for under 18 as limited)</a:t>
-            </a:r>
-          </a:p>
-          <a:p>
-            <a:pPr lvl="0" indent="-342900" marL="342900">
-              <a:buAutoNum type="arabicPeriod"/>
-            </a:pPr>
-            <a:r>
-              <a:rPr/>
-              <a:t>Figure out how to handle the incoming app requests.</a:t>
-            </a:r>
-          </a:p>
-          <a:p>
-            <a:pPr lvl="0" indent="-342900" marL="342900">
-              <a:buAutoNum type="arabicPeriod"/>
-            </a:pPr>
-            <a:r>
-              <a:rPr/>
-              <a:t>Look at all of the rest of the accessed apps and create our trusted list for the rest of our users. (this would be addressing the trusted list for over 18)</a:t>
-            </a:r>
-          </a:p>
-          <a:p>
-            <a:pPr lvl="0" indent="0" marL="0">
-              <a:spcBef>
-                <a:spcPts val="3000"/>
-              </a:spcBef>
-              <a:buNone/>
-            </a:pPr>
-            <a:r>
-              <a:rPr b="1"/>
-              <a:t>Ways to “approve” apps</a:t>
-            </a:r>
-          </a:p>
-          <a:p>
-            <a:pPr lvl="0" indent="-342900" marL="342900">
-              <a:buAutoNum type="arabicPeriod"/>
-            </a:pPr>
-            <a:r>
-              <a:rPr/>
-              <a:t>You can trust one by one, or a couple by couple by going into your configured or accessed app list from within the admin console. [image below]</a:t>
-            </a:r>
-          </a:p>
-          <a:p>
-            <a:pPr lvl="0" indent="-342900" marL="342900">
-              <a:buAutoNum type="arabicPeriod"/>
-            </a:pPr>
-            <a:r>
-              <a:rPr/>
-              <a:t>You could “add an app” and trust.</a:t>
-            </a:r>
-          </a:p>
-          <a:p>
-            <a:pPr lvl="0" indent="-342900" marL="342900">
-              <a:buAutoNum type="arabicPeriod"/>
-            </a:pPr>
-            <a:r>
-              <a:rPr/>
-              <a:t>Recommended: You can download the accessed apps list, bulk change access in a sheet, then bulk upload. [image below]</a:t>
-            </a:r>
-          </a:p>
-          <a:p>
-            <a:pPr lvl="0" indent="0" marL="0">
-              <a:buNone/>
-            </a:pPr>
-          </a:p>
-          <a:p>
-            <a:pPr lvl="0" indent="0" marL="0">
-              <a:spcBef>
-                <a:spcPts val="3000"/>
-              </a:spcBef>
-              <a:buNone/>
-            </a:pPr>
-            <a:r>
-              <a:rPr b="1"/>
-              <a:t>Creating a trusted list tips</a:t>
-            </a:r>
-          </a:p>
-          <a:p>
             <a:pPr lvl="0"/>
             <a:r>
               <a:rPr/>
-              <a:t>Check out the September 14th Deep Dive on this</a:t>
+              <a:t>Is there a maximum of configured apps?</a:t>
             </a:r>
           </a:p>
           <a:p>
             <a:pPr lvl="1"/>
             <a:r>
               <a:rPr/>
-              <a:t>Slide deck - slides</a:t>
+              <a:t>Yes, 15,000. We are in talks with Google about this</a:t>
+            </a:r>
+          </a:p>
+          <a:p>
+            <a:pPr lvl="0"/>
+            <a:r>
+              <a:rPr/>
+              <a:t>Can I unconfigure an app?</a:t>
             </a:r>
           </a:p>
           <a:p>
             <a:pPr lvl="1"/>
             <a:r>
               <a:rPr/>
-              <a:t>Recording</a:t>
-            </a:r>
-          </a:p>
-          <a:p>
-            <a:pPr lvl="0" indent="0" marL="0">
-              <a:spcBef>
-                <a:spcPts val="3000"/>
-              </a:spcBef>
-              <a:buNone/>
-            </a:pPr>
-            <a:r>
-              <a:rPr b="1"/>
-              <a:t>Confirm setting before October 23rd</a:t>
+              <a:t>It does not appear like you can truly “unconfigure” an app. We are talking to Google about this.</a:t>
             </a:r>
           </a:p>
           <a:p>
             <a:pPr lvl="0"/>
             <a:r>
               <a:rPr/>
-              <a:t>This is the </a:t>
-            </a:r>
-            <a:r>
-              <a:rPr>
-                <a:hlinkClick r:id="rId2"/>
-              </a:rPr>
-              <a:t>Guided Stepper</a:t>
+              <a:t>I’m having issues with the iPhone native mail and calendar apps when I’m blocking APIs</a:t>
+            </a:r>
+          </a:p>
+          <a:p>
+            <a:pPr lvl="1"/>
+            <a:r>
+              <a:rPr/>
+              <a:t>This is the full App ID for iOS in my console: 450232826690-0rm6bs9d2fps9tifvk2oodh3tasd7vl7.apps.googleusercontent.com.</a:t>
             </a:r>
           </a:p>
           <a:p>
             <a:pPr lvl="0"/>
             <a:r>
               <a:rPr/>
-              <a:t>Think of this as you signing off with “parental/guardian consent”</a:t>
+              <a:t>Can we disable the ability for students to “Request apps”?</a:t>
+            </a:r>
+          </a:p>
+          <a:p>
+            <a:pPr lvl="1"/>
+            <a:r>
+              <a:rPr/>
+              <a:t>No. But it is something we will talk about internally to see if there is a work around.</a:t>
+            </a:r>
+          </a:p>
+          <a:p>
+            <a:pPr lvl="1"/>
+            <a:r>
+              <a:rPr/>
+              <a:t>We asked Google and it’s “in the works”.</a:t>
             </a:r>
           </a:p>
           <a:p>
             <a:pPr lvl="0"/>
             <a:r>
-              <a:rPr>
-                <a:hlinkClick r:id="rId3"/>
-              </a:rPr>
-              <a:t>YouTube video</a:t>
-            </a:r>
-            <a:r>
-              <a:rPr/>
-              <a:t> of this process.</a:t>
+              <a:rPr/>
+              <a:t>Can staff request apps like students?</a:t>
+            </a:r>
+          </a:p>
+          <a:p>
+            <a:pPr lvl="1"/>
+            <a:r>
+              <a:rPr/>
+              <a:t>No. Only under 18 can request. We are asking Google. Most likely a temp thing. (hopefully)</a:t>
+            </a:r>
+          </a:p>
+          <a:p>
+            <a:pPr lvl="0"/>
+            <a:r>
+              <a:rPr/>
+              <a:t>Where does that “request” go (when students request access to an app)?</a:t>
+            </a:r>
+          </a:p>
+          <a:p>
+            <a:pPr lvl="1"/>
+            <a:r>
+              <a:rPr/>
+              <a:t>Admin Console Dashboard &gt; App access control card</a:t>
+            </a:r>
+          </a:p>
+          <a:p>
+            <a:pPr lvl="1"/>
+            <a:r>
+              <a:rPr/>
+              <a:t>Security &gt; API Controls &gt; App Access Control &gt; Manage Third-Party App Access. Then it’s the middle box across the top that says “Apps pending review”.</a:t>
+            </a:r>
+          </a:p>
+          <a:p>
+            <a:pPr lvl="0"/>
+            <a:r>
+              <a:rPr/>
+              <a:t>Can we see “who” requested the app? Can we get alerted?</a:t>
+            </a:r>
+          </a:p>
+          <a:p>
+            <a:pPr lvl="1"/>
+            <a:r>
+              <a:rPr/>
+              <a:t>Under Reporting &gt; Audit and investigation &gt; OAuth log events. Then add the condition “Event is Request”.</a:t>
+            </a:r>
+          </a:p>
+          <a:p>
+            <a:pPr lvl="1"/>
+            <a:r>
+              <a:rPr/>
+              <a:t>Yes, by creating a Custom Rule: With the previous navigation then click on “Create activity rule” or “Reporting Rule” (depending on your edition). It will walk you through creating a rule (alert) where you can have it get sent to the Alert Center and email people.</a:t>
+            </a:r>
+          </a:p>
+          <a:p>
+            <a:pPr lvl="0"/>
+            <a:r>
+              <a:rPr/>
+              <a:t>Can you explain the API Block-Exempt option when trusting an app?</a:t>
+            </a:r>
+          </a:p>
+          <a:p>
+            <a:pPr lvl="1"/>
+            <a:r>
+              <a:rPr/>
+              <a:t>This is for people with Standard or Plus and use Context Aware Access.</a:t>
+            </a:r>
+          </a:p>
+          <a:p>
+            <a:pPr lvl="1"/>
+            <a:r>
+              <a:rPr/>
+              <a:t>Selected apps maintain API access to Google Workspace services even when those services have Context-Aware Access policies that apply to API access. Resources: When adding an app, Assign Context-Aware access levels to apps, Use Cases. image</a:t>
+            </a:r>
+          </a:p>
+          <a:p>
+            <a:pPr lvl="0"/>
+            <a:r>
+              <a:rPr/>
+              <a:t>Q &amp; As from the after party</a:t>
+            </a:r>
+          </a:p>
+          <a:p>
+            <a:pPr lvl="1"/>
+            <a:r>
+              <a:rPr/>
+              <a:t>Slide 1, Slide 2, Slide 3</a:t>
             </a:r>
           </a:p>
         </p:txBody>
@@ -4015,7 +4151,7 @@
             </a:pPr>
             <a:r>
               <a:rPr/>
-              <a:t>FAQ</a:t>
+              <a:t>Resources</a:t>
             </a:r>
           </a:p>
         </p:txBody>
@@ -4035,978 +4171,14 @@
           <a:bodyPr/>
           <a:lstStyle/>
           <a:p>
-            <a:pPr lvl="0"/>
-            <a:r>
-              <a:rPr/>
-              <a:t>Is there a maximum of configured apps?</a:t>
-            </a:r>
-          </a:p>
-          <a:p>
-            <a:pPr lvl="1"/>
-            <a:r>
-              <a:rPr/>
-              <a:t>Yes, 15,000. We are in talks with Google about this</a:t>
-            </a:r>
-          </a:p>
-          <a:p>
-            <a:pPr lvl="0"/>
-            <a:r>
-              <a:rPr/>
-              <a:t>Can I unconfigure an app?</a:t>
-            </a:r>
-          </a:p>
-          <a:p>
-            <a:pPr lvl="1"/>
-            <a:r>
-              <a:rPr/>
-              <a:t>It does not appear like you can truly “unconfigure” an app. We are talking to Google about this.</a:t>
-            </a:r>
-          </a:p>
-          <a:p>
-            <a:pPr lvl="0"/>
-            <a:r>
-              <a:rPr/>
-              <a:t>I’m having issues with the iPhone native mail and calendar apps when I’m blocking APIs</a:t>
-            </a:r>
-          </a:p>
-          <a:p>
-            <a:pPr lvl="1"/>
-            <a:r>
-              <a:rPr/>
-              <a:t>This is the full App ID for iOS in my console: 450232826690-0rm6bs9d2fps9tifvk2oodh3tasd7vl7.apps.googleusercontent.com.</a:t>
-            </a:r>
-          </a:p>
-          <a:p>
-            <a:pPr lvl="0"/>
-            <a:r>
-              <a:rPr/>
-              <a:t>Can we disable the ability for students to “Request apps”?</a:t>
-            </a:r>
-          </a:p>
-          <a:p>
-            <a:pPr lvl="1"/>
-            <a:r>
-              <a:rPr/>
-              <a:t>No. But it is something we will talk about internally to see if there is a work around.</a:t>
-            </a:r>
-          </a:p>
-          <a:p>
-            <a:pPr lvl="1"/>
-            <a:r>
-              <a:rPr/>
-              <a:t>We asked Google and it’s “in the works”.</a:t>
-            </a:r>
-          </a:p>
-          <a:p>
-            <a:pPr lvl="0"/>
-            <a:r>
-              <a:rPr/>
-              <a:t>Can staff request apps like students?</a:t>
-            </a:r>
-          </a:p>
-          <a:p>
-            <a:pPr lvl="1"/>
-            <a:r>
-              <a:rPr/>
-              <a:t>No. Only under 18 can request. We are asking Google. Most likely a temp thing. (hopefully)</a:t>
-            </a:r>
-          </a:p>
-          <a:p>
-            <a:pPr lvl="0"/>
-            <a:r>
-              <a:rPr/>
-              <a:t>Where does that “request” go (when students request access to an app)?</a:t>
-            </a:r>
-          </a:p>
-          <a:p>
-            <a:pPr lvl="1"/>
-            <a:r>
-              <a:rPr/>
-              <a:t>Admin Console Dashboard &gt; App access control card</a:t>
-            </a:r>
-          </a:p>
-          <a:p>
-            <a:pPr lvl="1"/>
-            <a:r>
-              <a:rPr/>
-              <a:t>Security &gt; API Controls &gt; App Access Control &gt; Manage Third-Party App Access. Then it’s the middle box across the top that says “Apps pending review”.</a:t>
-            </a:r>
-          </a:p>
-          <a:p>
-            <a:pPr lvl="0"/>
-            <a:r>
-              <a:rPr/>
-              <a:t>Can we see “who” requested the app? Can we get alerted?</a:t>
-            </a:r>
-          </a:p>
-          <a:p>
-            <a:pPr lvl="1"/>
-            <a:r>
-              <a:rPr/>
-              <a:t>Under Reporting &gt; Audit and investigation &gt; OAuth log events. Then add the condition “Event is Request”.</a:t>
-            </a:r>
-          </a:p>
-          <a:p>
-            <a:pPr lvl="1"/>
-            <a:r>
-              <a:rPr/>
-              <a:t>Yes, by creating a Custom Rule: With the previous navigation then click on “Create activity rule” or “Reporting Rule” (depending on your edition). It will walk you through creating a rule (alert) where you can have it get sent to the Alert Center and email people.</a:t>
-            </a:r>
-          </a:p>
-          <a:p>
-            <a:pPr lvl="0"/>
-            <a:r>
-              <a:rPr/>
-              <a:t>Can you explain the API Block-Exempt option when trusting an app?</a:t>
-            </a:r>
-          </a:p>
-          <a:p>
-            <a:pPr lvl="1"/>
-            <a:r>
-              <a:rPr/>
-              <a:t>This is for people with Standard or Plus and use Context Aware Access.</a:t>
-            </a:r>
-          </a:p>
-          <a:p>
-            <a:pPr lvl="1"/>
-            <a:r>
-              <a:rPr/>
-              <a:t>Selected apps maintain API access to Google Workspace services even when those services have Context-Aware Access policies that apply to API access. Resources: When adding an app, Assign Context-Aware access levels to apps, Use Cases. image</a:t>
-            </a:r>
-          </a:p>
-          <a:p>
-            <a:pPr lvl="0"/>
-            <a:r>
-              <a:rPr/>
-              <a:t>Q &amp; As from the after party</a:t>
-            </a:r>
-          </a:p>
-          <a:p>
-            <a:pPr lvl="1"/>
-            <a:r>
-              <a:rPr/>
-              <a:t>Slide 1, Slide 2, Slide 3</a:t>
-            </a:r>
-          </a:p>
-        </p:txBody>
-      </p:sp>
-    </p:spTree>
-  </p:cSld>
-</p:sld>
-</file>
-
-<file path=ppt/slides/slide8.xml><?xml version="1.0" encoding="utf-8"?>
-<p:sld xmlns:a="http://schemas.openxmlformats.org/drawingml/2006/main" xmlns:r="http://schemas.openxmlformats.org/officeDocument/2006/relationships" xmlns:p="http://schemas.openxmlformats.org/presentationml/2006/main">
-  <p:cSld>
-    <p:spTree>
-      <p:nvGrpSpPr>
-        <p:cNvPr id="1" name=""/>
-        <p:cNvGrpSpPr/>
-        <p:nvPr/>
-      </p:nvGrpSpPr>
-      <p:grpSpPr>
-        <a:xfrm>
-          <a:off x="0" y="0"/>
-          <a:ext cx="0" cy="0"/>
-          <a:chOff x="0" y="0"/>
-          <a:chExt cx="0" cy="0"/>
-        </a:xfrm>
-      </p:grpSpPr>
-      <p:sp>
-        <p:nvSpPr>
-          <p:cNvPr id="2" name="Title 1"/>
-          <p:cNvSpPr>
-            <a:spLocks noGrp="1"/>
-          </p:cNvSpPr>
-          <p:nvPr>
-            <p:ph type="title"/>
-          </p:nvPr>
-        </p:nvSpPr>
-        <p:spPr/>
-        <p:txBody>
-          <a:bodyPr/>
-          <a:lstStyle/>
-          <a:p>
             <a:pPr lvl="0" indent="0" marL="0">
               <a:buNone/>
             </a:pPr>
             <a:r>
-              <a:rPr/>
-              <a:t>Pro Tips</a:t>
-            </a:r>
-          </a:p>
-        </p:txBody>
-      </p:sp>
-      <p:sp>
-        <p:nvSpPr>
-          <p:cNvPr id="3" name="Content Placeholder 2"/>
-          <p:cNvSpPr>
-            <a:spLocks noGrp="1"/>
-          </p:cNvSpPr>
-          <p:nvPr>
-            <p:ph idx="1"/>
-          </p:nvPr>
-        </p:nvSpPr>
-        <p:spPr/>
-        <p:txBody>
-          <a:bodyPr/>
-          <a:lstStyle/>
-          <a:p>
-            <a:pPr lvl="0"/>
-            <a:r>
-              <a:rPr/>
-              <a:t>Apps Script</a:t>
-            </a:r>
-          </a:p>
-          <a:p>
-            <a:pPr lvl="0" indent="0">
-              <a:buNone/>
-            </a:pPr>
-            <a:r>
-              <a:rPr>
-                <a:solidFill>
-                  <a:srgbClr val="003B4F"/>
-                </a:solidFill>
-                <a:latin typeface="Courier"/>
-              </a:rPr>
-              <a:t>function </a:t>
-            </a:r>
-            <a:r>
-              <a:rPr>
-                <a:solidFill>
-                  <a:srgbClr val="4758AB"/>
-                </a:solidFill>
-                <a:latin typeface="Courier"/>
-              </a:rPr>
-              <a:t>getToken</a:t>
-            </a:r>
-            <a:r>
-              <a:rPr>
-                <a:solidFill>
-                  <a:srgbClr val="003B4F"/>
-                </a:solidFill>
-                <a:latin typeface="Courier"/>
-              </a:rPr>
-              <a:t>()</a:t>
-            </a:r>
-            <a:br/>
-            <a:r>
-              <a:rPr>
-                <a:solidFill>
-                  <a:srgbClr val="003B4F"/>
-                </a:solidFill>
-                <a:latin typeface="Courier"/>
-              </a:rPr>
-              <a:t>{  </a:t>
-            </a:r>
-            <a:br/>
-            <a:r>
-              <a:rPr>
-                <a:solidFill>
-                  <a:srgbClr val="003B4F"/>
-                </a:solidFill>
-                <a:latin typeface="Courier"/>
-              </a:rPr>
-              <a:t>var accessToken </a:t>
-            </a:r>
-            <a:r>
-              <a:rPr>
-                <a:solidFill>
-                  <a:srgbClr val="5E5E5E"/>
-                </a:solidFill>
-                <a:latin typeface="Courier"/>
-              </a:rPr>
-              <a:t>=</a:t>
-            </a:r>
-            <a:r>
-              <a:rPr>
-                <a:solidFill>
-                  <a:srgbClr val="003B4F"/>
-                </a:solidFill>
-                <a:latin typeface="Courier"/>
-              </a:rPr>
-              <a:t> ScriptApp</a:t>
-            </a:r>
-            <a:r>
-              <a:rPr>
-                <a:solidFill>
-                  <a:srgbClr val="5E5E5E"/>
-                </a:solidFill>
-                <a:latin typeface="Courier"/>
-              </a:rPr>
-              <a:t>.</a:t>
-            </a:r>
-            <a:r>
-              <a:rPr>
-                <a:solidFill>
-                  <a:srgbClr val="4758AB"/>
-                </a:solidFill>
-                <a:latin typeface="Courier"/>
-              </a:rPr>
-              <a:t>getOAuthToken</a:t>
-            </a:r>
-            <a:r>
-              <a:rPr>
-                <a:solidFill>
-                  <a:srgbClr val="003B4F"/>
-                </a:solidFill>
-                <a:latin typeface="Courier"/>
-              </a:rPr>
-              <a:t>()</a:t>
-            </a:r>
-            <a:r>
-              <a:rPr>
-                <a:solidFill>
-                  <a:srgbClr val="5E5E5E"/>
-                </a:solidFill>
-                <a:latin typeface="Courier"/>
-              </a:rPr>
-              <a:t>;</a:t>
-            </a:r>
-            <a:r>
-              <a:rPr>
-                <a:solidFill>
-                  <a:srgbClr val="003B4F"/>
-                </a:solidFill>
-                <a:latin typeface="Courier"/>
-              </a:rPr>
-              <a:t>  var url </a:t>
-            </a:r>
-            <a:r>
-              <a:rPr>
-                <a:solidFill>
-                  <a:srgbClr val="5E5E5E"/>
-                </a:solidFill>
-                <a:latin typeface="Courier"/>
-              </a:rPr>
-              <a:t>=</a:t>
-            </a:r>
-            <a:r>
-              <a:rPr>
-                <a:solidFill>
-                  <a:srgbClr val="003B4F"/>
-                </a:solidFill>
-                <a:latin typeface="Courier"/>
-              </a:rPr>
-              <a:t> </a:t>
-            </a:r>
-            <a:r>
-              <a:rPr>
-                <a:solidFill>
-                  <a:srgbClr val="20794D"/>
-                </a:solidFill>
-                <a:latin typeface="Courier"/>
-              </a:rPr>
-              <a:t>"https://www.googleapis.com/oauth2/v3/tokeninfo"</a:t>
-            </a:r>
-            <a:r>
-              <a:rPr>
-                <a:solidFill>
-                  <a:srgbClr val="5E5E5E"/>
-                </a:solidFill>
-                <a:latin typeface="Courier"/>
-              </a:rPr>
-              <a:t>;</a:t>
-            </a:r>
-            <a:r>
-              <a:rPr>
-                <a:solidFill>
-                  <a:srgbClr val="003B4F"/>
-                </a:solidFill>
-                <a:latin typeface="Courier"/>
-              </a:rPr>
-              <a:t> </a:t>
-            </a:r>
-            <a:br/>
-            <a:r>
-              <a:rPr>
-                <a:solidFill>
-                  <a:srgbClr val="003B4F"/>
-                </a:solidFill>
-                <a:latin typeface="Courier"/>
-              </a:rPr>
-              <a:t>var params </a:t>
-            </a:r>
-            <a:r>
-              <a:rPr>
-                <a:solidFill>
-                  <a:srgbClr val="5E5E5E"/>
-                </a:solidFill>
-                <a:latin typeface="Courier"/>
-              </a:rPr>
-              <a:t>=</a:t>
-            </a:r>
-            <a:r>
-              <a:rPr>
-                <a:solidFill>
-                  <a:srgbClr val="003B4F"/>
-                </a:solidFill>
-                <a:latin typeface="Courier"/>
-              </a:rPr>
-              <a:t> { </a:t>
-            </a:r>
-            <a:r>
-              <a:rPr>
-                <a:solidFill>
-                  <a:srgbClr val="AD0000"/>
-                </a:solidFill>
-                <a:latin typeface="Courier"/>
-              </a:rPr>
-              <a:t>method</a:t>
-            </a:r>
-            <a:r>
-              <a:rPr>
-                <a:solidFill>
-                  <a:srgbClr val="5E5E5E"/>
-                </a:solidFill>
-                <a:latin typeface="Courier"/>
-              </a:rPr>
-              <a:t>:</a:t>
-            </a:r>
-            <a:r>
-              <a:rPr>
-                <a:solidFill>
-                  <a:srgbClr val="003B4F"/>
-                </a:solidFill>
-                <a:latin typeface="Courier"/>
-              </a:rPr>
-              <a:t> </a:t>
-            </a:r>
-            <a:r>
-              <a:rPr>
-                <a:solidFill>
-                  <a:srgbClr val="20794D"/>
-                </a:solidFill>
-                <a:latin typeface="Courier"/>
-              </a:rPr>
-              <a:t>"post"</a:t>
-            </a:r>
-            <a:r>
-              <a:rPr>
-                <a:solidFill>
-                  <a:srgbClr val="5E5E5E"/>
-                </a:solidFill>
-                <a:latin typeface="Courier"/>
-              </a:rPr>
-              <a:t>,</a:t>
-            </a:r>
-            <a:r>
-              <a:rPr>
-                <a:solidFill>
-                  <a:srgbClr val="003B4F"/>
-                </a:solidFill>
-                <a:latin typeface="Courier"/>
-              </a:rPr>
-              <a:t> </a:t>
-            </a:r>
-            <a:r>
-              <a:rPr>
-                <a:solidFill>
-                  <a:srgbClr val="AD0000"/>
-                </a:solidFill>
-                <a:latin typeface="Courier"/>
-              </a:rPr>
-              <a:t>headers</a:t>
-            </a:r>
-            <a:r>
-              <a:rPr>
-                <a:solidFill>
-                  <a:srgbClr val="5E5E5E"/>
-                </a:solidFill>
-                <a:latin typeface="Courier"/>
-              </a:rPr>
-              <a:t>:</a:t>
-            </a:r>
-            <a:r>
-              <a:rPr>
-                <a:solidFill>
-                  <a:srgbClr val="003B4F"/>
-                </a:solidFill>
-                <a:latin typeface="Courier"/>
-              </a:rPr>
-              <a:t> {</a:t>
-            </a:r>
-            <a:r>
-              <a:rPr>
-                <a:solidFill>
-                  <a:srgbClr val="20794D"/>
-                </a:solidFill>
-                <a:latin typeface="Courier"/>
-              </a:rPr>
-              <a:t>"Authorization"</a:t>
-            </a:r>
-            <a:r>
-              <a:rPr>
-                <a:solidFill>
-                  <a:srgbClr val="5E5E5E"/>
-                </a:solidFill>
-                <a:latin typeface="Courier"/>
-              </a:rPr>
-              <a:t>:</a:t>
-            </a:r>
-            <a:r>
-              <a:rPr>
-                <a:solidFill>
-                  <a:srgbClr val="003B4F"/>
-                </a:solidFill>
-                <a:latin typeface="Courier"/>
-              </a:rPr>
-              <a:t> </a:t>
-            </a:r>
-            <a:r>
-              <a:rPr>
-                <a:solidFill>
-                  <a:srgbClr val="20794D"/>
-                </a:solidFill>
-                <a:latin typeface="Courier"/>
-              </a:rPr>
-              <a:t>"Bearer "</a:t>
-            </a:r>
-            <a:r>
-              <a:rPr>
-                <a:solidFill>
-                  <a:srgbClr val="003B4F"/>
-                </a:solidFill>
-                <a:latin typeface="Courier"/>
-              </a:rPr>
-              <a:t> </a:t>
-            </a:r>
-            <a:r>
-              <a:rPr>
-                <a:solidFill>
-                  <a:srgbClr val="5E5E5E"/>
-                </a:solidFill>
-                <a:latin typeface="Courier"/>
-              </a:rPr>
-              <a:t>+</a:t>
-            </a:r>
-            <a:r>
-              <a:rPr>
-                <a:solidFill>
-                  <a:srgbClr val="003B4F"/>
-                </a:solidFill>
-                <a:latin typeface="Courier"/>
-              </a:rPr>
-              <a:t> accessToken} }</a:t>
-            </a:r>
-            <a:r>
-              <a:rPr>
-                <a:solidFill>
-                  <a:srgbClr val="5E5E5E"/>
-                </a:solidFill>
-                <a:latin typeface="Courier"/>
-              </a:rPr>
-              <a:t>;</a:t>
-            </a:r>
-            <a:r>
-              <a:rPr>
-                <a:solidFill>
-                  <a:srgbClr val="003B4F"/>
-                </a:solidFill>
-                <a:latin typeface="Courier"/>
-              </a:rPr>
-              <a:t> </a:t>
-            </a:r>
-            <a:br/>
-            <a:r>
-              <a:rPr>
-                <a:solidFill>
-                  <a:srgbClr val="003B4F"/>
-                </a:solidFill>
-                <a:latin typeface="Courier"/>
-              </a:rPr>
-              <a:t>var res </a:t>
-            </a:r>
-            <a:r>
-              <a:rPr>
-                <a:solidFill>
-                  <a:srgbClr val="5E5E5E"/>
-                </a:solidFill>
-                <a:latin typeface="Courier"/>
-              </a:rPr>
-              <a:t>=</a:t>
-            </a:r>
-            <a:r>
-              <a:rPr>
-                <a:solidFill>
-                  <a:srgbClr val="003B4F"/>
-                </a:solidFill>
-                <a:latin typeface="Courier"/>
-              </a:rPr>
-              <a:t> UrlFetchApp</a:t>
-            </a:r>
-            <a:r>
-              <a:rPr>
-                <a:solidFill>
-                  <a:srgbClr val="5E5E5E"/>
-                </a:solidFill>
-                <a:latin typeface="Courier"/>
-              </a:rPr>
-              <a:t>.</a:t>
-            </a:r>
-            <a:r>
-              <a:rPr>
-                <a:solidFill>
-                  <a:srgbClr val="4758AB"/>
-                </a:solidFill>
-                <a:latin typeface="Courier"/>
-              </a:rPr>
-              <a:t>fetch</a:t>
-            </a:r>
-            <a:r>
-              <a:rPr>
-                <a:solidFill>
-                  <a:srgbClr val="003B4F"/>
-                </a:solidFill>
-                <a:latin typeface="Courier"/>
-              </a:rPr>
-              <a:t>(url</a:t>
-            </a:r>
-            <a:r>
-              <a:rPr>
-                <a:solidFill>
-                  <a:srgbClr val="5E5E5E"/>
-                </a:solidFill>
-                <a:latin typeface="Courier"/>
-              </a:rPr>
-              <a:t>,</a:t>
-            </a:r>
-            <a:r>
-              <a:rPr>
-                <a:solidFill>
-                  <a:srgbClr val="003B4F"/>
-                </a:solidFill>
-                <a:latin typeface="Courier"/>
-              </a:rPr>
-              <a:t> params)</a:t>
-            </a:r>
-            <a:r>
-              <a:rPr>
-                <a:solidFill>
-                  <a:srgbClr val="5E5E5E"/>
-                </a:solidFill>
-                <a:latin typeface="Courier"/>
-              </a:rPr>
-              <a:t>.</a:t>
-            </a:r>
-            <a:r>
-              <a:rPr>
-                <a:solidFill>
-                  <a:srgbClr val="4758AB"/>
-                </a:solidFill>
-                <a:latin typeface="Courier"/>
-              </a:rPr>
-              <a:t>getContentText</a:t>
-            </a:r>
-            <a:r>
-              <a:rPr>
-                <a:solidFill>
-                  <a:srgbClr val="003B4F"/>
-                </a:solidFill>
-                <a:latin typeface="Courier"/>
-              </a:rPr>
-              <a:t>()</a:t>
-            </a:r>
-            <a:r>
-              <a:rPr>
-                <a:solidFill>
-                  <a:srgbClr val="5E5E5E"/>
-                </a:solidFill>
-                <a:latin typeface="Courier"/>
-              </a:rPr>
-              <a:t>;</a:t>
-            </a:r>
-            <a:r>
-              <a:rPr>
-                <a:solidFill>
-                  <a:srgbClr val="003B4F"/>
-                </a:solidFill>
-                <a:latin typeface="Courier"/>
-              </a:rPr>
-              <a:t>  var clientId </a:t>
-            </a:r>
-            <a:r>
-              <a:rPr>
-                <a:solidFill>
-                  <a:srgbClr val="5E5E5E"/>
-                </a:solidFill>
-                <a:latin typeface="Courier"/>
-              </a:rPr>
-              <a:t>=</a:t>
-            </a:r>
-            <a:r>
-              <a:rPr>
-                <a:solidFill>
-                  <a:srgbClr val="003B4F"/>
-                </a:solidFill>
-                <a:latin typeface="Courier"/>
-              </a:rPr>
-              <a:t> JSON</a:t>
-            </a:r>
-            <a:r>
-              <a:rPr>
-                <a:solidFill>
-                  <a:srgbClr val="5E5E5E"/>
-                </a:solidFill>
-                <a:latin typeface="Courier"/>
-              </a:rPr>
-              <a:t>.</a:t>
-            </a:r>
-            <a:r>
-              <a:rPr>
-                <a:solidFill>
-                  <a:srgbClr val="4758AB"/>
-                </a:solidFill>
-                <a:latin typeface="Courier"/>
-              </a:rPr>
-              <a:t>parse</a:t>
-            </a:r>
-            <a:r>
-              <a:rPr>
-                <a:solidFill>
-                  <a:srgbClr val="003B4F"/>
-                </a:solidFill>
-                <a:latin typeface="Courier"/>
-              </a:rPr>
-              <a:t>(res)</a:t>
-            </a:r>
-            <a:r>
-              <a:rPr>
-                <a:solidFill>
-                  <a:srgbClr val="5E5E5E"/>
-                </a:solidFill>
-                <a:latin typeface="Courier"/>
-              </a:rPr>
-              <a:t>.</a:t>
-            </a:r>
-            <a:r>
-              <a:rPr>
-                <a:solidFill>
-                  <a:srgbClr val="657422"/>
-                </a:solidFill>
-                <a:latin typeface="Courier"/>
-              </a:rPr>
-              <a:t>azp</a:t>
-            </a:r>
-            <a:r>
-              <a:rPr>
-                <a:solidFill>
-                  <a:srgbClr val="5E5E5E"/>
-                </a:solidFill>
-                <a:latin typeface="Courier"/>
-              </a:rPr>
-              <a:t>;</a:t>
-            </a:r>
-            <a:r>
-              <a:rPr>
-                <a:solidFill>
-                  <a:srgbClr val="003B4F"/>
-                </a:solidFill>
-                <a:latin typeface="Courier"/>
-              </a:rPr>
-              <a:t> </a:t>
-            </a:r>
-            <a:br/>
-            <a:r>
-              <a:rPr>
-                <a:solidFill>
-                  <a:srgbClr val="003B4F"/>
-                </a:solidFill>
-                <a:latin typeface="Courier"/>
-              </a:rPr>
-              <a:t>Logger</a:t>
-            </a:r>
-            <a:r>
-              <a:rPr>
-                <a:solidFill>
-                  <a:srgbClr val="5E5E5E"/>
-                </a:solidFill>
-                <a:latin typeface="Courier"/>
-              </a:rPr>
-              <a:t>.</a:t>
-            </a:r>
-            <a:r>
-              <a:rPr>
-                <a:solidFill>
-                  <a:srgbClr val="4758AB"/>
-                </a:solidFill>
-                <a:latin typeface="Courier"/>
-              </a:rPr>
-              <a:t>log</a:t>
-            </a:r>
-            <a:r>
-              <a:rPr>
-                <a:solidFill>
-                  <a:srgbClr val="003B4F"/>
-                </a:solidFill>
-                <a:latin typeface="Courier"/>
-              </a:rPr>
-              <a:t>(clientId)</a:t>
-            </a:r>
-            <a:br/>
-            <a:r>
-              <a:rPr>
-                <a:solidFill>
-                  <a:srgbClr val="003B4F"/>
-                </a:solidFill>
-                <a:latin typeface="Courier"/>
-              </a:rPr>
-              <a:t>}</a:t>
-            </a:r>
-          </a:p>
-          <a:p>
-            <a:pPr lvl="0"/>
-            <a:r>
-              <a:rPr/>
-              <a:t>When bulk uploading API changes, Google will email the initiator of that change when they are done. Note: it could take hours to complete. One school even had it take a week.</a:t>
-            </a:r>
-          </a:p>
-          <a:p>
-            <a:pPr lvl="1"/>
-            <a:r>
-              <a:rPr/>
-              <a:t>From: The Google Workspace Team </a:t>
-            </a:r>
-            <a:r>
-              <a:rPr>
-                <a:hlinkClick r:id="rId2"/>
-              </a:rPr>
-              <a:t>workspace-noreply@google.com</a:t>
-            </a:r>
-          </a:p>
-          <a:p>
-            <a:pPr lvl="1"/>
-            <a:r>
-              <a:rPr/>
-              <a:t>Subject: Google Admin Alert: Bulk upload report for yourdomain.org</a:t>
-            </a:r>
-          </a:p>
-          <a:p>
-            <a:pPr lvl="0"/>
-            <a:r>
-              <a:rPr/>
-              <a:t>Display a custom message for the blocked app message.</a:t>
-            </a:r>
-          </a:p>
-          <a:p>
-            <a:pPr lvl="1"/>
-            <a:r>
-              <a:rPr/>
-              <a:t>You cannot hyperlink but many schools use a short URL. Security &gt; Access and data control&gt; API Controls &gt; Settings &gt; Custom user message</a:t>
-            </a:r>
-          </a:p>
-          <a:p>
-            <a:pPr lvl="0"/>
-            <a:r>
-              <a:rPr/>
-              <a:t>Check “trust internal apps”. This will avoid issues with accidentally blocking App Script users.</a:t>
-            </a:r>
-          </a:p>
-          <a:p>
-            <a:pPr lvl="1"/>
-            <a:r>
-              <a:rPr/>
-              <a:t>WARNING! By allowing this, it could be security risk</a:t>
-            </a:r>
-          </a:p>
-          <a:p>
-            <a:pPr lvl="1"/>
-            <a:r>
-              <a:rPr/>
-              <a:t>Security &gt; Access and data control&gt; API Controls &gt; Settings &gt; Internal Apps</a:t>
-            </a:r>
-          </a:p>
-          <a:p>
-            <a:pPr lvl="0"/>
-            <a:r>
-              <a:rPr/>
-              <a:t>Google API - Users can view and remove their own Google API connections</a:t>
-            </a:r>
-          </a:p>
-          <a:p>
-            <a:pPr lvl="1"/>
-            <a:r>
-              <a:rPr/>
-              <a:t>A great post on how end users can go into their account and see / manage connections.</a:t>
-            </a:r>
-          </a:p>
-          <a:p>
-            <a:pPr lvl="0"/>
-            <a:r>
-              <a:rPr/>
-              <a:t>When you add an API and choose the root to trust or block, it won’t automatically filter down to any sub org you individually configured and disinherit it from the root.</a:t>
-            </a:r>
-          </a:p>
-          <a:p>
-            <a:pPr lvl="1"/>
-            <a:r>
-              <a:rPr/>
-              <a:t>Directions in this Collab post</a:t>
-            </a:r>
-          </a:p>
-        </p:txBody>
-      </p:sp>
-    </p:spTree>
-  </p:cSld>
-</p:sld>
-</file>
-
-<file path=ppt/slides/slide9.xml><?xml version="1.0" encoding="utf-8"?>
-<p:sld xmlns:a="http://schemas.openxmlformats.org/drawingml/2006/main" xmlns:r="http://schemas.openxmlformats.org/officeDocument/2006/relationships" xmlns:p="http://schemas.openxmlformats.org/presentationml/2006/main">
-  <p:cSld>
-    <p:spTree>
-      <p:nvGrpSpPr>
-        <p:cNvPr id="1" name=""/>
-        <p:cNvGrpSpPr/>
-        <p:nvPr/>
-      </p:nvGrpSpPr>
-      <p:grpSpPr>
-        <a:xfrm>
-          <a:off x="0" y="0"/>
-          <a:ext cx="0" cy="0"/>
-          <a:chOff x="0" y="0"/>
-          <a:chExt cx="0" cy="0"/>
-        </a:xfrm>
-      </p:grpSpPr>
-      <p:sp>
-        <p:nvSpPr>
-          <p:cNvPr id="2" name="Title 1"/>
-          <p:cNvSpPr>
-            <a:spLocks noGrp="1"/>
-          </p:cNvSpPr>
-          <p:nvPr>
-            <p:ph type="title"/>
-          </p:nvPr>
-        </p:nvSpPr>
-        <p:spPr/>
-        <p:txBody>
-          <a:bodyPr/>
-          <a:lstStyle/>
-          <a:p>
-            <a:pPr lvl="0" indent="0" marL="0">
-              <a:buNone/>
-            </a:pPr>
-            <a:r>
-              <a:rPr/>
-              <a:t>Resources</a:t>
-            </a:r>
-          </a:p>
-        </p:txBody>
-      </p:sp>
-      <p:sp>
-        <p:nvSpPr>
-          <p:cNvPr id="3" name="Content Placeholder 2"/>
-          <p:cNvSpPr>
-            <a:spLocks noGrp="1"/>
-          </p:cNvSpPr>
-          <p:nvPr>
-            <p:ph idx="1"/>
-          </p:nvPr>
-        </p:nvSpPr>
-        <p:spPr/>
-        <p:txBody>
-          <a:bodyPr/>
-          <a:lstStyle/>
+              <a:rPr b="1"/>
+              <a:t>Public Resources</a:t>
+            </a:r>
+          </a:p>
           <a:p>
             <a:pPr lvl="0"/>
             <a:r>
@@ -5049,9 +4221,6 @@
           </a:p>
           <a:p>
             <a:pPr lvl="0" indent="0" marL="0">
-              <a:spcBef>
-                <a:spcPts val="3000"/>
-              </a:spcBef>
               <a:buNone/>
             </a:pPr>
             <a:r>

</xml_diff>